<commit_message>
updated slides in LDA/QDA
</commit_message>
<xml_diff>
--- a/slides.pptx
+++ b/slides.pptx
@@ -272,7 +272,7 @@
 <file path=ppt/revisionInfo.xml><?xml version="1.0" encoding="utf-8"?>
 <p1510:revInfo xmlns:a="http://schemas.openxmlformats.org/drawingml/2006/main" xmlns:r="http://schemas.openxmlformats.org/officeDocument/2006/relationships" xmlns:p1510="http://schemas.microsoft.com/office/powerpoint/2015/10/main">
   <p1510:revLst>
-    <p1510:client id="{C3DD1394-B4D8-4AF4-960A-3AA4574F90C6}" v="99" dt="2023-06-23T13:39:15.822"/>
+    <p1510:client id="{C3DD1394-B4D8-4AF4-960A-3AA4574F90C6}" v="112" dt="2023-06-23T15:59:34.827"/>
   </p1510:revLst>
 </p1510:revInfo>
 </file>
@@ -282,7 +282,7 @@
   <pc:docChgLst>
     <pc:chgData name="Uderzo Marco" userId="5d25d1a0-8130-48db-a9f0-bed0112b2e0a" providerId="ADAL" clId="{C3DD1394-B4D8-4AF4-960A-3AA4574F90C6}"/>
     <pc:docChg chg="undo custSel addSld delSld modSld sldOrd">
-      <pc:chgData name="Uderzo Marco" userId="5d25d1a0-8130-48db-a9f0-bed0112b2e0a" providerId="ADAL" clId="{C3DD1394-B4D8-4AF4-960A-3AA4574F90C6}" dt="2023-06-23T14:07:06.620" v="4838" actId="20577"/>
+      <pc:chgData name="Uderzo Marco" userId="5d25d1a0-8130-48db-a9f0-bed0112b2e0a" providerId="ADAL" clId="{C3DD1394-B4D8-4AF4-960A-3AA4574F90C6}" dt="2023-06-23T16:00:01.915" v="4885" actId="20577"/>
       <pc:docMkLst>
         <pc:docMk/>
       </pc:docMkLst>
@@ -302,6 +302,21 @@
         </pc:spChg>
       </pc:sldChg>
       <pc:sldChg chg="modSp mod">
+        <pc:chgData name="Uderzo Marco" userId="5d25d1a0-8130-48db-a9f0-bed0112b2e0a" providerId="ADAL" clId="{C3DD1394-B4D8-4AF4-960A-3AA4574F90C6}" dt="2023-06-23T15:56:14.039" v="4839" actId="20577"/>
+        <pc:sldMkLst>
+          <pc:docMk/>
+          <pc:sldMk cId="0" sldId="261"/>
+        </pc:sldMkLst>
+        <pc:spChg chg="mod">
+          <ac:chgData name="Uderzo Marco" userId="5d25d1a0-8130-48db-a9f0-bed0112b2e0a" providerId="ADAL" clId="{C3DD1394-B4D8-4AF4-960A-3AA4574F90C6}" dt="2023-06-23T15:56:14.039" v="4839" actId="20577"/>
+          <ac:spMkLst>
+            <pc:docMk/>
+            <pc:sldMk cId="0" sldId="261"/>
+            <ac:spMk id="150" creationId="{00000000-0000-0000-0000-000000000000}"/>
+          </ac:spMkLst>
+        </pc:spChg>
+      </pc:sldChg>
+      <pc:sldChg chg="modSp mod">
         <pc:chgData name="Uderzo Marco" userId="5d25d1a0-8130-48db-a9f0-bed0112b2e0a" providerId="ADAL" clId="{C3DD1394-B4D8-4AF4-960A-3AA4574F90C6}" dt="2023-06-23T07:24:10.188" v="18" actId="255"/>
         <pc:sldMkLst>
           <pc:docMk/>
@@ -316,8 +331,23 @@
           </ac:spMkLst>
         </pc:spChg>
       </pc:sldChg>
+      <pc:sldChg chg="modSp mod">
+        <pc:chgData name="Uderzo Marco" userId="5d25d1a0-8130-48db-a9f0-bed0112b2e0a" providerId="ADAL" clId="{C3DD1394-B4D8-4AF4-960A-3AA4574F90C6}" dt="2023-06-23T15:56:18.845" v="4840" actId="20577"/>
+        <pc:sldMkLst>
+          <pc:docMk/>
+          <pc:sldMk cId="2326580074" sldId="264"/>
+        </pc:sldMkLst>
+        <pc:spChg chg="mod">
+          <ac:chgData name="Uderzo Marco" userId="5d25d1a0-8130-48db-a9f0-bed0112b2e0a" providerId="ADAL" clId="{C3DD1394-B4D8-4AF4-960A-3AA4574F90C6}" dt="2023-06-23T15:56:18.845" v="4840" actId="20577"/>
+          <ac:spMkLst>
+            <pc:docMk/>
+            <pc:sldMk cId="2326580074" sldId="264"/>
+            <ac:spMk id="150" creationId="{00000000-0000-0000-0000-000000000000}"/>
+          </ac:spMkLst>
+        </pc:spChg>
+      </pc:sldChg>
       <pc:sldChg chg="addSp delSp modSp mod">
-        <pc:chgData name="Uderzo Marco" userId="5d25d1a0-8130-48db-a9f0-bed0112b2e0a" providerId="ADAL" clId="{C3DD1394-B4D8-4AF4-960A-3AA4574F90C6}" dt="2023-06-23T07:26:58.128" v="75" actId="20577"/>
+        <pc:chgData name="Uderzo Marco" userId="5d25d1a0-8130-48db-a9f0-bed0112b2e0a" providerId="ADAL" clId="{C3DD1394-B4D8-4AF4-960A-3AA4574F90C6}" dt="2023-06-23T15:58:49.759" v="4870" actId="20577"/>
         <pc:sldMkLst>
           <pc:docMk/>
           <pc:sldMk cId="1257511418" sldId="266"/>
@@ -328,6 +358,14 @@
             <pc:docMk/>
             <pc:sldMk cId="1257511418" sldId="266"/>
             <ac:spMk id="2" creationId="{C41B178F-3923-8B55-760A-F4A483B486A4}"/>
+          </ac:spMkLst>
+        </pc:spChg>
+        <pc:spChg chg="add mod">
+          <ac:chgData name="Uderzo Marco" userId="5d25d1a0-8130-48db-a9f0-bed0112b2e0a" providerId="ADAL" clId="{C3DD1394-B4D8-4AF4-960A-3AA4574F90C6}" dt="2023-06-23T15:58:49.759" v="4870" actId="20577"/>
+          <ac:spMkLst>
+            <pc:docMk/>
+            <pc:sldMk cId="1257511418" sldId="266"/>
+            <ac:spMk id="2" creationId="{D1CC31C2-1ADF-765B-FD29-D6D92CAF5733}"/>
           </ac:spMkLst>
         </pc:spChg>
         <pc:spChg chg="add del mod">
@@ -355,7 +393,7 @@
           </ac:spMkLst>
         </pc:spChg>
         <pc:spChg chg="mod">
-          <ac:chgData name="Uderzo Marco" userId="5d25d1a0-8130-48db-a9f0-bed0112b2e0a" providerId="ADAL" clId="{C3DD1394-B4D8-4AF4-960A-3AA4574F90C6}" dt="2023-06-23T07:26:58.128" v="75" actId="20577"/>
+          <ac:chgData name="Uderzo Marco" userId="5d25d1a0-8130-48db-a9f0-bed0112b2e0a" providerId="ADAL" clId="{C3DD1394-B4D8-4AF4-960A-3AA4574F90C6}" dt="2023-06-23T15:58:04.447" v="4849" actId="20577"/>
           <ac:spMkLst>
             <pc:docMk/>
             <pc:sldMk cId="1257511418" sldId="266"/>
@@ -363,7 +401,7 @@
           </ac:spMkLst>
         </pc:spChg>
         <pc:picChg chg="add mod">
-          <ac:chgData name="Uderzo Marco" userId="5d25d1a0-8130-48db-a9f0-bed0112b2e0a" providerId="ADAL" clId="{C3DD1394-B4D8-4AF4-960A-3AA4574F90C6}" dt="2023-06-23T07:23:40.799" v="14" actId="1076"/>
+          <ac:chgData name="Uderzo Marco" userId="5d25d1a0-8130-48db-a9f0-bed0112b2e0a" providerId="ADAL" clId="{C3DD1394-B4D8-4AF4-960A-3AA4574F90C6}" dt="2023-06-23T15:58:20.969" v="4854" actId="1076"/>
           <ac:picMkLst>
             <pc:docMk/>
             <pc:sldMk cId="1257511418" sldId="266"/>
@@ -371,7 +409,7 @@
           </ac:picMkLst>
         </pc:picChg>
         <pc:picChg chg="add mod">
-          <ac:chgData name="Uderzo Marco" userId="5d25d1a0-8130-48db-a9f0-bed0112b2e0a" providerId="ADAL" clId="{C3DD1394-B4D8-4AF4-960A-3AA4574F90C6}" dt="2023-06-23T07:23:43.753" v="16" actId="1076"/>
+          <ac:chgData name="Uderzo Marco" userId="5d25d1a0-8130-48db-a9f0-bed0112b2e0a" providerId="ADAL" clId="{C3DD1394-B4D8-4AF4-960A-3AA4574F90C6}" dt="2023-06-23T15:58:26.622" v="4856" actId="1076"/>
           <ac:picMkLst>
             <pc:docMk/>
             <pc:sldMk cId="1257511418" sldId="266"/>
@@ -380,11 +418,19 @@
         </pc:picChg>
       </pc:sldChg>
       <pc:sldChg chg="addSp delSp modSp add mod">
-        <pc:chgData name="Uderzo Marco" userId="5d25d1a0-8130-48db-a9f0-bed0112b2e0a" providerId="ADAL" clId="{C3DD1394-B4D8-4AF4-960A-3AA4574F90C6}" dt="2023-06-23T07:27:47.923" v="93" actId="20577"/>
+        <pc:chgData name="Uderzo Marco" userId="5d25d1a0-8130-48db-a9f0-bed0112b2e0a" providerId="ADAL" clId="{C3DD1394-B4D8-4AF4-960A-3AA4574F90C6}" dt="2023-06-23T16:00:01.915" v="4885" actId="20577"/>
         <pc:sldMkLst>
           <pc:docMk/>
           <pc:sldMk cId="2434959197" sldId="267"/>
         </pc:sldMkLst>
+        <pc:spChg chg="add mod">
+          <ac:chgData name="Uderzo Marco" userId="5d25d1a0-8130-48db-a9f0-bed0112b2e0a" providerId="ADAL" clId="{C3DD1394-B4D8-4AF4-960A-3AA4574F90C6}" dt="2023-06-23T16:00:01.915" v="4885" actId="20577"/>
+          <ac:spMkLst>
+            <pc:docMk/>
+            <pc:sldMk cId="2434959197" sldId="267"/>
+            <ac:spMk id="2" creationId="{3D3F373D-9A92-6245-2B55-232AAD0A8B18}"/>
+          </ac:spMkLst>
+        </pc:spChg>
         <pc:spChg chg="mod">
           <ac:chgData name="Uderzo Marco" userId="5d25d1a0-8130-48db-a9f0-bed0112b2e0a" providerId="ADAL" clId="{C3DD1394-B4D8-4AF4-960A-3AA4574F90C6}" dt="2023-06-23T07:25:29.740" v="35" actId="20577"/>
           <ac:spMkLst>
@@ -394,7 +440,7 @@
           </ac:spMkLst>
         </pc:spChg>
         <pc:spChg chg="mod">
-          <ac:chgData name="Uderzo Marco" userId="5d25d1a0-8130-48db-a9f0-bed0112b2e0a" providerId="ADAL" clId="{C3DD1394-B4D8-4AF4-960A-3AA4574F90C6}" dt="2023-06-23T07:27:47.923" v="93" actId="20577"/>
+          <ac:chgData name="Uderzo Marco" userId="5d25d1a0-8130-48db-a9f0-bed0112b2e0a" providerId="ADAL" clId="{C3DD1394-B4D8-4AF4-960A-3AA4574F90C6}" dt="2023-06-23T15:59:29.700" v="4875" actId="20577"/>
           <ac:spMkLst>
             <pc:docMk/>
             <pc:sldMk cId="2434959197" sldId="267"/>
@@ -418,7 +464,7 @@
           </ac:picMkLst>
         </pc:picChg>
         <pc:picChg chg="add mod">
-          <ac:chgData name="Uderzo Marco" userId="5d25d1a0-8130-48db-a9f0-bed0112b2e0a" providerId="ADAL" clId="{C3DD1394-B4D8-4AF4-960A-3AA4574F90C6}" dt="2023-06-23T07:27:13.430" v="84" actId="1076"/>
+          <ac:chgData name="Uderzo Marco" userId="5d25d1a0-8130-48db-a9f0-bed0112b2e0a" providerId="ADAL" clId="{C3DD1394-B4D8-4AF4-960A-3AA4574F90C6}" dt="2023-06-23T15:59:28.399" v="4874" actId="1076"/>
           <ac:picMkLst>
             <pc:docMk/>
             <pc:sldMk cId="2434959197" sldId="267"/>
@@ -14607,38 +14653,6 @@
               </a:rPr>
               <a:t>Cleaning</a:t>
             </a:r>
-            <a:r>
-              <a:rPr lang="it-IT" sz="3000" b="1" dirty="0">
-                <a:solidFill>
-                  <a:srgbClr val="FFFFFF"/>
-                </a:solidFill>
-              </a:rPr>
-              <a:t> </a:t>
-            </a:r>
-            <a:r>
-              <a:rPr lang="it-IT" sz="1600" b="1" dirty="0" err="1">
-                <a:solidFill>
-                  <a:srgbClr val="FFFFFF"/>
-                </a:solidFill>
-              </a:rPr>
-              <a:t>Continuous</a:t>
-            </a:r>
-            <a:r>
-              <a:rPr lang="it-IT" sz="1600" b="1" dirty="0">
-                <a:solidFill>
-                  <a:srgbClr val="FFFFFF"/>
-                </a:solidFill>
-              </a:rPr>
-              <a:t> </a:t>
-            </a:r>
-            <a:r>
-              <a:rPr lang="it-IT" sz="1600" b="1" dirty="0" err="1">
-                <a:solidFill>
-                  <a:srgbClr val="FFFFFF"/>
-                </a:solidFill>
-              </a:rPr>
-              <a:t>Variables</a:t>
-            </a:r>
             <a:endParaRPr sz="1600" b="1" dirty="0">
               <a:solidFill>
                 <a:srgbClr val="FFFFFF"/>
@@ -14961,38 +14975,6 @@
                 </a:solidFill>
               </a:rPr>
               <a:t>Cleaning</a:t>
-            </a:r>
-            <a:r>
-              <a:rPr lang="it-IT" sz="3000" b="1" dirty="0">
-                <a:solidFill>
-                  <a:srgbClr val="FFFFFF"/>
-                </a:solidFill>
-              </a:rPr>
-              <a:t> </a:t>
-            </a:r>
-            <a:r>
-              <a:rPr lang="it-IT" sz="1600" b="1" dirty="0" err="1">
-                <a:solidFill>
-                  <a:srgbClr val="FFFFFF"/>
-                </a:solidFill>
-              </a:rPr>
-              <a:t>Categorical</a:t>
-            </a:r>
-            <a:r>
-              <a:rPr lang="it-IT" sz="1600" b="1" dirty="0">
-                <a:solidFill>
-                  <a:srgbClr val="FFFFFF"/>
-                </a:solidFill>
-              </a:rPr>
-              <a:t> </a:t>
-            </a:r>
-            <a:r>
-              <a:rPr lang="it-IT" sz="1600" b="1" dirty="0" err="1">
-                <a:solidFill>
-                  <a:srgbClr val="FFFFFF"/>
-                </a:solidFill>
-              </a:rPr>
-              <a:t>Variables</a:t>
             </a:r>
             <a:endParaRPr sz="1600" b="1" dirty="0">
               <a:solidFill>
@@ -15794,7 +15776,7 @@
         <p:spPr>
           <a:xfrm>
             <a:off x="0" y="1049154"/>
-            <a:ext cx="9144000" cy="5808846"/>
+            <a:ext cx="4515608" cy="5808846"/>
           </a:xfrm>
           <a:prstGeom prst="rect">
             <a:avLst/>
@@ -15830,16 +15812,27 @@
               </a:spcAft>
               <a:buNone/>
             </a:pPr>
-            <a:r>
-              <a:rPr lang="en-US" sz="2000" b="0" i="0" dirty="0">
-                <a:solidFill>
-                  <a:srgbClr val="333333"/>
-                </a:solidFill>
-                <a:effectLst/>
-                <a:latin typeface="Helvetica Neue"/>
-              </a:rPr>
-              <a:t>AUC: 0.9184313</a:t>
-            </a:r>
+            <a:endParaRPr lang="en-US" sz="2000" b="0" i="0" dirty="0">
+              <a:solidFill>
+                <a:srgbClr val="333333"/>
+              </a:solidFill>
+              <a:effectLst/>
+              <a:latin typeface="Helvetica Neue"/>
+            </a:endParaRPr>
+          </a:p>
+          <a:p>
+            <a:pPr marL="0" indent="0">
+              <a:spcAft>
+                <a:spcPts val="1300"/>
+              </a:spcAft>
+              <a:buNone/>
+            </a:pPr>
+            <a:endParaRPr lang="en-US" sz="2000" dirty="0">
+              <a:solidFill>
+                <a:srgbClr val="333333"/>
+              </a:solidFill>
+              <a:latin typeface="Helvetica Neue"/>
+            </a:endParaRPr>
           </a:p>
           <a:p>
             <a:pPr marL="0" indent="0">
@@ -15970,7 +15963,7 @@
         </p:blipFill>
         <p:spPr bwMode="auto">
           <a:xfrm>
-            <a:off x="507998" y="2566752"/>
+            <a:off x="5074354" y="725746"/>
             <a:ext cx="3883380" cy="2773650"/>
           </a:xfrm>
           <a:prstGeom prst="rect">
@@ -16017,7 +16010,7 @@
         </p:blipFill>
         <p:spPr bwMode="auto">
           <a:xfrm>
-            <a:off x="4628393" y="2624667"/>
+            <a:off x="557851" y="3214603"/>
             <a:ext cx="3860902" cy="2757596"/>
           </a:xfrm>
           <a:prstGeom prst="rect">
@@ -16035,6 +16028,139 @@
           </a:extLst>
         </p:spPr>
       </p:pic>
+      <p:sp>
+        <p:nvSpPr>
+          <p:cNvPr id="2" name="CasellaDiTesto 1">
+            <a:extLst>
+              <a:ext uri="{FF2B5EF4-FFF2-40B4-BE49-F238E27FC236}">
+                <a16:creationId xmlns:a16="http://schemas.microsoft.com/office/drawing/2014/main" id="{D1CC31C2-1ADF-765B-FD29-D6D92CAF5733}"/>
+              </a:ext>
+            </a:extLst>
+          </p:cNvPr>
+          <p:cNvSpPr txBox="1"/>
+          <p:nvPr/>
+        </p:nvSpPr>
+        <p:spPr>
+          <a:xfrm>
+            <a:off x="5973678" y="3643397"/>
+            <a:ext cx="2415822" cy="1528624"/>
+          </a:xfrm>
+          <a:prstGeom prst="rect">
+            <a:avLst/>
+          </a:prstGeom>
+          <a:noFill/>
+        </p:spPr>
+        <p:txBody>
+          <a:bodyPr wrap="square">
+            <a:spAutoFit/>
+          </a:bodyPr>
+          <a:lstStyle/>
+          <a:p>
+            <a:pPr marL="742950" lvl="1" indent="-285750" defTabSz="360000">
+              <a:lnSpc>
+                <a:spcPct val="100000"/>
+              </a:lnSpc>
+              <a:spcAft>
+                <a:spcPts val="1300"/>
+              </a:spcAft>
+            </a:pPr>
+            <a:r>
+              <a:rPr lang="en-US" sz="1000" b="0" i="0" dirty="0">
+                <a:solidFill>
+                  <a:srgbClr val="333333"/>
+                </a:solidFill>
+                <a:effectLst/>
+                <a:latin typeface="Helvetica Neue"/>
+              </a:rPr>
+              <a:t>Accuracy: 0.86</a:t>
+            </a:r>
+          </a:p>
+          <a:p>
+            <a:pPr marL="742950" lvl="1" indent="-285750" defTabSz="360000">
+              <a:lnSpc>
+                <a:spcPct val="100000"/>
+              </a:lnSpc>
+              <a:spcAft>
+                <a:spcPts val="1300"/>
+              </a:spcAft>
+            </a:pPr>
+            <a:r>
+              <a:rPr lang="en-US" sz="1000" dirty="0">
+                <a:solidFill>
+                  <a:srgbClr val="333333"/>
+                </a:solidFill>
+                <a:latin typeface="Helvetica Neue"/>
+              </a:rPr>
+              <a:t>Precision: 0.88</a:t>
+            </a:r>
+          </a:p>
+          <a:p>
+            <a:pPr marL="742950" lvl="1" indent="-285750" defTabSz="360000">
+              <a:lnSpc>
+                <a:spcPct val="100000"/>
+              </a:lnSpc>
+              <a:spcAft>
+                <a:spcPts val="1300"/>
+              </a:spcAft>
+            </a:pPr>
+            <a:r>
+              <a:rPr lang="en-US" sz="1000" dirty="0">
+                <a:solidFill>
+                  <a:srgbClr val="333333"/>
+                </a:solidFill>
+                <a:latin typeface="Helvetica Neue"/>
+              </a:rPr>
+              <a:t>Recall: 0.87</a:t>
+            </a:r>
+          </a:p>
+          <a:p>
+            <a:pPr marL="742950" lvl="1" indent="-285750" defTabSz="360000">
+              <a:lnSpc>
+                <a:spcPct val="100000"/>
+              </a:lnSpc>
+              <a:spcAft>
+                <a:spcPts val="1300"/>
+              </a:spcAft>
+            </a:pPr>
+            <a:r>
+              <a:rPr lang="en-US" sz="1000" b="0" i="0" dirty="0">
+                <a:solidFill>
+                  <a:srgbClr val="333333"/>
+                </a:solidFill>
+                <a:effectLst/>
+                <a:latin typeface="Helvetica Neue"/>
+              </a:rPr>
+              <a:t>F1-Score: 0.87</a:t>
+            </a:r>
+          </a:p>
+          <a:p>
+            <a:pPr marL="742950" lvl="1" indent="-285750" defTabSz="360000">
+              <a:lnSpc>
+                <a:spcPct val="100000"/>
+              </a:lnSpc>
+              <a:spcAft>
+                <a:spcPts val="1300"/>
+              </a:spcAft>
+            </a:pPr>
+            <a:r>
+              <a:rPr lang="en-US" sz="1000" dirty="0">
+                <a:solidFill>
+                  <a:srgbClr val="333333"/>
+                </a:solidFill>
+                <a:latin typeface="Helvetica Neue"/>
+              </a:rPr>
+              <a:t>AUC: 0.92</a:t>
+            </a:r>
+            <a:endParaRPr lang="en-US" sz="1000" b="0" i="0" dirty="0">
+              <a:solidFill>
+                <a:srgbClr val="333333"/>
+              </a:solidFill>
+              <a:effectLst/>
+              <a:latin typeface="Helvetica Neue"/>
+            </a:endParaRPr>
+          </a:p>
+        </p:txBody>
+      </p:sp>
     </p:spTree>
     <p:extLst>
       <p:ext uri="{BB962C8B-B14F-4D97-AF65-F5344CB8AC3E}">
@@ -16152,7 +16278,7 @@
         <p:spPr>
           <a:xfrm>
             <a:off x="0" y="1049154"/>
-            <a:ext cx="9144000" cy="5808846"/>
+            <a:ext cx="4914163" cy="5808846"/>
           </a:xfrm>
           <a:prstGeom prst="rect">
             <a:avLst/>
@@ -16194,23 +16320,6 @@
               </a:solidFill>
               <a:latin typeface="Helvetica Neue"/>
             </a:endParaRPr>
-          </a:p>
-          <a:p>
-            <a:pPr marL="0" indent="0">
-              <a:spcAft>
-                <a:spcPts val="1300"/>
-              </a:spcAft>
-              <a:buNone/>
-            </a:pPr>
-            <a:r>
-              <a:rPr lang="en-US" sz="2000" dirty="0">
-                <a:solidFill>
-                  <a:srgbClr val="333333"/>
-                </a:solidFill>
-                <a:latin typeface="Helvetica Neue"/>
-              </a:rPr>
-              <a:t>AUC: 0.9049767</a:t>
-            </a:r>
           </a:p>
           <a:p>
             <a:pPr marL="0" indent="0">
@@ -16326,8 +16435,8 @@
         </p:blipFill>
         <p:spPr bwMode="auto">
           <a:xfrm>
-            <a:off x="2284147" y="2850445"/>
-            <a:ext cx="4575706" cy="3268134"/>
+            <a:off x="4914163" y="960733"/>
+            <a:ext cx="3967206" cy="2833522"/>
           </a:xfrm>
           <a:prstGeom prst="rect">
             <a:avLst/>
@@ -16344,6 +16453,148 @@
           </a:extLst>
         </p:spPr>
       </p:pic>
+      <p:sp>
+        <p:nvSpPr>
+          <p:cNvPr id="2" name="CasellaDiTesto 1">
+            <a:extLst>
+              <a:ext uri="{FF2B5EF4-FFF2-40B4-BE49-F238E27FC236}">
+                <a16:creationId xmlns:a16="http://schemas.microsoft.com/office/drawing/2014/main" id="{3D3F373D-9A92-6245-2B55-232AAD0A8B18}"/>
+              </a:ext>
+            </a:extLst>
+          </p:cNvPr>
+          <p:cNvSpPr txBox="1"/>
+          <p:nvPr/>
+        </p:nvSpPr>
+        <p:spPr>
+          <a:xfrm>
+            <a:off x="5959278" y="4173243"/>
+            <a:ext cx="2415822" cy="1528624"/>
+          </a:xfrm>
+          <a:prstGeom prst="rect">
+            <a:avLst/>
+          </a:prstGeom>
+          <a:noFill/>
+        </p:spPr>
+        <p:txBody>
+          <a:bodyPr wrap="square">
+            <a:spAutoFit/>
+          </a:bodyPr>
+          <a:lstStyle/>
+          <a:p>
+            <a:pPr marL="742950" lvl="1" indent="-285750" defTabSz="360000">
+              <a:lnSpc>
+                <a:spcPct val="100000"/>
+              </a:lnSpc>
+              <a:spcAft>
+                <a:spcPts val="1300"/>
+              </a:spcAft>
+            </a:pPr>
+            <a:r>
+              <a:rPr lang="en-US" sz="1000" b="0" i="0" dirty="0">
+                <a:solidFill>
+                  <a:srgbClr val="333333"/>
+                </a:solidFill>
+                <a:effectLst/>
+                <a:latin typeface="Helvetica Neue"/>
+              </a:rPr>
+              <a:t>Accuracy: 0.86</a:t>
+            </a:r>
+          </a:p>
+          <a:p>
+            <a:pPr marL="742950" lvl="1" indent="-285750" defTabSz="360000">
+              <a:lnSpc>
+                <a:spcPct val="100000"/>
+              </a:lnSpc>
+              <a:spcAft>
+                <a:spcPts val="1300"/>
+              </a:spcAft>
+            </a:pPr>
+            <a:r>
+              <a:rPr lang="en-US" sz="1000" dirty="0">
+                <a:solidFill>
+                  <a:srgbClr val="333333"/>
+                </a:solidFill>
+                <a:latin typeface="Helvetica Neue"/>
+              </a:rPr>
+              <a:t>Precision: 0.87</a:t>
+            </a:r>
+          </a:p>
+          <a:p>
+            <a:pPr marL="742950" lvl="1" indent="-285750" defTabSz="360000">
+              <a:lnSpc>
+                <a:spcPct val="100000"/>
+              </a:lnSpc>
+              <a:spcAft>
+                <a:spcPts val="1300"/>
+              </a:spcAft>
+            </a:pPr>
+            <a:r>
+              <a:rPr lang="en-US" sz="1000" dirty="0">
+                <a:solidFill>
+                  <a:srgbClr val="333333"/>
+                </a:solidFill>
+                <a:latin typeface="Helvetica Neue"/>
+              </a:rPr>
+              <a:t>Recall: 0.87</a:t>
+            </a:r>
+          </a:p>
+          <a:p>
+            <a:pPr marL="742950" lvl="1" indent="-285750" defTabSz="360000">
+              <a:lnSpc>
+                <a:spcPct val="100000"/>
+              </a:lnSpc>
+              <a:spcAft>
+                <a:spcPts val="1300"/>
+              </a:spcAft>
+            </a:pPr>
+            <a:r>
+              <a:rPr lang="en-US" sz="1000" b="0" i="0" dirty="0">
+                <a:solidFill>
+                  <a:srgbClr val="333333"/>
+                </a:solidFill>
+                <a:effectLst/>
+                <a:latin typeface="Helvetica Neue"/>
+              </a:rPr>
+              <a:t>F1-Score: 0.87</a:t>
+            </a:r>
+          </a:p>
+          <a:p>
+            <a:pPr marL="742950" lvl="1" indent="-285750" defTabSz="360000">
+              <a:lnSpc>
+                <a:spcPct val="100000"/>
+              </a:lnSpc>
+              <a:spcAft>
+                <a:spcPts val="1300"/>
+              </a:spcAft>
+            </a:pPr>
+            <a:r>
+              <a:rPr lang="en-US" sz="1000" dirty="0">
+                <a:solidFill>
+                  <a:srgbClr val="333333"/>
+                </a:solidFill>
+                <a:latin typeface="Helvetica Neue"/>
+              </a:rPr>
+              <a:t>AUC</a:t>
+            </a:r>
+            <a:r>
+              <a:rPr lang="en-US" sz="1000">
+                <a:solidFill>
+                  <a:srgbClr val="333333"/>
+                </a:solidFill>
+                <a:latin typeface="Helvetica Neue"/>
+              </a:rPr>
+              <a:t>: 0.90</a:t>
+            </a:r>
+            <a:endParaRPr lang="en-US" sz="1000" b="0" i="0" dirty="0">
+              <a:solidFill>
+                <a:srgbClr val="333333"/>
+              </a:solidFill>
+              <a:effectLst/>
+              <a:latin typeface="Helvetica Neue"/>
+            </a:endParaRPr>
+          </a:p>
+        </p:txBody>
+      </p:sp>
     </p:spTree>
     <p:extLst>
       <p:ext uri="{BB962C8B-B14F-4D97-AF65-F5344CB8AC3E}">

</xml_diff>

<commit_message>
revisions on rmd and slides
</commit_message>
<xml_diff>
--- a/slides.pptx
+++ b/slides.pptx
@@ -6,7 +6,7 @@
     <p:sldMasterId id="2147483665" r:id="rId2"/>
   </p:sldMasterIdLst>
   <p:notesMasterIdLst>
-    <p:notesMasterId r:id="rId20"/>
+    <p:notesMasterId r:id="rId22"/>
   </p:notesMasterIdLst>
   <p:sldIdLst>
     <p:sldId id="256" r:id="rId3"/>
@@ -20,43 +20,49 @@
     <p:sldId id="267" r:id="rId11"/>
     <p:sldId id="274" r:id="rId12"/>
     <p:sldId id="268" r:id="rId13"/>
-    <p:sldId id="269" r:id="rId14"/>
-    <p:sldId id="277" r:id="rId15"/>
+    <p:sldId id="277" r:id="rId14"/>
+    <p:sldId id="269" r:id="rId15"/>
     <p:sldId id="276" r:id="rId16"/>
     <p:sldId id="270" r:id="rId17"/>
     <p:sldId id="272" r:id="rId18"/>
     <p:sldId id="273" r:id="rId19"/>
+    <p:sldId id="278" r:id="rId20"/>
+    <p:sldId id="279" r:id="rId21"/>
   </p:sldIdLst>
   <p:sldSz cx="9144000" cy="6858000" type="screen4x3"/>
   <p:notesSz cx="6858000" cy="9144000"/>
   <p:embeddedFontLst>
     <p:embeddedFont>
+      <p:font typeface="Bahnschrift SemiLight" panose="020B0502040204020203" pitchFamily="34" charset="0"/>
+      <p:regular r:id="rId23"/>
+    </p:embeddedFont>
+    <p:embeddedFont>
       <p:font typeface="Calibri" panose="020F0502020204030204" pitchFamily="34" charset="0"/>
-      <p:regular r:id="rId21"/>
-      <p:bold r:id="rId22"/>
-      <p:italic r:id="rId23"/>
-      <p:boldItalic r:id="rId24"/>
+      <p:regular r:id="rId24"/>
+      <p:bold r:id="rId25"/>
+      <p:italic r:id="rId26"/>
+      <p:boldItalic r:id="rId27"/>
     </p:embeddedFont>
     <p:embeddedFont>
       <p:font typeface="Cuprum" panose="020B0604020202020204" charset="0"/>
-      <p:regular r:id="rId25"/>
-      <p:bold r:id="rId26"/>
-      <p:italic r:id="rId27"/>
-      <p:boldItalic r:id="rId28"/>
+      <p:regular r:id="rId28"/>
+      <p:bold r:id="rId29"/>
+      <p:italic r:id="rId30"/>
+      <p:boldItalic r:id="rId31"/>
     </p:embeddedFont>
     <p:embeddedFont>
       <p:font typeface="Lato" panose="020F0502020204030203" pitchFamily="34" charset="0"/>
-      <p:regular r:id="rId29"/>
-      <p:bold r:id="rId30"/>
-      <p:italic r:id="rId31"/>
-      <p:boldItalic r:id="rId32"/>
+      <p:regular r:id="rId32"/>
+      <p:bold r:id="rId33"/>
+      <p:italic r:id="rId34"/>
+      <p:boldItalic r:id="rId35"/>
     </p:embeddedFont>
     <p:embeddedFont>
       <p:font typeface="Source Sans Pro" panose="020B0503030403020204" pitchFamily="34" charset="0"/>
-      <p:regular r:id="rId33"/>
-      <p:bold r:id="rId34"/>
-      <p:italic r:id="rId35"/>
-      <p:boldItalic r:id="rId36"/>
+      <p:regular r:id="rId36"/>
+      <p:bold r:id="rId37"/>
+      <p:italic r:id="rId38"/>
+      <p:boldItalic r:id="rId39"/>
     </p:embeddedFont>
   </p:embeddedFontLst>
   <p:defaultTextStyle>
@@ -272,7 +278,7 @@
 <file path=ppt/revisionInfo.xml><?xml version="1.0" encoding="utf-8"?>
 <p1510:revInfo xmlns:a="http://schemas.openxmlformats.org/drawingml/2006/main" xmlns:r="http://schemas.openxmlformats.org/officeDocument/2006/relationships" xmlns:p1510="http://schemas.microsoft.com/office/powerpoint/2015/10/main">
   <p1510:revLst>
-    <p1510:client id="{C3DD1394-B4D8-4AF4-960A-3AA4574F90C6}" v="112" dt="2023-06-23T15:59:34.827"/>
+    <p1510:client id="{C3DD1394-B4D8-4AF4-960A-3AA4574F90C6}" v="165" dt="2023-06-24T09:03:09.197"/>
   </p1510:revLst>
 </p1510:revInfo>
 </file>
@@ -282,22 +288,37 @@
   <pc:docChgLst>
     <pc:chgData name="Uderzo Marco" userId="5d25d1a0-8130-48db-a9f0-bed0112b2e0a" providerId="ADAL" clId="{C3DD1394-B4D8-4AF4-960A-3AA4574F90C6}"/>
     <pc:docChg chg="undo custSel addSld delSld modSld sldOrd">
-      <pc:chgData name="Uderzo Marco" userId="5d25d1a0-8130-48db-a9f0-bed0112b2e0a" providerId="ADAL" clId="{C3DD1394-B4D8-4AF4-960A-3AA4574F90C6}" dt="2023-06-23T16:00:01.915" v="4885" actId="20577"/>
+      <pc:chgData name="Uderzo Marco" userId="5d25d1a0-8130-48db-a9f0-bed0112b2e0a" providerId="ADAL" clId="{C3DD1394-B4D8-4AF4-960A-3AA4574F90C6}" dt="2023-06-24T09:29:37.205" v="8656" actId="20577"/>
       <pc:docMkLst>
         <pc:docMk/>
       </pc:docMkLst>
       <pc:sldChg chg="modSp mod">
-        <pc:chgData name="Uderzo Marco" userId="5d25d1a0-8130-48db-a9f0-bed0112b2e0a" providerId="ADAL" clId="{C3DD1394-B4D8-4AF4-960A-3AA4574F90C6}" dt="2023-06-23T07:24:22.634" v="20" actId="2711"/>
+        <pc:chgData name="Uderzo Marco" userId="5d25d1a0-8130-48db-a9f0-bed0112b2e0a" providerId="ADAL" clId="{C3DD1394-B4D8-4AF4-960A-3AA4574F90C6}" dt="2023-06-24T07:09:01.003" v="5473" actId="255"/>
         <pc:sldMkLst>
           <pc:docMk/>
           <pc:sldMk cId="0" sldId="257"/>
         </pc:sldMkLst>
         <pc:spChg chg="mod">
-          <ac:chgData name="Uderzo Marco" userId="5d25d1a0-8130-48db-a9f0-bed0112b2e0a" providerId="ADAL" clId="{C3DD1394-B4D8-4AF4-960A-3AA4574F90C6}" dt="2023-06-23T07:24:22.634" v="20" actId="2711"/>
+          <ac:chgData name="Uderzo Marco" userId="5d25d1a0-8130-48db-a9f0-bed0112b2e0a" providerId="ADAL" clId="{C3DD1394-B4D8-4AF4-960A-3AA4574F90C6}" dt="2023-06-24T07:09:01.003" v="5473" actId="255"/>
           <ac:spMkLst>
             <pc:docMk/>
             <pc:sldMk cId="0" sldId="257"/>
             <ac:spMk id="100" creationId="{00000000-0000-0000-0000-000000000000}"/>
+          </ac:spMkLst>
+        </pc:spChg>
+      </pc:sldChg>
+      <pc:sldChg chg="modSp mod">
+        <pc:chgData name="Uderzo Marco" userId="5d25d1a0-8130-48db-a9f0-bed0112b2e0a" providerId="ADAL" clId="{C3DD1394-B4D8-4AF4-960A-3AA4574F90C6}" dt="2023-06-24T07:08:06.517" v="5472" actId="2711"/>
+        <pc:sldMkLst>
+          <pc:docMk/>
+          <pc:sldMk cId="0" sldId="260"/>
+        </pc:sldMkLst>
+        <pc:spChg chg="mod">
+          <ac:chgData name="Uderzo Marco" userId="5d25d1a0-8130-48db-a9f0-bed0112b2e0a" providerId="ADAL" clId="{C3DD1394-B4D8-4AF4-960A-3AA4574F90C6}" dt="2023-06-24T07:08:06.517" v="5472" actId="2711"/>
+          <ac:spMkLst>
+            <pc:docMk/>
+            <pc:sldMk cId="0" sldId="260"/>
+            <ac:spMk id="123" creationId="{00000000-0000-0000-0000-000000000000}"/>
           </ac:spMkLst>
         </pc:spChg>
       </pc:sldChg>
@@ -317,13 +338,13 @@
         </pc:spChg>
       </pc:sldChg>
       <pc:sldChg chg="modSp mod">
-        <pc:chgData name="Uderzo Marco" userId="5d25d1a0-8130-48db-a9f0-bed0112b2e0a" providerId="ADAL" clId="{C3DD1394-B4D8-4AF4-960A-3AA4574F90C6}" dt="2023-06-23T07:24:10.188" v="18" actId="255"/>
+        <pc:chgData name="Uderzo Marco" userId="5d25d1a0-8130-48db-a9f0-bed0112b2e0a" providerId="ADAL" clId="{C3DD1394-B4D8-4AF4-960A-3AA4574F90C6}" dt="2023-06-24T07:09:05.282" v="5474" actId="255"/>
         <pc:sldMkLst>
           <pc:docMk/>
           <pc:sldMk cId="0" sldId="262"/>
         </pc:sldMkLst>
         <pc:spChg chg="mod">
-          <ac:chgData name="Uderzo Marco" userId="5d25d1a0-8130-48db-a9f0-bed0112b2e0a" providerId="ADAL" clId="{C3DD1394-B4D8-4AF4-960A-3AA4574F90C6}" dt="2023-06-23T07:24:10.188" v="18" actId="255"/>
+          <ac:chgData name="Uderzo Marco" userId="5d25d1a0-8130-48db-a9f0-bed0112b2e0a" providerId="ADAL" clId="{C3DD1394-B4D8-4AF4-960A-3AA4574F90C6}" dt="2023-06-24T07:09:05.282" v="5474" actId="255"/>
           <ac:spMkLst>
             <pc:docMk/>
             <pc:sldMk cId="0" sldId="262"/>
@@ -332,13 +353,13 @@
         </pc:spChg>
       </pc:sldChg>
       <pc:sldChg chg="modSp mod">
-        <pc:chgData name="Uderzo Marco" userId="5d25d1a0-8130-48db-a9f0-bed0112b2e0a" providerId="ADAL" clId="{C3DD1394-B4D8-4AF4-960A-3AA4574F90C6}" dt="2023-06-23T15:56:18.845" v="4840" actId="20577"/>
+        <pc:chgData name="Uderzo Marco" userId="5d25d1a0-8130-48db-a9f0-bed0112b2e0a" providerId="ADAL" clId="{C3DD1394-B4D8-4AF4-960A-3AA4574F90C6}" dt="2023-06-24T07:08:03.713" v="5469" actId="2711"/>
         <pc:sldMkLst>
           <pc:docMk/>
           <pc:sldMk cId="2326580074" sldId="264"/>
         </pc:sldMkLst>
         <pc:spChg chg="mod">
-          <ac:chgData name="Uderzo Marco" userId="5d25d1a0-8130-48db-a9f0-bed0112b2e0a" providerId="ADAL" clId="{C3DD1394-B4D8-4AF4-960A-3AA4574F90C6}" dt="2023-06-23T15:56:18.845" v="4840" actId="20577"/>
+          <ac:chgData name="Uderzo Marco" userId="5d25d1a0-8130-48db-a9f0-bed0112b2e0a" providerId="ADAL" clId="{C3DD1394-B4D8-4AF4-960A-3AA4574F90C6}" dt="2023-06-24T07:08:03.713" v="5469" actId="2711"/>
           <ac:spMkLst>
             <pc:docMk/>
             <pc:sldMk cId="2326580074" sldId="264"/>
@@ -347,7 +368,7 @@
         </pc:spChg>
       </pc:sldChg>
       <pc:sldChg chg="addSp delSp modSp mod">
-        <pc:chgData name="Uderzo Marco" userId="5d25d1a0-8130-48db-a9f0-bed0112b2e0a" providerId="ADAL" clId="{C3DD1394-B4D8-4AF4-960A-3AA4574F90C6}" dt="2023-06-23T15:58:49.759" v="4870" actId="20577"/>
+        <pc:chgData name="Uderzo Marco" userId="5d25d1a0-8130-48db-a9f0-bed0112b2e0a" providerId="ADAL" clId="{C3DD1394-B4D8-4AF4-960A-3AA4574F90C6}" dt="2023-06-24T07:09:09.884" v="5475" actId="255"/>
         <pc:sldMkLst>
           <pc:docMk/>
           <pc:sldMk cId="1257511418" sldId="266"/>
@@ -393,7 +414,7 @@
           </ac:spMkLst>
         </pc:spChg>
         <pc:spChg chg="mod">
-          <ac:chgData name="Uderzo Marco" userId="5d25d1a0-8130-48db-a9f0-bed0112b2e0a" providerId="ADAL" clId="{C3DD1394-B4D8-4AF4-960A-3AA4574F90C6}" dt="2023-06-23T15:58:04.447" v="4849" actId="20577"/>
+          <ac:chgData name="Uderzo Marco" userId="5d25d1a0-8130-48db-a9f0-bed0112b2e0a" providerId="ADAL" clId="{C3DD1394-B4D8-4AF4-960A-3AA4574F90C6}" dt="2023-06-24T07:09:09.884" v="5475" actId="255"/>
           <ac:spMkLst>
             <pc:docMk/>
             <pc:sldMk cId="1257511418" sldId="266"/>
@@ -418,7 +439,7 @@
         </pc:picChg>
       </pc:sldChg>
       <pc:sldChg chg="addSp delSp modSp add mod">
-        <pc:chgData name="Uderzo Marco" userId="5d25d1a0-8130-48db-a9f0-bed0112b2e0a" providerId="ADAL" clId="{C3DD1394-B4D8-4AF4-960A-3AA4574F90C6}" dt="2023-06-23T16:00:01.915" v="4885" actId="20577"/>
+        <pc:chgData name="Uderzo Marco" userId="5d25d1a0-8130-48db-a9f0-bed0112b2e0a" providerId="ADAL" clId="{C3DD1394-B4D8-4AF4-960A-3AA4574F90C6}" dt="2023-06-24T07:09:14.218" v="5476" actId="255"/>
         <pc:sldMkLst>
           <pc:docMk/>
           <pc:sldMk cId="2434959197" sldId="267"/>
@@ -440,7 +461,7 @@
           </ac:spMkLst>
         </pc:spChg>
         <pc:spChg chg="mod">
-          <ac:chgData name="Uderzo Marco" userId="5d25d1a0-8130-48db-a9f0-bed0112b2e0a" providerId="ADAL" clId="{C3DD1394-B4D8-4AF4-960A-3AA4574F90C6}" dt="2023-06-23T15:59:29.700" v="4875" actId="20577"/>
+          <ac:chgData name="Uderzo Marco" userId="5d25d1a0-8130-48db-a9f0-bed0112b2e0a" providerId="ADAL" clId="{C3DD1394-B4D8-4AF4-960A-3AA4574F90C6}" dt="2023-06-24T07:09:14.218" v="5476" actId="255"/>
           <ac:spMkLst>
             <pc:docMk/>
             <pc:sldMk cId="2434959197" sldId="267"/>
@@ -472,12 +493,20 @@
           </ac:picMkLst>
         </pc:picChg>
       </pc:sldChg>
-      <pc:sldChg chg="delSp modSp add mod">
-        <pc:chgData name="Uderzo Marco" userId="5d25d1a0-8130-48db-a9f0-bed0112b2e0a" providerId="ADAL" clId="{C3DD1394-B4D8-4AF4-960A-3AA4574F90C6}" dt="2023-06-23T09:44:47.430" v="3548" actId="20577"/>
+      <pc:sldChg chg="addSp delSp modSp add mod">
+        <pc:chgData name="Uderzo Marco" userId="5d25d1a0-8130-48db-a9f0-bed0112b2e0a" providerId="ADAL" clId="{C3DD1394-B4D8-4AF4-960A-3AA4574F90C6}" dt="2023-06-24T08:33:03.839" v="6574" actId="1076"/>
         <pc:sldMkLst>
           <pc:docMk/>
           <pc:sldMk cId="1687996252" sldId="268"/>
         </pc:sldMkLst>
+        <pc:spChg chg="add mod">
+          <ac:chgData name="Uderzo Marco" userId="5d25d1a0-8130-48db-a9f0-bed0112b2e0a" providerId="ADAL" clId="{C3DD1394-B4D8-4AF4-960A-3AA4574F90C6}" dt="2023-06-24T07:57:26.035" v="6309" actId="571"/>
+          <ac:spMkLst>
+            <pc:docMk/>
+            <pc:sldMk cId="1687996252" sldId="268"/>
+            <ac:spMk id="4" creationId="{60AD21FF-D2F6-FFE9-6EB2-D4B17704546B}"/>
+          </ac:spMkLst>
+        </pc:spChg>
         <pc:spChg chg="mod">
           <ac:chgData name="Uderzo Marco" userId="5d25d1a0-8130-48db-a9f0-bed0112b2e0a" providerId="ADAL" clId="{C3DD1394-B4D8-4AF4-960A-3AA4574F90C6}" dt="2023-06-23T09:19:12.086" v="2815" actId="1076"/>
           <ac:spMkLst>
@@ -487,13 +516,45 @@
           </ac:spMkLst>
         </pc:spChg>
         <pc:spChg chg="mod">
-          <ac:chgData name="Uderzo Marco" userId="5d25d1a0-8130-48db-a9f0-bed0112b2e0a" providerId="ADAL" clId="{C3DD1394-B4D8-4AF4-960A-3AA4574F90C6}" dt="2023-06-23T09:44:47.430" v="3548" actId="20577"/>
+          <ac:chgData name="Uderzo Marco" userId="5d25d1a0-8130-48db-a9f0-bed0112b2e0a" providerId="ADAL" clId="{C3DD1394-B4D8-4AF4-960A-3AA4574F90C6}" dt="2023-06-24T08:26:47.319" v="6571" actId="20577"/>
           <ac:spMkLst>
             <pc:docMk/>
             <pc:sldMk cId="1687996252" sldId="268"/>
             <ac:spMk id="162" creationId="{00000000-0000-0000-0000-000000000000}"/>
           </ac:spMkLst>
         </pc:spChg>
+        <pc:picChg chg="add mod">
+          <ac:chgData name="Uderzo Marco" userId="5d25d1a0-8130-48db-a9f0-bed0112b2e0a" providerId="ADAL" clId="{C3DD1394-B4D8-4AF4-960A-3AA4574F90C6}" dt="2023-06-24T08:33:03.839" v="6574" actId="1076"/>
+          <ac:picMkLst>
+            <pc:docMk/>
+            <pc:sldMk cId="1687996252" sldId="268"/>
+            <ac:picMk id="3" creationId="{F04C0B8C-2F47-B7B6-2E2E-6CC5419C93B9}"/>
+          </ac:picMkLst>
+        </pc:picChg>
+        <pc:picChg chg="add mod">
+          <ac:chgData name="Uderzo Marco" userId="5d25d1a0-8130-48db-a9f0-bed0112b2e0a" providerId="ADAL" clId="{C3DD1394-B4D8-4AF4-960A-3AA4574F90C6}" dt="2023-06-24T07:57:26.035" v="6309" actId="571"/>
+          <ac:picMkLst>
+            <pc:docMk/>
+            <pc:sldMk cId="1687996252" sldId="268"/>
+            <ac:picMk id="5" creationId="{0FA29027-FC00-C82F-12CB-BFE1656E4B1E}"/>
+          </ac:picMkLst>
+        </pc:picChg>
+        <pc:picChg chg="add del mod">
+          <ac:chgData name="Uderzo Marco" userId="5d25d1a0-8130-48db-a9f0-bed0112b2e0a" providerId="ADAL" clId="{C3DD1394-B4D8-4AF4-960A-3AA4574F90C6}" dt="2023-06-24T07:57:17.677" v="6303" actId="478"/>
+          <ac:picMkLst>
+            <pc:docMk/>
+            <pc:sldMk cId="1687996252" sldId="268"/>
+            <ac:picMk id="2050" creationId="{7470CCB0-01F7-4BCD-CEB8-860383DD586E}"/>
+          </ac:picMkLst>
+        </pc:picChg>
+        <pc:picChg chg="add mod">
+          <ac:chgData name="Uderzo Marco" userId="5d25d1a0-8130-48db-a9f0-bed0112b2e0a" providerId="ADAL" clId="{C3DD1394-B4D8-4AF4-960A-3AA4574F90C6}" dt="2023-06-24T08:32:57.013" v="6572" actId="1076"/>
+          <ac:picMkLst>
+            <pc:docMk/>
+            <pc:sldMk cId="1687996252" sldId="268"/>
+            <ac:picMk id="2052" creationId="{6D52BF45-D520-ABE5-32DF-77552E77D953}"/>
+          </ac:picMkLst>
+        </pc:picChg>
         <pc:picChg chg="del">
           <ac:chgData name="Uderzo Marco" userId="5d25d1a0-8130-48db-a9f0-bed0112b2e0a" providerId="ADAL" clId="{C3DD1394-B4D8-4AF4-960A-3AA4574F90C6}" dt="2023-06-23T07:28:03.982" v="95" actId="478"/>
           <ac:picMkLst>
@@ -504,7 +565,7 @@
         </pc:picChg>
       </pc:sldChg>
       <pc:sldChg chg="addSp delSp modSp add mod ord">
-        <pc:chgData name="Uderzo Marco" userId="5d25d1a0-8130-48db-a9f0-bed0112b2e0a" providerId="ADAL" clId="{C3DD1394-B4D8-4AF4-960A-3AA4574F90C6}" dt="2023-06-23T13:40:15.770" v="4788" actId="20577"/>
+        <pc:chgData name="Uderzo Marco" userId="5d25d1a0-8130-48db-a9f0-bed0112b2e0a" providerId="ADAL" clId="{C3DD1394-B4D8-4AF4-960A-3AA4574F90C6}" dt="2023-06-24T07:30:47.773" v="6065" actId="1076"/>
         <pc:sldMkLst>
           <pc:docMk/>
           <pc:sldMk cId="3517274675" sldId="269"/>
@@ -526,7 +587,7 @@
           </ac:spMkLst>
         </pc:spChg>
         <pc:spChg chg="add mod">
-          <ac:chgData name="Uderzo Marco" userId="5d25d1a0-8130-48db-a9f0-bed0112b2e0a" providerId="ADAL" clId="{C3DD1394-B4D8-4AF4-960A-3AA4574F90C6}" dt="2023-06-23T13:40:15.770" v="4788" actId="20577"/>
+          <ac:chgData name="Uderzo Marco" userId="5d25d1a0-8130-48db-a9f0-bed0112b2e0a" providerId="ADAL" clId="{C3DD1394-B4D8-4AF4-960A-3AA4574F90C6}" dt="2023-06-24T07:23:06.913" v="5683" actId="13926"/>
           <ac:spMkLst>
             <pc:docMk/>
             <pc:sldMk cId="3517274675" sldId="269"/>
@@ -542,13 +603,21 @@
           </ac:spMkLst>
         </pc:spChg>
         <pc:spChg chg="mod">
-          <ac:chgData name="Uderzo Marco" userId="5d25d1a0-8130-48db-a9f0-bed0112b2e0a" providerId="ADAL" clId="{C3DD1394-B4D8-4AF4-960A-3AA4574F90C6}" dt="2023-06-23T13:38:12.682" v="4761" actId="20577"/>
+          <ac:chgData name="Uderzo Marco" userId="5d25d1a0-8130-48db-a9f0-bed0112b2e0a" providerId="ADAL" clId="{C3DD1394-B4D8-4AF4-960A-3AA4574F90C6}" dt="2023-06-24T07:30:12.165" v="6062" actId="20577"/>
           <ac:spMkLst>
             <pc:docMk/>
             <pc:sldMk cId="3517274675" sldId="269"/>
             <ac:spMk id="162" creationId="{00000000-0000-0000-0000-000000000000}"/>
           </ac:spMkLst>
         </pc:spChg>
+        <pc:picChg chg="add mod">
+          <ac:chgData name="Uderzo Marco" userId="5d25d1a0-8130-48db-a9f0-bed0112b2e0a" providerId="ADAL" clId="{C3DD1394-B4D8-4AF4-960A-3AA4574F90C6}" dt="2023-06-24T07:30:47.773" v="6065" actId="1076"/>
+          <ac:picMkLst>
+            <pc:docMk/>
+            <pc:sldMk cId="3517274675" sldId="269"/>
+            <ac:picMk id="5" creationId="{904B9C6B-D44D-A5CC-6C48-1A5F6F9D88FA}"/>
+          </ac:picMkLst>
+        </pc:picChg>
         <pc:picChg chg="add mod">
           <ac:chgData name="Uderzo Marco" userId="5d25d1a0-8130-48db-a9f0-bed0112b2e0a" providerId="ADAL" clId="{C3DD1394-B4D8-4AF4-960A-3AA4574F90C6}" dt="2023-06-23T13:39:05.147" v="4770" actId="1076"/>
           <ac:picMkLst>
@@ -573,15 +642,23 @@
             <ac:picMk id="6148" creationId="{A953D632-46FB-82F9-B7F8-59A19446242F}"/>
           </ac:picMkLst>
         </pc:picChg>
+        <pc:inkChg chg="add del">
+          <ac:chgData name="Uderzo Marco" userId="5d25d1a0-8130-48db-a9f0-bed0112b2e0a" providerId="ADAL" clId="{C3DD1394-B4D8-4AF4-960A-3AA4574F90C6}" dt="2023-06-24T07:22:55.939" v="5682" actId="9405"/>
+          <ac:inkMkLst>
+            <pc:docMk/>
+            <pc:sldMk cId="3517274675" sldId="269"/>
+            <ac:inkMk id="2" creationId="{CB1008F5-343C-1E35-B934-98175B2F28C4}"/>
+          </ac:inkMkLst>
+        </pc:inkChg>
       </pc:sldChg>
       <pc:sldChg chg="addSp delSp modSp add mod">
-        <pc:chgData name="Uderzo Marco" userId="5d25d1a0-8130-48db-a9f0-bed0112b2e0a" providerId="ADAL" clId="{C3DD1394-B4D8-4AF4-960A-3AA4574F90C6}" dt="2023-06-23T14:06:54.892" v="4809" actId="5793"/>
+        <pc:chgData name="Uderzo Marco" userId="5d25d1a0-8130-48db-a9f0-bed0112b2e0a" providerId="ADAL" clId="{C3DD1394-B4D8-4AF4-960A-3AA4574F90C6}" dt="2023-06-24T08:52:40.653" v="7018" actId="20577"/>
         <pc:sldMkLst>
           <pc:docMk/>
           <pc:sldMk cId="1310167981" sldId="270"/>
         </pc:sldMkLst>
         <pc:spChg chg="add mod">
-          <ac:chgData name="Uderzo Marco" userId="5d25d1a0-8130-48db-a9f0-bed0112b2e0a" providerId="ADAL" clId="{C3DD1394-B4D8-4AF4-960A-3AA4574F90C6}" dt="2023-06-23T09:56:49.066" v="4388" actId="20577"/>
+          <ac:chgData name="Uderzo Marco" userId="5d25d1a0-8130-48db-a9f0-bed0112b2e0a" providerId="ADAL" clId="{C3DD1394-B4D8-4AF4-960A-3AA4574F90C6}" dt="2023-06-24T08:45:40.435" v="6837" actId="1076"/>
           <ac:spMkLst>
             <pc:docMk/>
             <pc:sldMk cId="1310167981" sldId="270"/>
@@ -613,13 +690,37 @@
           </ac:spMkLst>
         </pc:spChg>
         <pc:spChg chg="mod">
-          <ac:chgData name="Uderzo Marco" userId="5d25d1a0-8130-48db-a9f0-bed0112b2e0a" providerId="ADAL" clId="{C3DD1394-B4D8-4AF4-960A-3AA4574F90C6}" dt="2023-06-23T14:06:54.892" v="4809" actId="5793"/>
+          <ac:chgData name="Uderzo Marco" userId="5d25d1a0-8130-48db-a9f0-bed0112b2e0a" providerId="ADAL" clId="{C3DD1394-B4D8-4AF4-960A-3AA4574F90C6}" dt="2023-06-24T08:52:40.653" v="7018" actId="20577"/>
           <ac:spMkLst>
             <pc:docMk/>
             <pc:sldMk cId="1310167981" sldId="270"/>
             <ac:spMk id="162" creationId="{00000000-0000-0000-0000-000000000000}"/>
           </ac:spMkLst>
         </pc:spChg>
+        <pc:picChg chg="add del mod">
+          <ac:chgData name="Uderzo Marco" userId="5d25d1a0-8130-48db-a9f0-bed0112b2e0a" providerId="ADAL" clId="{C3DD1394-B4D8-4AF4-960A-3AA4574F90C6}" dt="2023-06-24T08:42:10.352" v="6780" actId="478"/>
+          <ac:picMkLst>
+            <pc:docMk/>
+            <pc:sldMk cId="1310167981" sldId="270"/>
+            <ac:picMk id="4" creationId="{439E4DE0-E93C-8344-891C-09A41CE2D7F2}"/>
+          </ac:picMkLst>
+        </pc:picChg>
+        <pc:picChg chg="add mod">
+          <ac:chgData name="Uderzo Marco" userId="5d25d1a0-8130-48db-a9f0-bed0112b2e0a" providerId="ADAL" clId="{C3DD1394-B4D8-4AF4-960A-3AA4574F90C6}" dt="2023-06-24T08:46:01.583" v="6844" actId="1076"/>
+          <ac:picMkLst>
+            <pc:docMk/>
+            <pc:sldMk cId="1310167981" sldId="270"/>
+            <ac:picMk id="6" creationId="{35A7E7C0-7011-F579-7E8E-685C0EA6172B}"/>
+          </ac:picMkLst>
+        </pc:picChg>
+        <pc:picChg chg="add mod">
+          <ac:chgData name="Uderzo Marco" userId="5d25d1a0-8130-48db-a9f0-bed0112b2e0a" providerId="ADAL" clId="{C3DD1394-B4D8-4AF4-960A-3AA4574F90C6}" dt="2023-06-24T08:46:03.025" v="6845" actId="1076"/>
+          <ac:picMkLst>
+            <pc:docMk/>
+            <pc:sldMk cId="1310167981" sldId="270"/>
+            <ac:picMk id="8" creationId="{94C5AFB5-D549-9F78-E369-475A05AD3811}"/>
+          </ac:picMkLst>
+        </pc:picChg>
         <pc:picChg chg="del mod">
           <ac:chgData name="Uderzo Marco" userId="5d25d1a0-8130-48db-a9f0-bed0112b2e0a" providerId="ADAL" clId="{C3DD1394-B4D8-4AF4-960A-3AA4574F90C6}" dt="2023-06-23T07:56:51.119" v="1163" actId="478"/>
           <ac:picMkLst>
@@ -629,7 +730,7 @@
           </ac:picMkLst>
         </pc:picChg>
         <pc:picChg chg="add mod">
-          <ac:chgData name="Uderzo Marco" userId="5d25d1a0-8130-48db-a9f0-bed0112b2e0a" providerId="ADAL" clId="{C3DD1394-B4D8-4AF4-960A-3AA4574F90C6}" dt="2023-06-23T09:56:02.944" v="4363" actId="1076"/>
+          <ac:chgData name="Uderzo Marco" userId="5d25d1a0-8130-48db-a9f0-bed0112b2e0a" providerId="ADAL" clId="{C3DD1394-B4D8-4AF4-960A-3AA4574F90C6}" dt="2023-06-24T08:46:06.573" v="6846" actId="1076"/>
           <ac:picMkLst>
             <pc:docMk/>
             <pc:sldMk cId="1310167981" sldId="270"/>
@@ -661,13 +762,13 @@
         </pc:picChg>
       </pc:sldChg>
       <pc:sldChg chg="addSp delSp modSp add mod">
-        <pc:chgData name="Uderzo Marco" userId="5d25d1a0-8130-48db-a9f0-bed0112b2e0a" providerId="ADAL" clId="{C3DD1394-B4D8-4AF4-960A-3AA4574F90C6}" dt="2023-06-23T14:07:06.620" v="4838" actId="20577"/>
+        <pc:chgData name="Uderzo Marco" userId="5d25d1a0-8130-48db-a9f0-bed0112b2e0a" providerId="ADAL" clId="{C3DD1394-B4D8-4AF4-960A-3AA4574F90C6}" dt="2023-06-24T08:54:48.813" v="7038" actId="1076"/>
         <pc:sldMkLst>
           <pc:docMk/>
           <pc:sldMk cId="1746712422" sldId="272"/>
         </pc:sldMkLst>
         <pc:spChg chg="add mod">
-          <ac:chgData name="Uderzo Marco" userId="5d25d1a0-8130-48db-a9f0-bed0112b2e0a" providerId="ADAL" clId="{C3DD1394-B4D8-4AF4-960A-3AA4574F90C6}" dt="2023-06-23T13:24:04.367" v="4482" actId="20577"/>
+          <ac:chgData name="Uderzo Marco" userId="5d25d1a0-8130-48db-a9f0-bed0112b2e0a" providerId="ADAL" clId="{C3DD1394-B4D8-4AF4-960A-3AA4574F90C6}" dt="2023-06-24T08:54:13.606" v="7032" actId="20577"/>
           <ac:spMkLst>
             <pc:docMk/>
             <pc:sldMk cId="1746712422" sldId="272"/>
@@ -691,7 +792,7 @@
           </ac:spMkLst>
         </pc:spChg>
         <pc:spChg chg="mod">
-          <ac:chgData name="Uderzo Marco" userId="5d25d1a0-8130-48db-a9f0-bed0112b2e0a" providerId="ADAL" clId="{C3DD1394-B4D8-4AF4-960A-3AA4574F90C6}" dt="2023-06-23T14:07:06.620" v="4838" actId="20577"/>
+          <ac:chgData name="Uderzo Marco" userId="5d25d1a0-8130-48db-a9f0-bed0112b2e0a" providerId="ADAL" clId="{C3DD1394-B4D8-4AF4-960A-3AA4574F90C6}" dt="2023-06-24T08:52:47.272" v="7019" actId="20577"/>
           <ac:spMkLst>
             <pc:docMk/>
             <pc:sldMk cId="1746712422" sldId="272"/>
@@ -699,7 +800,15 @@
           </ac:spMkLst>
         </pc:spChg>
         <pc:picChg chg="add mod">
-          <ac:chgData name="Uderzo Marco" userId="5d25d1a0-8130-48db-a9f0-bed0112b2e0a" providerId="ADAL" clId="{C3DD1394-B4D8-4AF4-960A-3AA4574F90C6}" dt="2023-06-23T13:24:07.724" v="4483" actId="14100"/>
+          <ac:chgData name="Uderzo Marco" userId="5d25d1a0-8130-48db-a9f0-bed0112b2e0a" providerId="ADAL" clId="{C3DD1394-B4D8-4AF4-960A-3AA4574F90C6}" dt="2023-06-24T08:54:48.813" v="7038" actId="1076"/>
+          <ac:picMkLst>
+            <pc:docMk/>
+            <pc:sldMk cId="1746712422" sldId="272"/>
+            <ac:picMk id="4" creationId="{0BA308BC-CDE8-CD12-989C-CB74EBFFE779}"/>
+          </ac:picMkLst>
+        </pc:picChg>
+        <pc:picChg chg="add mod">
+          <ac:chgData name="Uderzo Marco" userId="5d25d1a0-8130-48db-a9f0-bed0112b2e0a" providerId="ADAL" clId="{C3DD1394-B4D8-4AF4-960A-3AA4574F90C6}" dt="2023-06-24T08:54:17.474" v="7034" actId="1076"/>
           <ac:picMkLst>
             <pc:docMk/>
             <pc:sldMk cId="1746712422" sldId="272"/>
@@ -716,13 +825,13 @@
         </pc:picChg>
       </pc:sldChg>
       <pc:sldChg chg="addSp delSp modSp add mod">
-        <pc:chgData name="Uderzo Marco" userId="5d25d1a0-8130-48db-a9f0-bed0112b2e0a" providerId="ADAL" clId="{C3DD1394-B4D8-4AF4-960A-3AA4574F90C6}" dt="2023-06-23T13:31:01.537" v="4576" actId="1076"/>
+        <pc:chgData name="Uderzo Marco" userId="5d25d1a0-8130-48db-a9f0-bed0112b2e0a" providerId="ADAL" clId="{C3DD1394-B4D8-4AF4-960A-3AA4574F90C6}" dt="2023-06-24T09:00:14.281" v="7234" actId="20577"/>
         <pc:sldMkLst>
           <pc:docMk/>
           <pc:sldMk cId="3339340731" sldId="273"/>
         </pc:sldMkLst>
         <pc:spChg chg="add mod">
-          <ac:chgData name="Uderzo Marco" userId="5d25d1a0-8130-48db-a9f0-bed0112b2e0a" providerId="ADAL" clId="{C3DD1394-B4D8-4AF4-960A-3AA4574F90C6}" dt="2023-06-23T13:30:55.766" v="4570" actId="14100"/>
+          <ac:chgData name="Uderzo Marco" userId="5d25d1a0-8130-48db-a9f0-bed0112b2e0a" providerId="ADAL" clId="{C3DD1394-B4D8-4AF4-960A-3AA4574F90C6}" dt="2023-06-24T08:59:40.776" v="7213" actId="1076"/>
           <ac:spMkLst>
             <pc:docMk/>
             <pc:sldMk cId="3339340731" sldId="273"/>
@@ -738,7 +847,7 @@
           </ac:spMkLst>
         </pc:spChg>
         <pc:spChg chg="mod">
-          <ac:chgData name="Uderzo Marco" userId="5d25d1a0-8130-48db-a9f0-bed0112b2e0a" providerId="ADAL" clId="{C3DD1394-B4D8-4AF4-960A-3AA4574F90C6}" dt="2023-06-23T13:28:51.793" v="4566" actId="115"/>
+          <ac:chgData name="Uderzo Marco" userId="5d25d1a0-8130-48db-a9f0-bed0112b2e0a" providerId="ADAL" clId="{C3DD1394-B4D8-4AF4-960A-3AA4574F90C6}" dt="2023-06-24T09:00:14.281" v="7234" actId="20577"/>
           <ac:spMkLst>
             <pc:docMk/>
             <pc:sldMk cId="3339340731" sldId="273"/>
@@ -754,7 +863,7 @@
           </ac:picMkLst>
         </pc:picChg>
         <pc:picChg chg="add mod">
-          <ac:chgData name="Uderzo Marco" userId="5d25d1a0-8130-48db-a9f0-bed0112b2e0a" providerId="ADAL" clId="{C3DD1394-B4D8-4AF4-960A-3AA4574F90C6}" dt="2023-06-23T13:31:01.537" v="4576" actId="1076"/>
+          <ac:chgData name="Uderzo Marco" userId="5d25d1a0-8130-48db-a9f0-bed0112b2e0a" providerId="ADAL" clId="{C3DD1394-B4D8-4AF4-960A-3AA4574F90C6}" dt="2023-06-24T08:59:30.192" v="7210" actId="1076"/>
           <ac:picMkLst>
             <pc:docMk/>
             <pc:sldMk cId="3339340731" sldId="273"/>
@@ -763,7 +872,7 @@
         </pc:picChg>
       </pc:sldChg>
       <pc:sldChg chg="addSp delSp modSp add mod ord">
-        <pc:chgData name="Uderzo Marco" userId="5d25d1a0-8130-48db-a9f0-bed0112b2e0a" providerId="ADAL" clId="{C3DD1394-B4D8-4AF4-960A-3AA4574F90C6}" dt="2023-06-23T09:39:58.138" v="3314" actId="20577"/>
+        <pc:chgData name="Uderzo Marco" userId="5d25d1a0-8130-48db-a9f0-bed0112b2e0a" providerId="ADAL" clId="{C3DD1394-B4D8-4AF4-960A-3AA4574F90C6}" dt="2023-06-24T07:10:26.657" v="5487" actId="20577"/>
         <pc:sldMkLst>
           <pc:docMk/>
           <pc:sldMk cId="247467842" sldId="274"/>
@@ -785,7 +894,7 @@
           </ac:spMkLst>
         </pc:spChg>
         <pc:spChg chg="mod">
-          <ac:chgData name="Uderzo Marco" userId="5d25d1a0-8130-48db-a9f0-bed0112b2e0a" providerId="ADAL" clId="{C3DD1394-B4D8-4AF4-960A-3AA4574F90C6}" dt="2023-06-23T09:28:21.922" v="3079" actId="20577"/>
+          <ac:chgData name="Uderzo Marco" userId="5d25d1a0-8130-48db-a9f0-bed0112b2e0a" providerId="ADAL" clId="{C3DD1394-B4D8-4AF4-960A-3AA4574F90C6}" dt="2023-06-24T07:10:26.657" v="5487" actId="20577"/>
           <ac:spMkLst>
             <pc:docMk/>
             <pc:sldMk cId="247467842" sldId="274"/>
@@ -817,7 +926,7 @@
         </pc:spChg>
       </pc:sldChg>
       <pc:sldChg chg="modSp add mod ord">
-        <pc:chgData name="Uderzo Marco" userId="5d25d1a0-8130-48db-a9f0-bed0112b2e0a" providerId="ADAL" clId="{C3DD1394-B4D8-4AF4-960A-3AA4574F90C6}" dt="2023-06-23T09:50:12.982" v="4148" actId="20577"/>
+        <pc:chgData name="Uderzo Marco" userId="5d25d1a0-8130-48db-a9f0-bed0112b2e0a" providerId="ADAL" clId="{C3DD1394-B4D8-4AF4-960A-3AA4574F90C6}" dt="2023-06-24T09:01:40.688" v="7255" actId="113"/>
         <pc:sldMkLst>
           <pc:docMk/>
           <pc:sldMk cId="1899438522" sldId="276"/>
@@ -831,7 +940,7 @@
           </ac:spMkLst>
         </pc:spChg>
         <pc:spChg chg="mod">
-          <ac:chgData name="Uderzo Marco" userId="5d25d1a0-8130-48db-a9f0-bed0112b2e0a" providerId="ADAL" clId="{C3DD1394-B4D8-4AF4-960A-3AA4574F90C6}" dt="2023-06-23T09:50:12.982" v="4148" actId="20577"/>
+          <ac:chgData name="Uderzo Marco" userId="5d25d1a0-8130-48db-a9f0-bed0112b2e0a" providerId="ADAL" clId="{C3DD1394-B4D8-4AF4-960A-3AA4574F90C6}" dt="2023-06-24T09:01:40.688" v="7255" actId="113"/>
           <ac:spMkLst>
             <pc:docMk/>
             <pc:sldMk cId="1899438522" sldId="276"/>
@@ -839,24 +948,201 @@
           </ac:spMkLst>
         </pc:spChg>
       </pc:sldChg>
-      <pc:sldChg chg="modSp add mod">
-        <pc:chgData name="Uderzo Marco" userId="5d25d1a0-8130-48db-a9f0-bed0112b2e0a" providerId="ADAL" clId="{C3DD1394-B4D8-4AF4-960A-3AA4574F90C6}" dt="2023-06-23T13:26:08.895" v="4521" actId="20577"/>
+      <pc:sldChg chg="addSp delSp modSp add mod">
+        <pc:chgData name="Uderzo Marco" userId="5d25d1a0-8130-48db-a9f0-bed0112b2e0a" providerId="ADAL" clId="{C3DD1394-B4D8-4AF4-960A-3AA4574F90C6}" dt="2023-06-24T09:04:12.792" v="7300" actId="20577"/>
         <pc:sldMkLst>
           <pc:docMk/>
           <pc:sldMk cId="2820540259" sldId="277"/>
         </pc:sldMkLst>
         <pc:spChg chg="mod">
-          <ac:chgData name="Uderzo Marco" userId="5d25d1a0-8130-48db-a9f0-bed0112b2e0a" providerId="ADAL" clId="{C3DD1394-B4D8-4AF4-960A-3AA4574F90C6}" dt="2023-06-23T13:26:08.895" v="4521" actId="20577"/>
+          <ac:chgData name="Uderzo Marco" userId="5d25d1a0-8130-48db-a9f0-bed0112b2e0a" providerId="ADAL" clId="{C3DD1394-B4D8-4AF4-960A-3AA4574F90C6}" dt="2023-06-24T07:17:21.817" v="5505" actId="20577"/>
           <ac:spMkLst>
             <pc:docMk/>
             <pc:sldMk cId="2820540259" sldId="277"/>
             <ac:spMk id="161" creationId="{00000000-0000-0000-0000-000000000000}"/>
           </ac:spMkLst>
         </pc:spChg>
+        <pc:spChg chg="mod">
+          <ac:chgData name="Uderzo Marco" userId="5d25d1a0-8130-48db-a9f0-bed0112b2e0a" providerId="ADAL" clId="{C3DD1394-B4D8-4AF4-960A-3AA4574F90C6}" dt="2023-06-24T09:04:12.792" v="7300" actId="20577"/>
+          <ac:spMkLst>
+            <pc:docMk/>
+            <pc:sldMk cId="2820540259" sldId="277"/>
+            <ac:spMk id="162" creationId="{00000000-0000-0000-0000-000000000000}"/>
+          </ac:spMkLst>
+        </pc:spChg>
+        <pc:picChg chg="add mod">
+          <ac:chgData name="Uderzo Marco" userId="5d25d1a0-8130-48db-a9f0-bed0112b2e0a" providerId="ADAL" clId="{C3DD1394-B4D8-4AF4-960A-3AA4574F90C6}" dt="2023-06-24T07:21:53.096" v="5677" actId="1076"/>
+          <ac:picMkLst>
+            <pc:docMk/>
+            <pc:sldMk cId="2820540259" sldId="277"/>
+            <ac:picMk id="3" creationId="{A240BECC-8300-9535-1309-82B674D00304}"/>
+          </ac:picMkLst>
+        </pc:picChg>
+        <pc:inkChg chg="add del">
+          <ac:chgData name="Uderzo Marco" userId="5d25d1a0-8130-48db-a9f0-bed0112b2e0a" providerId="ADAL" clId="{C3DD1394-B4D8-4AF4-960A-3AA4574F90C6}" dt="2023-06-24T07:22:08.938" v="5679" actId="9405"/>
+          <ac:inkMkLst>
+            <pc:docMk/>
+            <pc:sldMk cId="2820540259" sldId="277"/>
+            <ac:inkMk id="4" creationId="{71E4CC17-A7E2-B16D-E7AA-D75FEF887D49}"/>
+          </ac:inkMkLst>
+        </pc:inkChg>
+        <pc:inkChg chg="add">
+          <ac:chgData name="Uderzo Marco" userId="5d25d1a0-8130-48db-a9f0-bed0112b2e0a" providerId="ADAL" clId="{C3DD1394-B4D8-4AF4-960A-3AA4574F90C6}" dt="2023-06-24T07:22:16.317" v="5680" actId="9405"/>
+          <ac:inkMkLst>
+            <pc:docMk/>
+            <pc:sldMk cId="2820540259" sldId="277"/>
+            <ac:inkMk id="5" creationId="{143677B7-1678-044A-9CED-84A0320FE4EB}"/>
+          </ac:inkMkLst>
+        </pc:inkChg>
       </pc:sldChg>
+      <pc:sldChg chg="new add del">
+        <pc:chgData name="Uderzo Marco" userId="5d25d1a0-8130-48db-a9f0-bed0112b2e0a" providerId="ADAL" clId="{C3DD1394-B4D8-4AF4-960A-3AA4574F90C6}" dt="2023-06-24T06:04:26.581" v="4985" actId="680"/>
+        <pc:sldMkLst>
+          <pc:docMk/>
+          <pc:sldMk cId="351995185" sldId="278"/>
+        </pc:sldMkLst>
+      </pc:sldChg>
+      <pc:sldChg chg="addSp delSp modSp add mod">
+        <pc:chgData name="Uderzo Marco" userId="5d25d1a0-8130-48db-a9f0-bed0112b2e0a" providerId="ADAL" clId="{C3DD1394-B4D8-4AF4-960A-3AA4574F90C6}" dt="2023-06-24T09:01:05.216" v="7246" actId="20577"/>
+        <pc:sldMkLst>
+          <pc:docMk/>
+          <pc:sldMk cId="454970424" sldId="278"/>
+        </pc:sldMkLst>
+        <pc:spChg chg="del mod">
+          <ac:chgData name="Uderzo Marco" userId="5d25d1a0-8130-48db-a9f0-bed0112b2e0a" providerId="ADAL" clId="{C3DD1394-B4D8-4AF4-960A-3AA4574F90C6}" dt="2023-06-24T06:51:46.567" v="5088" actId="478"/>
+          <ac:spMkLst>
+            <pc:docMk/>
+            <pc:sldMk cId="454970424" sldId="278"/>
+            <ac:spMk id="2" creationId="{8B15CE1D-738B-26CF-AAEB-642FD4462BEB}"/>
+          </ac:spMkLst>
+        </pc:spChg>
+        <pc:spChg chg="mod">
+          <ac:chgData name="Uderzo Marco" userId="5d25d1a0-8130-48db-a9f0-bed0112b2e0a" providerId="ADAL" clId="{C3DD1394-B4D8-4AF4-960A-3AA4574F90C6}" dt="2023-06-24T06:51:09.734" v="5081" actId="20577"/>
+          <ac:spMkLst>
+            <pc:docMk/>
+            <pc:sldMk cId="454970424" sldId="278"/>
+            <ac:spMk id="161" creationId="{00000000-0000-0000-0000-000000000000}"/>
+          </ac:spMkLst>
+        </pc:spChg>
+        <pc:spChg chg="mod">
+          <ac:chgData name="Uderzo Marco" userId="5d25d1a0-8130-48db-a9f0-bed0112b2e0a" providerId="ADAL" clId="{C3DD1394-B4D8-4AF4-960A-3AA4574F90C6}" dt="2023-06-24T09:01:05.216" v="7246" actId="20577"/>
+          <ac:spMkLst>
+            <pc:docMk/>
+            <pc:sldMk cId="454970424" sldId="278"/>
+            <ac:spMk id="162" creationId="{00000000-0000-0000-0000-000000000000}"/>
+          </ac:spMkLst>
+        </pc:spChg>
+        <pc:picChg chg="add mod">
+          <ac:chgData name="Uderzo Marco" userId="5d25d1a0-8130-48db-a9f0-bed0112b2e0a" providerId="ADAL" clId="{C3DD1394-B4D8-4AF4-960A-3AA4574F90C6}" dt="2023-06-24T09:00:55.569" v="7243" actId="1076"/>
+          <ac:picMkLst>
+            <pc:docMk/>
+            <pc:sldMk cId="454970424" sldId="278"/>
+            <ac:picMk id="4" creationId="{E7FB9106-C269-D531-22B5-D88F282CDCD7}"/>
+          </ac:picMkLst>
+        </pc:picChg>
+        <pc:picChg chg="add mod">
+          <ac:chgData name="Uderzo Marco" userId="5d25d1a0-8130-48db-a9f0-bed0112b2e0a" providerId="ADAL" clId="{C3DD1394-B4D8-4AF4-960A-3AA4574F90C6}" dt="2023-06-24T09:00:49.940" v="7241" actId="1076"/>
+          <ac:picMkLst>
+            <pc:docMk/>
+            <pc:sldMk cId="454970424" sldId="278"/>
+            <ac:picMk id="1026" creationId="{D60701F7-1F02-1354-AFEF-51621AE7F5F1}"/>
+          </ac:picMkLst>
+        </pc:picChg>
+        <pc:picChg chg="del">
+          <ac:chgData name="Uderzo Marco" userId="5d25d1a0-8130-48db-a9f0-bed0112b2e0a" providerId="ADAL" clId="{C3DD1394-B4D8-4AF4-960A-3AA4574F90C6}" dt="2023-06-24T06:51:17.276" v="5082" actId="478"/>
+          <ac:picMkLst>
+            <pc:docMk/>
+            <pc:sldMk cId="454970424" sldId="278"/>
+            <ac:picMk id="3076" creationId="{BC71F6D5-0B84-57BA-935A-83049AF1DEDE}"/>
+          </ac:picMkLst>
+        </pc:picChg>
+      </pc:sldChg>
+      <pc:sldChg chg="delSp modSp add mod">
+        <pc:chgData name="Uderzo Marco" userId="5d25d1a0-8130-48db-a9f0-bed0112b2e0a" providerId="ADAL" clId="{C3DD1394-B4D8-4AF4-960A-3AA4574F90C6}" dt="2023-06-24T09:29:37.205" v="8656" actId="20577"/>
+        <pc:sldMkLst>
+          <pc:docMk/>
+          <pc:sldMk cId="3604238010" sldId="279"/>
+        </pc:sldMkLst>
+        <pc:spChg chg="mod">
+          <ac:chgData name="Uderzo Marco" userId="5d25d1a0-8130-48db-a9f0-bed0112b2e0a" providerId="ADAL" clId="{C3DD1394-B4D8-4AF4-960A-3AA4574F90C6}" dt="2023-06-24T09:05:07.543" v="7417" actId="20577"/>
+          <ac:spMkLst>
+            <pc:docMk/>
+            <pc:sldMk cId="3604238010" sldId="279"/>
+            <ac:spMk id="161" creationId="{00000000-0000-0000-0000-000000000000}"/>
+          </ac:spMkLst>
+        </pc:spChg>
+        <pc:spChg chg="mod">
+          <ac:chgData name="Uderzo Marco" userId="5d25d1a0-8130-48db-a9f0-bed0112b2e0a" providerId="ADAL" clId="{C3DD1394-B4D8-4AF4-960A-3AA4574F90C6}" dt="2023-06-24T09:29:37.205" v="8656" actId="20577"/>
+          <ac:spMkLst>
+            <pc:docMk/>
+            <pc:sldMk cId="3604238010" sldId="279"/>
+            <ac:spMk id="162" creationId="{00000000-0000-0000-0000-000000000000}"/>
+          </ac:spMkLst>
+        </pc:spChg>
+        <pc:picChg chg="del">
+          <ac:chgData name="Uderzo Marco" userId="5d25d1a0-8130-48db-a9f0-bed0112b2e0a" providerId="ADAL" clId="{C3DD1394-B4D8-4AF4-960A-3AA4574F90C6}" dt="2023-06-24T09:03:14.437" v="7258" actId="478"/>
+          <ac:picMkLst>
+            <pc:docMk/>
+            <pc:sldMk cId="3604238010" sldId="279"/>
+            <ac:picMk id="4" creationId="{E7FB9106-C269-D531-22B5-D88F282CDCD7}"/>
+          </ac:picMkLst>
+        </pc:picChg>
+        <pc:picChg chg="del">
+          <ac:chgData name="Uderzo Marco" userId="5d25d1a0-8130-48db-a9f0-bed0112b2e0a" providerId="ADAL" clId="{C3DD1394-B4D8-4AF4-960A-3AA4574F90C6}" dt="2023-06-24T09:03:09.197" v="7257" actId="478"/>
+          <ac:picMkLst>
+            <pc:docMk/>
+            <pc:sldMk cId="3604238010" sldId="279"/>
+            <ac:picMk id="1026" creationId="{D60701F7-1F02-1354-AFEF-51621AE7F5F1}"/>
+          </ac:picMkLst>
+        </pc:picChg>
+      </pc:sldChg>
+      <pc:sldMasterChg chg="addSldLayout delSldLayout">
+        <pc:chgData name="Uderzo Marco" userId="5d25d1a0-8130-48db-a9f0-bed0112b2e0a" providerId="ADAL" clId="{C3DD1394-B4D8-4AF4-960A-3AA4574F90C6}" dt="2023-06-24T06:04:26.254" v="4984" actId="47"/>
+        <pc:sldMasterMkLst>
+          <pc:docMk/>
+          <pc:sldMasterMk cId="0" sldId="2147483664"/>
+        </pc:sldMasterMkLst>
+        <pc:sldLayoutChg chg="add del">
+          <pc:chgData name="Uderzo Marco" userId="5d25d1a0-8130-48db-a9f0-bed0112b2e0a" providerId="ADAL" clId="{C3DD1394-B4D8-4AF4-960A-3AA4574F90C6}" dt="2023-06-24T06:04:26.254" v="4984" actId="47"/>
+          <pc:sldLayoutMkLst>
+            <pc:docMk/>
+            <pc:sldMasterMk cId="0" sldId="2147483664"/>
+            <pc:sldLayoutMk cId="0" sldId="2147483649"/>
+          </pc:sldLayoutMkLst>
+        </pc:sldLayoutChg>
+      </pc:sldMasterChg>
     </pc:docChg>
   </pc:docChgLst>
 </pc:chgInfo>
+</file>
+
+<file path=ppt/ink/ink1.xml><?xml version="1.0" encoding="utf-8"?>
+<inkml:ink xmlns:inkml="http://www.w3.org/2003/InkML">
+  <inkml:definitions>
+    <inkml:context xml:id="ctx0">
+      <inkml:inkSource xml:id="inkSrc0">
+        <inkml:traceFormat>
+          <inkml:channel name="X" type="integer" min="-2.14748E9" max="2.14748E9" units="cm"/>
+          <inkml:channel name="Y" type="integer" min="-2.14748E9" max="2.14748E9" units="cm"/>
+        </inkml:traceFormat>
+        <inkml:channelProperties>
+          <inkml:channelProperty channel="X" name="resolution" value="1000" units="1/cm"/>
+          <inkml:channelProperty channel="Y" name="resolution" value="1000" units="1/cm"/>
+        </inkml:channelProperties>
+      </inkml:inkSource>
+      <inkml:timestamp xml:id="ts0" timeString="2023-06-24T07:22:16.316"/>
+    </inkml:context>
+    <inkml:brush xml:id="br0">
+      <inkml:brushProperty name="width" value="0.3" units="cm"/>
+      <inkml:brushProperty name="height" value="0.6" units="cm"/>
+      <inkml:brushProperty name="color" value="#00F900"/>
+      <inkml:brushProperty name="tip" value="rectangle"/>
+      <inkml:brushProperty name="rasterOp" value="maskPen"/>
+      <inkml:brushProperty name="ignorePressure" value="1"/>
+    </inkml:brush>
+  </inkml:definitions>
+  <inkml:trace contextRef="#ctx0" brushRef="#br0">1 0,'443'0,"-431"1,0 0,23 6,-22-4,0-1,16 2,437-3,-227-3,580 2,-805 0</inkml:trace>
+</inkml:ink>
 </file>
 
 <file path=ppt/notesMasters/notesMaster1.xml><?xml version="1.0" encoding="utf-8"?>
@@ -1582,7 +1868,7 @@
     </p:spTree>
     <p:extLst>
       <p:ext uri="{BB962C8B-B14F-4D97-AF65-F5344CB8AC3E}">
-        <p14:creationId xmlns:p14="http://schemas.microsoft.com/office/powerpoint/2010/main" val="3612183321"/>
+        <p14:creationId xmlns:p14="http://schemas.microsoft.com/office/powerpoint/2010/main" val="2375574034"/>
       </p:ext>
     </p:extLst>
   </p:cSld>
@@ -1691,7 +1977,7 @@
     </p:spTree>
     <p:extLst>
       <p:ext uri="{BB962C8B-B14F-4D97-AF65-F5344CB8AC3E}">
-        <p14:creationId xmlns:p14="http://schemas.microsoft.com/office/powerpoint/2010/main" val="2375574034"/>
+        <p14:creationId xmlns:p14="http://schemas.microsoft.com/office/powerpoint/2010/main" val="3612183321"/>
       </p:ext>
     </p:extLst>
   </p:cSld>
@@ -2128,6 +2414,224 @@
     <p:extLst>
       <p:ext uri="{BB962C8B-B14F-4D97-AF65-F5344CB8AC3E}">
         <p14:creationId xmlns:p14="http://schemas.microsoft.com/office/powerpoint/2010/main" val="4125534535"/>
+      </p:ext>
+    </p:extLst>
+  </p:cSld>
+  <p:clrMapOvr>
+    <a:masterClrMapping/>
+  </p:clrMapOvr>
+</p:notes>
+</file>
+
+<file path=ppt/notesSlides/notesSlide18.xml><?xml version="1.0" encoding="utf-8"?>
+<p:notes xmlns:a="http://schemas.openxmlformats.org/drawingml/2006/main" xmlns:r="http://schemas.openxmlformats.org/officeDocument/2006/relationships" xmlns:p="http://schemas.openxmlformats.org/presentationml/2006/main" showMasterSp="0" showMasterPhAnim="0">
+  <p:cSld>
+    <p:spTree>
+      <p:nvGrpSpPr>
+        <p:cNvPr id="1" name="Shape 157"/>
+        <p:cNvGrpSpPr/>
+        <p:nvPr/>
+      </p:nvGrpSpPr>
+      <p:grpSpPr>
+        <a:xfrm>
+          <a:off x="0" y="0"/>
+          <a:ext cx="0" cy="0"/>
+          <a:chOff x="0" y="0"/>
+          <a:chExt cx="0" cy="0"/>
+        </a:xfrm>
+      </p:grpSpPr>
+      <p:sp>
+        <p:nvSpPr>
+          <p:cNvPr id="158" name="Shape 158"/>
+          <p:cNvSpPr>
+            <a:spLocks noGrp="1" noRot="1" noChangeAspect="1"/>
+          </p:cNvSpPr>
+          <p:nvPr>
+            <p:ph type="sldImg" idx="2"/>
+          </p:nvPr>
+        </p:nvSpPr>
+        <p:spPr>
+          <a:xfrm>
+            <a:off x="1143000" y="685800"/>
+            <a:ext cx="4572000" cy="3429000"/>
+          </a:xfrm>
+          <a:custGeom>
+            <a:avLst/>
+            <a:gdLst/>
+            <a:ahLst/>
+            <a:cxnLst/>
+            <a:rect l="0" t="0" r="0" b="0"/>
+            <a:pathLst>
+              <a:path w="120000" h="120000" extrusionOk="0">
+                <a:moveTo>
+                  <a:pt x="0" y="0"/>
+                </a:moveTo>
+                <a:lnTo>
+                  <a:pt x="120000" y="0"/>
+                </a:lnTo>
+                <a:lnTo>
+                  <a:pt x="120000" y="120000"/>
+                </a:lnTo>
+                <a:lnTo>
+                  <a:pt x="0" y="120000"/>
+                </a:lnTo>
+                <a:close/>
+              </a:path>
+            </a:pathLst>
+          </a:custGeom>
+        </p:spPr>
+      </p:sp>
+      <p:sp>
+        <p:nvSpPr>
+          <p:cNvPr id="159" name="Shape 159"/>
+          <p:cNvSpPr txBox="1">
+            <a:spLocks noGrp="1"/>
+          </p:cNvSpPr>
+          <p:nvPr>
+            <p:ph type="body" idx="1"/>
+          </p:nvPr>
+        </p:nvSpPr>
+        <p:spPr>
+          <a:xfrm>
+            <a:off x="685800" y="4343400"/>
+            <a:ext cx="5486400" cy="4114800"/>
+          </a:xfrm>
+          <a:prstGeom prst="rect">
+            <a:avLst/>
+          </a:prstGeom>
+        </p:spPr>
+        <p:txBody>
+          <a:bodyPr spcFirstLastPara="1" wrap="square" lIns="91425" tIns="91425" rIns="91425" bIns="91425" anchor="t" anchorCtr="0">
+            <a:noAutofit/>
+          </a:bodyPr>
+          <a:lstStyle/>
+          <a:p>
+            <a:pPr marL="0" lvl="0" indent="0">
+              <a:spcBef>
+                <a:spcPts val="0"/>
+              </a:spcBef>
+              <a:spcAft>
+                <a:spcPts val="0"/>
+              </a:spcAft>
+              <a:buNone/>
+            </a:pPr>
+            <a:endParaRPr dirty="0"/>
+          </a:p>
+        </p:txBody>
+      </p:sp>
+    </p:spTree>
+    <p:extLst>
+      <p:ext uri="{BB962C8B-B14F-4D97-AF65-F5344CB8AC3E}">
+        <p14:creationId xmlns:p14="http://schemas.microsoft.com/office/powerpoint/2010/main" val="2941503714"/>
+      </p:ext>
+    </p:extLst>
+  </p:cSld>
+  <p:clrMapOvr>
+    <a:masterClrMapping/>
+  </p:clrMapOvr>
+</p:notes>
+</file>
+
+<file path=ppt/notesSlides/notesSlide19.xml><?xml version="1.0" encoding="utf-8"?>
+<p:notes xmlns:a="http://schemas.openxmlformats.org/drawingml/2006/main" xmlns:r="http://schemas.openxmlformats.org/officeDocument/2006/relationships" xmlns:p="http://schemas.openxmlformats.org/presentationml/2006/main" showMasterSp="0" showMasterPhAnim="0">
+  <p:cSld>
+    <p:spTree>
+      <p:nvGrpSpPr>
+        <p:cNvPr id="1" name="Shape 157"/>
+        <p:cNvGrpSpPr/>
+        <p:nvPr/>
+      </p:nvGrpSpPr>
+      <p:grpSpPr>
+        <a:xfrm>
+          <a:off x="0" y="0"/>
+          <a:ext cx="0" cy="0"/>
+          <a:chOff x="0" y="0"/>
+          <a:chExt cx="0" cy="0"/>
+        </a:xfrm>
+      </p:grpSpPr>
+      <p:sp>
+        <p:nvSpPr>
+          <p:cNvPr id="158" name="Shape 158"/>
+          <p:cNvSpPr>
+            <a:spLocks noGrp="1" noRot="1" noChangeAspect="1"/>
+          </p:cNvSpPr>
+          <p:nvPr>
+            <p:ph type="sldImg" idx="2"/>
+          </p:nvPr>
+        </p:nvSpPr>
+        <p:spPr>
+          <a:xfrm>
+            <a:off x="1143000" y="685800"/>
+            <a:ext cx="4572000" cy="3429000"/>
+          </a:xfrm>
+          <a:custGeom>
+            <a:avLst/>
+            <a:gdLst/>
+            <a:ahLst/>
+            <a:cxnLst/>
+            <a:rect l="0" t="0" r="0" b="0"/>
+            <a:pathLst>
+              <a:path w="120000" h="120000" extrusionOk="0">
+                <a:moveTo>
+                  <a:pt x="0" y="0"/>
+                </a:moveTo>
+                <a:lnTo>
+                  <a:pt x="120000" y="0"/>
+                </a:lnTo>
+                <a:lnTo>
+                  <a:pt x="120000" y="120000"/>
+                </a:lnTo>
+                <a:lnTo>
+                  <a:pt x="0" y="120000"/>
+                </a:lnTo>
+                <a:close/>
+              </a:path>
+            </a:pathLst>
+          </a:custGeom>
+        </p:spPr>
+      </p:sp>
+      <p:sp>
+        <p:nvSpPr>
+          <p:cNvPr id="159" name="Shape 159"/>
+          <p:cNvSpPr txBox="1">
+            <a:spLocks noGrp="1"/>
+          </p:cNvSpPr>
+          <p:nvPr>
+            <p:ph type="body" idx="1"/>
+          </p:nvPr>
+        </p:nvSpPr>
+        <p:spPr>
+          <a:xfrm>
+            <a:off x="685800" y="4343400"/>
+            <a:ext cx="5486400" cy="4114800"/>
+          </a:xfrm>
+          <a:prstGeom prst="rect">
+            <a:avLst/>
+          </a:prstGeom>
+        </p:spPr>
+        <p:txBody>
+          <a:bodyPr spcFirstLastPara="1" wrap="square" lIns="91425" tIns="91425" rIns="91425" bIns="91425" anchor="t" anchorCtr="0">
+            <a:noAutofit/>
+          </a:bodyPr>
+          <a:lstStyle/>
+          <a:p>
+            <a:pPr marL="0" lvl="0" indent="0">
+              <a:spcBef>
+                <a:spcPts val="0"/>
+              </a:spcBef>
+              <a:spcAft>
+                <a:spcPts val="0"/>
+              </a:spcAft>
+              <a:buNone/>
+            </a:pPr>
+            <a:endParaRPr dirty="0"/>
+          </a:p>
+        </p:txBody>
+      </p:sp>
+    </p:spTree>
+    <p:extLst>
+      <p:ext uri="{BB962C8B-B14F-4D97-AF65-F5344CB8AC3E}">
+        <p14:creationId xmlns:p14="http://schemas.microsoft.com/office/powerpoint/2010/main" val="1224363557"/>
       </p:ext>
     </p:extLst>
   </p:cSld>
@@ -10325,7 +10829,7 @@
                 <a:srgbClr val="333333"/>
               </a:solidFill>
               <a:effectLst/>
-              <a:latin typeface="Helvetica Neue"/>
+              <a:latin typeface="Bahnschrift SemiLight" panose="020B0502040204020203" pitchFamily="34" charset="0"/>
             </a:endParaRPr>
           </a:p>
           <a:p>
@@ -10340,7 +10844,7 @@
                   <a:srgbClr val="333333"/>
                 </a:solidFill>
                 <a:effectLst/>
-                <a:latin typeface="Helvetica Neue"/>
+                <a:latin typeface="Bahnschrift SemiLight" panose="020B0502040204020203" pitchFamily="34" charset="0"/>
               </a:rPr>
               <a:t>Logistic Regression is the easiest and most common model to perform binary classification. </a:t>
             </a:r>
@@ -10357,7 +10861,7 @@
                   <a:srgbClr val="333333"/>
                 </a:solidFill>
                 <a:effectLst/>
-                <a:latin typeface="Helvetica Neue"/>
+                <a:latin typeface="Bahnschrift SemiLight" panose="020B0502040204020203" pitchFamily="34" charset="0"/>
               </a:rPr>
               <a:t>The goal is to predict whether or not a patient has CHD</a:t>
             </a:r>
@@ -10373,7 +10877,7 @@
                 <a:solidFill>
                   <a:srgbClr val="333333"/>
                 </a:solidFill>
-                <a:latin typeface="Helvetica Neue"/>
+                <a:latin typeface="Bahnschrift SemiLight" panose="020B0502040204020203" pitchFamily="34" charset="0"/>
               </a:rPr>
               <a:t>VIF: We consider the Variance Inflation Factor to assess multicollinearity</a:t>
             </a:r>
@@ -10389,7 +10893,7 @@
                 <a:solidFill>
                   <a:srgbClr val="333333"/>
                 </a:solidFill>
-                <a:latin typeface="Helvetica Neue"/>
+                <a:latin typeface="Bahnschrift SemiLight" panose="020B0502040204020203" pitchFamily="34" charset="0"/>
               </a:rPr>
               <a:t>All predictors are included</a:t>
             </a:r>
@@ -10405,9 +10909,9 @@
                 <a:solidFill>
                   <a:srgbClr val="333333"/>
                 </a:solidFill>
-                <a:latin typeface="Helvetica Neue"/>
-              </a:rPr>
-              <a:t>Threshold selection not optimized</a:t>
+                <a:latin typeface="Bahnschrift SemiLight" panose="020B0502040204020203" pitchFamily="34" charset="0"/>
+              </a:rPr>
+              <a:t>Threshold selection initially not optimized</a:t>
             </a:r>
           </a:p>
           <a:p>
@@ -10421,7 +10925,7 @@
               <a:solidFill>
                 <a:srgbClr val="333333"/>
               </a:solidFill>
-              <a:latin typeface="Helvetica Neue"/>
+              <a:latin typeface="Bahnschrift SemiLight" panose="020B0502040204020203" pitchFamily="34" charset="0"/>
             </a:endParaRPr>
           </a:p>
           <a:p>
@@ -10434,7 +10938,7 @@
               <a:solidFill>
                 <a:srgbClr val="333333"/>
               </a:solidFill>
-              <a:latin typeface="Helvetica Neue"/>
+              <a:latin typeface="Bahnschrift SemiLight" panose="020B0502040204020203" pitchFamily="34" charset="0"/>
             </a:endParaRPr>
           </a:p>
         </p:txBody>
@@ -10800,7 +11304,7 @@
         <p:spPr>
           <a:xfrm>
             <a:off x="0" y="1049154"/>
-            <a:ext cx="5040489" cy="5808846"/>
+            <a:ext cx="5474126" cy="5808846"/>
           </a:xfrm>
           <a:prstGeom prst="rect">
             <a:avLst/>
@@ -10822,16 +11326,32 @@
                 <a:solidFill>
                   <a:srgbClr val="333333"/>
                 </a:solidFill>
-                <a:latin typeface="Helvetica Neue"/>
-              </a:rPr>
-              <a:t>Removed Predictors: Age, </a:t>
+                <a:latin typeface="Bahnschrift SemiLight" panose="020B0502040204020203" pitchFamily="34" charset="0"/>
+              </a:rPr>
+              <a:t>Removed Predictors: </a:t>
+            </a:r>
+          </a:p>
+          <a:p>
+            <a:pPr marL="800100" lvl="1" indent="-342900">
+              <a:spcAft>
+                <a:spcPts val="1300"/>
+              </a:spcAft>
+            </a:pPr>
+            <a:r>
+              <a:rPr lang="en-US" sz="1800" dirty="0">
+                <a:solidFill>
+                  <a:srgbClr val="333333"/>
+                </a:solidFill>
+                <a:latin typeface="Bahnschrift SemiLight" panose="020B0502040204020203" pitchFamily="34" charset="0"/>
+              </a:rPr>
+              <a:t>Age, </a:t>
             </a:r>
             <a:r>
               <a:rPr lang="en-US" sz="1800" dirty="0" err="1">
                 <a:solidFill>
                   <a:srgbClr val="333333"/>
                 </a:solidFill>
-                <a:latin typeface="Helvetica Neue"/>
+                <a:latin typeface="Bahnschrift SemiLight" panose="020B0502040204020203" pitchFamily="34" charset="0"/>
               </a:rPr>
               <a:t>RestingECG</a:t>
             </a:r>
@@ -10840,7 +11360,7 @@
                 <a:solidFill>
                   <a:srgbClr val="333333"/>
                 </a:solidFill>
-                <a:latin typeface="Helvetica Neue"/>
+                <a:latin typeface="Bahnschrift SemiLight" panose="020B0502040204020203" pitchFamily="34" charset="0"/>
               </a:rPr>
               <a:t>, </a:t>
             </a:r>
@@ -10849,7 +11369,7 @@
                 <a:solidFill>
                   <a:srgbClr val="333333"/>
                 </a:solidFill>
-                <a:latin typeface="Helvetica Neue"/>
+                <a:latin typeface="Bahnschrift SemiLight" panose="020B0502040204020203" pitchFamily="34" charset="0"/>
               </a:rPr>
               <a:t>MaxHR</a:t>
             </a:r>
@@ -10858,7 +11378,7 @@
                 <a:solidFill>
                   <a:srgbClr val="333333"/>
                 </a:solidFill>
-                <a:latin typeface="Helvetica Neue"/>
+                <a:latin typeface="Bahnschrift SemiLight" panose="020B0502040204020203" pitchFamily="34" charset="0"/>
               </a:rPr>
               <a:t>, </a:t>
             </a:r>
@@ -10867,144 +11387,205 @@
                 <a:solidFill>
                   <a:srgbClr val="333333"/>
                 </a:solidFill>
-                <a:latin typeface="Helvetica Neue"/>
+                <a:latin typeface="Bahnschrift SemiLight" panose="020B0502040204020203" pitchFamily="34" charset="0"/>
               </a:rPr>
               <a:t>RestingBP</a:t>
             </a:r>
-            <a:r>
-              <a:rPr lang="en-US" sz="1800" dirty="0">
-                <a:solidFill>
-                  <a:srgbClr val="333333"/>
-                </a:solidFill>
-                <a:latin typeface="Helvetica Neue"/>
-              </a:rPr>
-              <a:t>, </a:t>
-            </a:r>
-            <a:r>
-              <a:rPr lang="en-US" sz="1800" dirty="0" err="1">
-                <a:solidFill>
-                  <a:srgbClr val="333333"/>
-                </a:solidFill>
-                <a:latin typeface="Helvetica Neue"/>
-              </a:rPr>
-              <a:t>ST_SlopeUp</a:t>
-            </a:r>
-            <a:r>
-              <a:rPr lang="en-US" sz="1800" dirty="0">
-                <a:solidFill>
-                  <a:srgbClr val="333333"/>
-                </a:solidFill>
-                <a:latin typeface="Helvetica Neue"/>
-              </a:rPr>
-              <a:t>(?)</a:t>
-            </a:r>
-          </a:p>
-          <a:p>
-            <a:pPr marL="342900" indent="-342900">
-              <a:spcAft>
-                <a:spcPts val="1300"/>
-              </a:spcAft>
-            </a:pPr>
-            <a:r>
-              <a:rPr lang="en-US" sz="1800" dirty="0">
-                <a:solidFill>
-                  <a:srgbClr val="333333"/>
-                </a:solidFill>
-                <a:latin typeface="Helvetica Neue"/>
-              </a:rPr>
-              <a:t>Considerations:</a:t>
-            </a:r>
-          </a:p>
-          <a:p>
-            <a:pPr marL="800100" lvl="1" indent="-342900">
-              <a:spcAft>
-                <a:spcPts val="1300"/>
-              </a:spcAft>
-            </a:pPr>
-            <a:r>
-              <a:rPr lang="en-US" sz="1800" dirty="0" err="1">
-                <a:solidFill>
-                  <a:srgbClr val="333333"/>
-                </a:solidFill>
-                <a:latin typeface="Helvetica Neue"/>
-              </a:rPr>
-              <a:t>RestingBP</a:t>
-            </a:r>
-            <a:r>
-              <a:rPr lang="en-US" sz="1800" dirty="0">
-                <a:solidFill>
-                  <a:srgbClr val="333333"/>
-                </a:solidFill>
-                <a:latin typeface="Helvetica Neue"/>
-              </a:rPr>
-              <a:t> only contains systolic BP</a:t>
-            </a:r>
-          </a:p>
-          <a:p>
-            <a:pPr marL="800100" lvl="1" indent="-342900">
-              <a:spcAft>
-                <a:spcPts val="1300"/>
-              </a:spcAft>
-            </a:pPr>
-            <a:r>
-              <a:rPr lang="en-US" sz="1800" dirty="0" err="1">
-                <a:solidFill>
-                  <a:srgbClr val="333333"/>
-                </a:solidFill>
-                <a:latin typeface="Helvetica Neue"/>
-              </a:rPr>
-              <a:t>MaxHR</a:t>
-            </a:r>
-            <a:r>
-              <a:rPr lang="en-US" sz="1800" dirty="0">
-                <a:solidFill>
-                  <a:srgbClr val="333333"/>
-                </a:solidFill>
-                <a:latin typeface="Helvetica Neue"/>
-              </a:rPr>
-              <a:t> could be useful to assess heart functioning at rest</a:t>
-            </a:r>
-          </a:p>
-          <a:p>
-            <a:pPr marL="800100" lvl="1" indent="-342900">
-              <a:spcAft>
-                <a:spcPts val="1300"/>
-              </a:spcAft>
-            </a:pPr>
-            <a:r>
-              <a:rPr lang="en-US" sz="1800" dirty="0" err="1">
-                <a:solidFill>
-                  <a:srgbClr val="333333"/>
-                </a:solidFill>
-                <a:latin typeface="Helvetica Neue"/>
-              </a:rPr>
-              <a:t>ST_SlopeUp</a:t>
-            </a:r>
-            <a:r>
-              <a:rPr lang="en-US" sz="1800" dirty="0">
-                <a:solidFill>
-                  <a:srgbClr val="333333"/>
-                </a:solidFill>
-                <a:latin typeface="Helvetica Neue"/>
-              </a:rPr>
-              <a:t> should be a good predictor of CHD</a:t>
-            </a:r>
-          </a:p>
-          <a:p>
-            <a:pPr marL="800100" lvl="1" indent="-342900">
-              <a:spcAft>
-                <a:spcPts val="1300"/>
-              </a:spcAft>
-            </a:pPr>
             <a:endParaRPr lang="en-US" sz="1800" dirty="0">
               <a:solidFill>
                 <a:srgbClr val="333333"/>
               </a:solidFill>
-              <a:latin typeface="Helvetica Neue"/>
+              <a:latin typeface="Bahnschrift SemiLight" panose="020B0502040204020203" pitchFamily="34" charset="0"/>
             </a:endParaRPr>
           </a:p>
           <a:p>
             <a:pPr marL="342900" indent="-342900">
+              <a:spcAft>
+                <a:spcPts val="1300"/>
+              </a:spcAft>
+            </a:pPr>
+            <a:r>
+              <a:rPr lang="en-US" sz="1800" dirty="0">
+                <a:solidFill>
+                  <a:srgbClr val="333333"/>
+                </a:solidFill>
+                <a:latin typeface="Bahnschrift SemiLight" panose="020B0502040204020203" pitchFamily="34" charset="0"/>
+              </a:rPr>
+              <a:t>Best Predictors (p &lt;= 0.001):</a:t>
+            </a:r>
+          </a:p>
+          <a:p>
+            <a:pPr marL="800100" lvl="1" indent="-342900">
+              <a:spcAft>
+                <a:spcPts val="1300"/>
+              </a:spcAft>
+            </a:pPr>
+            <a:r>
+              <a:rPr lang="en-US" sz="1800" dirty="0" err="1">
+                <a:solidFill>
+                  <a:srgbClr val="333333"/>
+                </a:solidFill>
+                <a:latin typeface="Bahnschrift SemiLight" panose="020B0502040204020203" pitchFamily="34" charset="0"/>
+              </a:rPr>
+              <a:t>SexM</a:t>
+            </a:r>
+            <a:r>
+              <a:rPr lang="en-US" sz="1800" dirty="0">
+                <a:solidFill>
+                  <a:srgbClr val="333333"/>
+                </a:solidFill>
+                <a:latin typeface="Bahnschrift SemiLight" panose="020B0502040204020203" pitchFamily="34" charset="0"/>
+              </a:rPr>
+              <a:t>, </a:t>
+            </a:r>
+            <a:r>
+              <a:rPr lang="en-US" sz="1800" dirty="0" err="1">
+                <a:solidFill>
+                  <a:srgbClr val="333333"/>
+                </a:solidFill>
+                <a:latin typeface="Bahnschrift SemiLight" panose="020B0502040204020203" pitchFamily="34" charset="0"/>
+              </a:rPr>
+              <a:t>ChestPainType</a:t>
+            </a:r>
+            <a:r>
+              <a:rPr lang="en-US" sz="1800" dirty="0">
+                <a:solidFill>
+                  <a:srgbClr val="333333"/>
+                </a:solidFill>
+                <a:latin typeface="Bahnschrift SemiLight" panose="020B0502040204020203" pitchFamily="34" charset="0"/>
+              </a:rPr>
+              <a:t>[“ATA”, “NAP”], </a:t>
+            </a:r>
+            <a:r>
+              <a:rPr lang="en-US" sz="1800" dirty="0" err="1">
+                <a:solidFill>
+                  <a:srgbClr val="333333"/>
+                </a:solidFill>
+                <a:latin typeface="Bahnschrift SemiLight" panose="020B0502040204020203" pitchFamily="34" charset="0"/>
+              </a:rPr>
+              <a:t>FastingBS</a:t>
+            </a:r>
+            <a:r>
+              <a:rPr lang="en-US" sz="1800" dirty="0">
+                <a:solidFill>
+                  <a:srgbClr val="333333"/>
+                </a:solidFill>
+                <a:latin typeface="Bahnschrift SemiLight" panose="020B0502040204020203" pitchFamily="34" charset="0"/>
+              </a:rPr>
+              <a:t>, </a:t>
+            </a:r>
+            <a:r>
+              <a:rPr lang="en-US" sz="1800" dirty="0" err="1">
+                <a:solidFill>
+                  <a:srgbClr val="333333"/>
+                </a:solidFill>
+                <a:latin typeface="Bahnschrift SemiLight" panose="020B0502040204020203" pitchFamily="34" charset="0"/>
+              </a:rPr>
+              <a:t>Oldpeak</a:t>
+            </a:r>
+            <a:r>
+              <a:rPr lang="en-US" sz="1800" dirty="0">
+                <a:solidFill>
+                  <a:srgbClr val="333333"/>
+                </a:solidFill>
+                <a:latin typeface="Bahnschrift SemiLight" panose="020B0502040204020203" pitchFamily="34" charset="0"/>
+              </a:rPr>
+              <a:t> </a:t>
+            </a:r>
+          </a:p>
+          <a:p>
+            <a:pPr marL="342900" indent="-342900">
+              <a:spcAft>
+                <a:spcPts val="1300"/>
+              </a:spcAft>
+            </a:pPr>
+            <a:r>
+              <a:rPr lang="en-US" sz="1800" dirty="0">
+                <a:solidFill>
+                  <a:srgbClr val="333333"/>
+                </a:solidFill>
+                <a:latin typeface="Bahnschrift SemiLight" panose="020B0502040204020203" pitchFamily="34" charset="0"/>
+              </a:rPr>
+              <a:t>Considerations:</a:t>
+            </a:r>
+          </a:p>
+          <a:p>
+            <a:pPr marL="800100" lvl="1" indent="-342900">
+              <a:spcAft>
+                <a:spcPts val="1300"/>
+              </a:spcAft>
+            </a:pPr>
+            <a:r>
+              <a:rPr lang="en-US" sz="1800" dirty="0" err="1">
+                <a:solidFill>
+                  <a:srgbClr val="333333"/>
+                </a:solidFill>
+                <a:latin typeface="Bahnschrift SemiLight" panose="020B0502040204020203" pitchFamily="34" charset="0"/>
+              </a:rPr>
+              <a:t>RestingBP</a:t>
+            </a:r>
+            <a:r>
+              <a:rPr lang="en-US" sz="1800" dirty="0">
+                <a:solidFill>
+                  <a:srgbClr val="333333"/>
+                </a:solidFill>
+                <a:latin typeface="Bahnschrift SemiLight" panose="020B0502040204020203" pitchFamily="34" charset="0"/>
+              </a:rPr>
+              <a:t> only contains systolic BP, not considering diastolic and pulse pressure</a:t>
+            </a:r>
+          </a:p>
+          <a:p>
+            <a:pPr marL="800100" lvl="1" indent="-342900">
+              <a:spcAft>
+                <a:spcPts val="1300"/>
+              </a:spcAft>
+            </a:pPr>
+            <a:r>
+              <a:rPr lang="en-US" sz="1800" dirty="0" err="1">
+                <a:solidFill>
+                  <a:srgbClr val="333333"/>
+                </a:solidFill>
+                <a:latin typeface="Bahnschrift SemiLight" panose="020B0502040204020203" pitchFamily="34" charset="0"/>
+              </a:rPr>
+              <a:t>MaxHR</a:t>
+            </a:r>
+            <a:r>
+              <a:rPr lang="en-US" sz="1800" dirty="0">
+                <a:solidFill>
+                  <a:srgbClr val="333333"/>
+                </a:solidFill>
+                <a:latin typeface="Bahnschrift SemiLight" panose="020B0502040204020203" pitchFamily="34" charset="0"/>
+              </a:rPr>
+              <a:t> could be useful to assess heart functioning at rest</a:t>
+            </a:r>
+          </a:p>
+          <a:p>
+            <a:pPr marL="800100" lvl="1" indent="-342900">
+              <a:spcAft>
+                <a:spcPts val="1300"/>
+              </a:spcAft>
+            </a:pPr>
+            <a:r>
+              <a:rPr lang="en-US" sz="1800" dirty="0" err="1">
+                <a:solidFill>
+                  <a:srgbClr val="333333"/>
+                </a:solidFill>
+                <a:latin typeface="Bahnschrift SemiLight" panose="020B0502040204020203" pitchFamily="34" charset="0"/>
+              </a:rPr>
+              <a:t>ST_SlopeUp</a:t>
+            </a:r>
+            <a:r>
+              <a:rPr lang="en-US" sz="1800" dirty="0">
+                <a:solidFill>
+                  <a:srgbClr val="333333"/>
+                </a:solidFill>
+                <a:latin typeface="Bahnschrift SemiLight" panose="020B0502040204020203" pitchFamily="34" charset="0"/>
+              </a:rPr>
+              <a:t> (ST segment elevation) is a good predictor of CHD, so we kept it despite p-value &gt; 0.05</a:t>
+            </a:r>
+          </a:p>
+          <a:p>
+            <a:pPr marL="800100" lvl="1" indent="-342900">
               <a:spcAft>
                 <a:spcPts val="1300"/>
               </a:spcAft>
@@ -11013,7 +11594,7 @@
               <a:solidFill>
                 <a:srgbClr val="333333"/>
               </a:solidFill>
-              <a:latin typeface="Helvetica Neue"/>
+              <a:latin typeface="Bahnschrift SemiLight" panose="020B0502040204020203" pitchFamily="34" charset="0"/>
             </a:endParaRPr>
           </a:p>
           <a:p>
@@ -11026,7 +11607,20 @@
               <a:solidFill>
                 <a:srgbClr val="333333"/>
               </a:solidFill>
-              <a:latin typeface="Helvetica Neue"/>
+              <a:latin typeface="Bahnschrift SemiLight" panose="020B0502040204020203" pitchFamily="34" charset="0"/>
+            </a:endParaRPr>
+          </a:p>
+          <a:p>
+            <a:pPr marL="342900" indent="-342900">
+              <a:spcAft>
+                <a:spcPts val="1300"/>
+              </a:spcAft>
+            </a:pPr>
+            <a:endParaRPr lang="en-US" sz="1800" dirty="0">
+              <a:solidFill>
+                <a:srgbClr val="333333"/>
+              </a:solidFill>
+              <a:latin typeface="Bahnschrift SemiLight" panose="020B0502040204020203" pitchFamily="34" charset="0"/>
             </a:endParaRPr>
           </a:p>
         </p:txBody>
@@ -11071,6 +11665,83 @@
           </a:p>
         </p:txBody>
       </p:sp>
+      <p:pic>
+        <p:nvPicPr>
+          <p:cNvPr id="3" name="Immagine 2">
+            <a:extLst>
+              <a:ext uri="{FF2B5EF4-FFF2-40B4-BE49-F238E27FC236}">
+                <a16:creationId xmlns:a16="http://schemas.microsoft.com/office/drawing/2014/main" id="{F04C0B8C-2F47-B7B6-2E2E-6CC5419C93B9}"/>
+              </a:ext>
+            </a:extLst>
+          </p:cNvPr>
+          <p:cNvPicPr>
+            <a:picLocks noChangeAspect="1"/>
+          </p:cNvPicPr>
+          <p:nvPr/>
+        </p:nvPicPr>
+        <p:blipFill>
+          <a:blip r:embed="rId3"/>
+          <a:stretch>
+            <a:fillRect/>
+          </a:stretch>
+        </p:blipFill>
+        <p:spPr>
+          <a:xfrm>
+            <a:off x="4992762" y="1305478"/>
+            <a:ext cx="3897064" cy="2126718"/>
+          </a:xfrm>
+          <a:prstGeom prst="rect">
+            <a:avLst/>
+          </a:prstGeom>
+        </p:spPr>
+      </p:pic>
+      <p:pic>
+        <p:nvPicPr>
+          <p:cNvPr id="2052" name="Picture 4" descr="CV Physiology | Electrophysiological Changes During Cardiac Ischemia">
+            <a:extLst>
+              <a:ext uri="{FF2B5EF4-FFF2-40B4-BE49-F238E27FC236}">
+                <a16:creationId xmlns:a16="http://schemas.microsoft.com/office/drawing/2014/main" id="{6D52BF45-D520-ABE5-32DF-77552E77D953}"/>
+              </a:ext>
+            </a:extLst>
+          </p:cNvPr>
+          <p:cNvPicPr>
+            <a:picLocks noChangeAspect="1" noChangeArrowheads="1"/>
+          </p:cNvPicPr>
+          <p:nvPr/>
+        </p:nvPicPr>
+        <p:blipFill>
+          <a:blip r:embed="rId4">
+            <a:extLst>
+              <a:ext uri="{28A0092B-C50C-407E-A947-70E740481C1C}">
+                <a14:useLocalDpi xmlns:a14="http://schemas.microsoft.com/office/drawing/2010/main" val="0"/>
+              </a:ext>
+            </a:extLst>
+          </a:blip>
+          <a:srcRect/>
+          <a:stretch>
+            <a:fillRect/>
+          </a:stretch>
+        </p:blipFill>
+        <p:spPr bwMode="auto">
+          <a:xfrm>
+            <a:off x="5887556" y="4909272"/>
+            <a:ext cx="2847572" cy="1127658"/>
+          </a:xfrm>
+          <a:prstGeom prst="rect">
+            <a:avLst/>
+          </a:prstGeom>
+          <a:noFill/>
+          <a:extLst>
+            <a:ext uri="{909E8E84-426E-40DD-AFC4-6F175D3DCCD1}">
+              <a14:hiddenFill xmlns:a14="http://schemas.microsoft.com/office/drawing/2010/main">
+                <a:solidFill>
+                  <a:srgbClr val="FFFFFF"/>
+                </a:solidFill>
+              </a14:hiddenFill>
+            </a:ext>
+          </a:extLst>
+        </p:spPr>
+      </p:pic>
     </p:spTree>
     <p:extLst>
       <p:ext uri="{BB962C8B-B14F-4D97-AF65-F5344CB8AC3E}">
@@ -11141,7 +11812,7 @@
                   <a:srgbClr val="FFFFFF"/>
                 </a:solidFill>
               </a:rPr>
-              <a:t>GLM: </a:t>
+              <a:t>GLM: BIC &amp; Analysis of </a:t>
             </a:r>
             <a:r>
               <a:rPr lang="it-IT" sz="3000" b="1" dirty="0" err="1">
@@ -11149,23 +11820,7 @@
                   <a:srgbClr val="FFFFFF"/>
                 </a:solidFill>
               </a:rPr>
-              <a:t>Threshold</a:t>
-            </a:r>
-            <a:r>
-              <a:rPr lang="it-IT" sz="3000" b="1" dirty="0">
-                <a:solidFill>
-                  <a:srgbClr val="FFFFFF"/>
-                </a:solidFill>
-              </a:rPr>
-              <a:t> </a:t>
-            </a:r>
-            <a:r>
-              <a:rPr lang="it-IT" sz="3000" b="1" dirty="0" err="1">
-                <a:solidFill>
-                  <a:srgbClr val="FFFFFF"/>
-                </a:solidFill>
-              </a:rPr>
-              <a:t>Selection</a:t>
+              <a:t>Deviance</a:t>
             </a:r>
             <a:endParaRPr sz="3000" b="1" dirty="0">
               <a:solidFill>
@@ -11187,8 +11842,8 @@
         </p:nvSpPr>
         <p:spPr>
           <a:xfrm>
-            <a:off x="-1" y="733778"/>
-            <a:ext cx="5469467" cy="6124222"/>
+            <a:off x="0" y="733778"/>
+            <a:ext cx="6164826" cy="6124222"/>
           </a:xfrm>
           <a:prstGeom prst="rect">
             <a:avLst/>
@@ -11206,13 +11861,30 @@
               </a:spcAft>
             </a:pPr>
             <a:r>
+              <a:rPr lang="en-US" sz="1800" b="0" i="0" dirty="0">
+                <a:solidFill>
+                  <a:srgbClr val="333333"/>
+                </a:solidFill>
+                <a:effectLst/>
+                <a:latin typeface="Bahnschrift SemiLight" panose="020B0502040204020203" pitchFamily="34" charset="0"/>
+              </a:rPr>
+              <a:t>The Bayesian Information Criterion, often abbreviated BIC, is a metric that is used to compare the goodness of fit of different regression models.</a:t>
+            </a:r>
+          </a:p>
+          <a:p>
+            <a:pPr marL="800100" lvl="1" indent="-342900">
+              <a:spcAft>
+                <a:spcPts val="1300"/>
+              </a:spcAft>
+            </a:pPr>
+            <a:r>
               <a:rPr lang="en-US" sz="1800" dirty="0">
                 <a:solidFill>
                   <a:srgbClr val="333333"/>
                 </a:solidFill>
-                <a:latin typeface="Helvetica Neue"/>
-              </a:rPr>
-              <a:t>Objective: maximize Recall, in order to minimize wrongly discharged patients with CHD. At the same time, other metrics must be acceptable.</a:t>
+                <a:latin typeface="Bahnschrift SemiLight" panose="020B0502040204020203" pitchFamily="34" charset="0"/>
+              </a:rPr>
+              <a:t>BIC consistently dropped after removal of aforementioned predictors </a:t>
             </a:r>
           </a:p>
           <a:p>
@@ -11221,15 +11893,119 @@
                 <a:spcPts val="1300"/>
               </a:spcAft>
             </a:pPr>
+            <a:endParaRPr lang="en-US" sz="1800" b="0" i="0" dirty="0">
+              <a:solidFill>
+                <a:srgbClr val="333333"/>
+              </a:solidFill>
+              <a:effectLst/>
+              <a:latin typeface="Bahnschrift SemiLight" panose="020B0502040204020203" pitchFamily="34" charset="0"/>
+            </a:endParaRPr>
+          </a:p>
+          <a:p>
+            <a:pPr marL="342900" indent="-342900">
+              <a:spcAft>
+                <a:spcPts val="1300"/>
+              </a:spcAft>
+            </a:pPr>
+            <a:r>
+              <a:rPr lang="en-US" sz="1800" b="0" i="0" dirty="0">
+                <a:solidFill>
+                  <a:srgbClr val="333333"/>
+                </a:solidFill>
+                <a:effectLst/>
+                <a:latin typeface="Bahnschrift SemiLight" panose="020B0502040204020203" pitchFamily="34" charset="0"/>
+              </a:rPr>
+              <a:t>Deviance is a quality-of-fit statistic for a model that is often used for statistical hypothesis testing.</a:t>
+            </a:r>
+          </a:p>
+          <a:p>
+            <a:pPr marL="800100" lvl="1" indent="-342900">
+              <a:spcAft>
+                <a:spcPts val="1300"/>
+              </a:spcAft>
+            </a:pPr>
             <a:r>
               <a:rPr lang="en-US" sz="1800" dirty="0">
                 <a:solidFill>
                   <a:srgbClr val="333333"/>
                 </a:solidFill>
-                <a:latin typeface="Helvetica Neue"/>
-              </a:rPr>
-              <a:t>Best Threshold: 0.4</a:t>
-            </a:r>
+                <a:latin typeface="Bahnschrift SemiLight" panose="020B0502040204020203" pitchFamily="34" charset="0"/>
+              </a:rPr>
+              <a:t>Deviance difference test yields a p-value of 0.2043</a:t>
+            </a:r>
+          </a:p>
+          <a:p>
+            <a:pPr marL="800100" lvl="1" indent="-342900">
+              <a:spcAft>
+                <a:spcPts val="1300"/>
+              </a:spcAft>
+            </a:pPr>
+            <a:r>
+              <a:rPr lang="en-US" sz="1800" b="0" i="0" dirty="0">
+                <a:solidFill>
+                  <a:srgbClr val="333333"/>
+                </a:solidFill>
+                <a:effectLst/>
+                <a:latin typeface="Bahnschrift SemiLight" panose="020B0502040204020203" pitchFamily="34" charset="0"/>
+              </a:rPr>
+              <a:t>Therefore:</a:t>
+            </a:r>
+          </a:p>
+          <a:p>
+            <a:pPr marL="1257300" lvl="2" indent="-342900">
+              <a:spcAft>
+                <a:spcPts val="1300"/>
+              </a:spcAft>
+            </a:pPr>
+            <a:r>
+              <a:rPr lang="en-US" sz="1800" b="0" i="0" dirty="0">
+                <a:solidFill>
+                  <a:srgbClr val="333333"/>
+                </a:solidFill>
+                <a:effectLst/>
+                <a:latin typeface="Bahnschrift SemiLight" panose="020B0502040204020203" pitchFamily="34" charset="0"/>
+              </a:rPr>
+              <a:t>Reduced model is not significantly different from full model</a:t>
+            </a:r>
+          </a:p>
+          <a:p>
+            <a:pPr marL="1257300" lvl="2" indent="-342900">
+              <a:spcAft>
+                <a:spcPts val="1300"/>
+              </a:spcAft>
+            </a:pPr>
+            <a:r>
+              <a:rPr lang="en-US" sz="1800" dirty="0">
+                <a:solidFill>
+                  <a:srgbClr val="333333"/>
+                </a:solidFill>
+                <a:latin typeface="Bahnschrift SemiLight" panose="020B0502040204020203" pitchFamily="34" charset="0"/>
+              </a:rPr>
+              <a:t>R</a:t>
+            </a:r>
+            <a:r>
+              <a:rPr lang="en-US" sz="1800" b="0" i="0" dirty="0">
+                <a:solidFill>
+                  <a:srgbClr val="333333"/>
+                </a:solidFill>
+                <a:effectLst/>
+                <a:latin typeface="Bahnschrift SemiLight" panose="020B0502040204020203" pitchFamily="34" charset="0"/>
+              </a:rPr>
+              <a:t>emoved predictors are indeed not useful</a:t>
+            </a:r>
+          </a:p>
+          <a:p>
+            <a:pPr marL="342900" indent="-342900">
+              <a:spcAft>
+                <a:spcPts val="1300"/>
+              </a:spcAft>
+            </a:pPr>
+            <a:endParaRPr lang="en-US" sz="1800" dirty="0">
+              <a:solidFill>
+                <a:srgbClr val="333333"/>
+              </a:solidFill>
+              <a:latin typeface="Bahnschrift SemiLight" panose="020B0502040204020203" pitchFamily="34" charset="0"/>
+            </a:endParaRPr>
           </a:p>
         </p:txBody>
       </p:sp>
@@ -11275,188 +12051,89 @@
       </p:sp>
       <p:pic>
         <p:nvPicPr>
-          <p:cNvPr id="4102" name="Picture 6">
+          <p:cNvPr id="3" name="Immagine 2">
             <a:extLst>
               <a:ext uri="{FF2B5EF4-FFF2-40B4-BE49-F238E27FC236}">
-                <a16:creationId xmlns:a16="http://schemas.microsoft.com/office/drawing/2014/main" id="{75EA15E4-0644-E734-9A72-BC533B0B3D73}"/>
+                <a16:creationId xmlns:a16="http://schemas.microsoft.com/office/drawing/2014/main" id="{A240BECC-8300-9535-1309-82B674D00304}"/>
               </a:ext>
             </a:extLst>
           </p:cNvPr>
           <p:cNvPicPr>
-            <a:picLocks noChangeAspect="1" noChangeArrowheads="1"/>
+            <a:picLocks noChangeAspect="1"/>
           </p:cNvPicPr>
           <p:nvPr/>
         </p:nvPicPr>
         <p:blipFill>
-          <a:blip r:embed="rId3">
-            <a:extLst>
-              <a:ext uri="{28A0092B-C50C-407E-A947-70E740481C1C}">
-                <a14:useLocalDpi xmlns:a14="http://schemas.microsoft.com/office/drawing/2010/main" val="0"/>
-              </a:ext>
-            </a:extLst>
-          </a:blip>
-          <a:srcRect/>
+          <a:blip r:embed="rId3"/>
           <a:stretch>
             <a:fillRect/>
           </a:stretch>
         </p:blipFill>
-        <p:spPr bwMode="auto">
-          <a:xfrm>
-            <a:off x="5588649" y="1185771"/>
-            <a:ext cx="3374078" cy="2409888"/>
+        <p:spPr>
+          <a:xfrm>
+            <a:off x="7207074" y="1101622"/>
+            <a:ext cx="975726" cy="1303924"/>
           </a:xfrm>
           <a:prstGeom prst="rect">
             <a:avLst/>
           </a:prstGeom>
-          <a:noFill/>
-          <a:extLst>
-            <a:ext uri="{909E8E84-426E-40DD-AFC4-6F175D3DCCD1}">
-              <a14:hiddenFill xmlns:a14="http://schemas.microsoft.com/office/drawing/2010/main">
-                <a:solidFill>
-                  <a:srgbClr val="FFFFFF"/>
-                </a:solidFill>
-              </a14:hiddenFill>
-            </a:ext>
-          </a:extLst>
         </p:spPr>
       </p:pic>
-      <p:sp>
-        <p:nvSpPr>
-          <p:cNvPr id="4" name="CasellaDiTesto 3">
-            <a:extLst>
-              <a:ext uri="{FF2B5EF4-FFF2-40B4-BE49-F238E27FC236}">
-                <a16:creationId xmlns:a16="http://schemas.microsoft.com/office/drawing/2014/main" id="{CEF5359B-8A9F-DD6F-BB12-D42C0E99831B}"/>
-              </a:ext>
-            </a:extLst>
-          </p:cNvPr>
-          <p:cNvSpPr txBox="1"/>
-          <p:nvPr/>
-        </p:nvSpPr>
-        <p:spPr>
-          <a:xfrm>
-            <a:off x="6209429" y="3876066"/>
-            <a:ext cx="2415822" cy="1528624"/>
-          </a:xfrm>
-          <a:prstGeom prst="rect">
-            <a:avLst/>
-          </a:prstGeom>
-          <a:noFill/>
-        </p:spPr>
-        <p:txBody>
-          <a:bodyPr wrap="square">
-            <a:spAutoFit/>
-          </a:bodyPr>
-          <a:lstStyle/>
-          <a:p>
-            <a:pPr marL="742950" lvl="1" indent="-285750" defTabSz="360000">
-              <a:lnSpc>
-                <a:spcPct val="100000"/>
-              </a:lnSpc>
-              <a:spcAft>
-                <a:spcPts val="1300"/>
-              </a:spcAft>
-            </a:pPr>
-            <a:r>
-              <a:rPr lang="en-US" sz="1000" b="0" i="0" dirty="0">
-                <a:solidFill>
-                  <a:srgbClr val="333333"/>
-                </a:solidFill>
-                <a:effectLst/>
-                <a:latin typeface="Helvetica Neue"/>
-              </a:rPr>
-              <a:t>Accuracy: 0.88</a:t>
-            </a:r>
-          </a:p>
-          <a:p>
-            <a:pPr marL="742950" lvl="1" indent="-285750" defTabSz="360000">
-              <a:lnSpc>
-                <a:spcPct val="100000"/>
-              </a:lnSpc>
-              <a:spcAft>
-                <a:spcPts val="1300"/>
-              </a:spcAft>
-            </a:pPr>
-            <a:r>
-              <a:rPr lang="en-US" sz="1000" dirty="0">
-                <a:solidFill>
-                  <a:srgbClr val="333333"/>
-                </a:solidFill>
-                <a:latin typeface="Helvetica Neue"/>
-              </a:rPr>
-              <a:t>Precision: 0.87</a:t>
-            </a:r>
-          </a:p>
-          <a:p>
-            <a:pPr marL="742950" lvl="1" indent="-285750" defTabSz="360000">
-              <a:lnSpc>
-                <a:spcPct val="100000"/>
-              </a:lnSpc>
-              <a:spcAft>
-                <a:spcPts val="1300"/>
-              </a:spcAft>
-            </a:pPr>
-            <a:r>
-              <a:rPr lang="en-US" sz="1000" dirty="0">
-                <a:solidFill>
-                  <a:srgbClr val="333333"/>
-                </a:solidFill>
-                <a:latin typeface="Helvetica Neue"/>
-              </a:rPr>
-              <a:t>Recall: 0.92</a:t>
-            </a:r>
-          </a:p>
-          <a:p>
-            <a:pPr marL="742950" lvl="1" indent="-285750" defTabSz="360000">
-              <a:lnSpc>
-                <a:spcPct val="100000"/>
-              </a:lnSpc>
-              <a:spcAft>
-                <a:spcPts val="1300"/>
-              </a:spcAft>
-            </a:pPr>
-            <a:r>
-              <a:rPr lang="en-US" sz="1000" b="0" i="0" dirty="0">
-                <a:solidFill>
-                  <a:srgbClr val="333333"/>
-                </a:solidFill>
-                <a:effectLst/>
-                <a:latin typeface="Helvetica Neue"/>
-              </a:rPr>
-              <a:t>F1-Score: 0.89</a:t>
-            </a:r>
-          </a:p>
-          <a:p>
-            <a:pPr marL="742950" lvl="1" indent="-285750" defTabSz="360000">
-              <a:lnSpc>
-                <a:spcPct val="100000"/>
-              </a:lnSpc>
-              <a:spcAft>
-                <a:spcPts val="1300"/>
-              </a:spcAft>
-            </a:pPr>
-            <a:r>
-              <a:rPr lang="en-US" sz="1000" dirty="0">
-                <a:solidFill>
-                  <a:srgbClr val="333333"/>
-                </a:solidFill>
-                <a:latin typeface="Helvetica Neue"/>
-              </a:rPr>
-              <a:t>AUC: 0.92</a:t>
-            </a:r>
-            <a:endParaRPr lang="en-US" sz="1000" b="0" i="0" dirty="0">
-              <a:solidFill>
-                <a:srgbClr val="333333"/>
-              </a:solidFill>
-              <a:effectLst/>
-              <a:latin typeface="Helvetica Neue"/>
-            </a:endParaRPr>
-          </a:p>
-        </p:txBody>
-      </p:sp>
+      <mc:AlternateContent xmlns:mc="http://schemas.openxmlformats.org/markup-compatibility/2006">
+        <mc:Choice xmlns:p14="http://schemas.microsoft.com/office/powerpoint/2010/main" Requires="p14">
+          <p:contentPart p14:bwMode="auto" r:id="rId4">
+            <p14:nvContentPartPr>
+              <p14:cNvPr id="5" name="Input penna 4">
+                <a:extLst>
+                  <a:ext uri="{FF2B5EF4-FFF2-40B4-BE49-F238E27FC236}">
+                    <a16:creationId xmlns:a16="http://schemas.microsoft.com/office/drawing/2014/main" id="{143677B7-1678-044A-9CED-84A0320FE4EB}"/>
+                  </a:ext>
+                </a:extLst>
+              </p14:cNvPr>
+              <p14:cNvContentPartPr/>
+              <p14:nvPr/>
+            </p14:nvContentPartPr>
+            <p14:xfrm>
+              <a:off x="7309092" y="2265108"/>
+              <a:ext cx="754920" cy="6840"/>
+            </p14:xfrm>
+          </p:contentPart>
+        </mc:Choice>
+        <mc:Fallback>
+          <p:pic>
+            <p:nvPicPr>
+              <p:cNvPr id="5" name="Input penna 4">
+                <a:extLst>
+                  <a:ext uri="{FF2B5EF4-FFF2-40B4-BE49-F238E27FC236}">
+                    <a16:creationId xmlns:a16="http://schemas.microsoft.com/office/drawing/2014/main" id="{143677B7-1678-044A-9CED-84A0320FE4EB}"/>
+                  </a:ext>
+                </a:extLst>
+              </p:cNvPr>
+              <p:cNvPicPr/>
+              <p:nvPr/>
+            </p:nvPicPr>
+            <p:blipFill>
+              <a:blip r:embed="rId5"/>
+              <a:stretch>
+                <a:fillRect/>
+              </a:stretch>
+            </p:blipFill>
+            <p:spPr>
+              <a:xfrm>
+                <a:off x="7255452" y="2157108"/>
+                <a:ext cx="862560" cy="222480"/>
+              </a:xfrm>
+              <a:prstGeom prst="rect">
+                <a:avLst/>
+              </a:prstGeom>
+            </p:spPr>
+          </p:pic>
+        </mc:Fallback>
+      </mc:AlternateContent>
     </p:spTree>
     <p:extLst>
       <p:ext uri="{BB962C8B-B14F-4D97-AF65-F5344CB8AC3E}">
-        <p14:creationId xmlns:p14="http://schemas.microsoft.com/office/powerpoint/2010/main" val="3517274675"/>
+        <p14:creationId xmlns:p14="http://schemas.microsoft.com/office/powerpoint/2010/main" val="2820540259"/>
       </p:ext>
     </p:extLst>
   </p:cSld>
@@ -11523,7 +12200,7 @@
                   <a:srgbClr val="FFFFFF"/>
                 </a:solidFill>
               </a:rPr>
-              <a:t>GLM: Analysis of </a:t>
+              <a:t>GLM: </a:t>
             </a:r>
             <a:r>
               <a:rPr lang="it-IT" sz="3000" b="1" dirty="0" err="1">
@@ -11531,7 +12208,23 @@
                   <a:srgbClr val="FFFFFF"/>
                 </a:solidFill>
               </a:rPr>
-              <a:t>Deviance</a:t>
+              <a:t>Threshold</a:t>
+            </a:r>
+            <a:r>
+              <a:rPr lang="it-IT" sz="3000" b="1" dirty="0">
+                <a:solidFill>
+                  <a:srgbClr val="FFFFFF"/>
+                </a:solidFill>
+              </a:rPr>
+              <a:t> </a:t>
+            </a:r>
+            <a:r>
+              <a:rPr lang="it-IT" sz="3000" b="1" dirty="0" err="1">
+                <a:solidFill>
+                  <a:srgbClr val="FFFFFF"/>
+                </a:solidFill>
+              </a:rPr>
+              <a:t>Selection</a:t>
             </a:r>
             <a:endParaRPr sz="3000" b="1" dirty="0">
               <a:solidFill>
@@ -11576,10 +12269,72 @@
                 <a:solidFill>
                   <a:srgbClr val="333333"/>
                 </a:solidFill>
-                <a:latin typeface="Helvetica Neue"/>
-              </a:rPr>
-              <a:t>Objective: maximize Recall, in order to minimize wrongly discharged patients with CHD.</a:t>
-            </a:r>
+                <a:latin typeface="Bahnschrift SemiLight" panose="020B0502040204020203" pitchFamily="34" charset="0"/>
+              </a:rPr>
+              <a:t>Objective: maximize Recall, in order to minimize wrongly discharged patients with CHD. At the same time, other metrics must be acceptable.</a:t>
+            </a:r>
+          </a:p>
+          <a:p>
+            <a:pPr marL="342900" indent="-342900">
+              <a:spcAft>
+                <a:spcPts val="1300"/>
+              </a:spcAft>
+            </a:pPr>
+            <a:r>
+              <a:rPr lang="en-US" sz="1800" dirty="0">
+                <a:solidFill>
+                  <a:srgbClr val="333333"/>
+                </a:solidFill>
+                <a:latin typeface="Bahnschrift SemiLight" panose="020B0502040204020203" pitchFamily="34" charset="0"/>
+              </a:rPr>
+              <a:t>Thresholds: 0.3, 0.4, 0.5, 0.6</a:t>
+            </a:r>
+          </a:p>
+          <a:p>
+            <a:pPr marL="800100" lvl="1" indent="-342900">
+              <a:spcAft>
+                <a:spcPts val="1300"/>
+              </a:spcAft>
+            </a:pPr>
+            <a:r>
+              <a:rPr lang="en-US" sz="1800" dirty="0">
+                <a:solidFill>
+                  <a:srgbClr val="333333"/>
+                </a:solidFill>
+                <a:latin typeface="Bahnschrift SemiLight" panose="020B0502040204020203" pitchFamily="34" charset="0"/>
+              </a:rPr>
+              <a:t>0.3 Maximized Recall but Accuracy and Precision would suffer</a:t>
+            </a:r>
+          </a:p>
+          <a:p>
+            <a:pPr marL="800100" lvl="1" indent="-342900">
+              <a:spcAft>
+                <a:spcPts val="1300"/>
+              </a:spcAft>
+            </a:pPr>
+            <a:r>
+              <a:rPr lang="en-US" sz="1800" dirty="0">
+                <a:solidFill>
+                  <a:srgbClr val="333333"/>
+                </a:solidFill>
+                <a:latin typeface="Bahnschrift SemiLight" panose="020B0502040204020203" pitchFamily="34" charset="0"/>
+              </a:rPr>
+              <a:t>Best Overall Threshold: 0.4</a:t>
+            </a:r>
+          </a:p>
+          <a:p>
+            <a:pPr marL="0" indent="0">
+              <a:spcAft>
+                <a:spcPts val="1300"/>
+              </a:spcAft>
+              <a:buNone/>
+            </a:pPr>
+            <a:endParaRPr lang="en-US" sz="1800" dirty="0">
+              <a:solidFill>
+                <a:srgbClr val="333333"/>
+              </a:solidFill>
+              <a:latin typeface="Bahnschrift SemiLight" panose="020B0502040204020203" pitchFamily="34" charset="0"/>
+            </a:endParaRPr>
           </a:p>
         </p:txBody>
       </p:sp>
@@ -11623,10 +12378,223 @@
           </a:p>
         </p:txBody>
       </p:sp>
+      <p:pic>
+        <p:nvPicPr>
+          <p:cNvPr id="4102" name="Picture 6">
+            <a:extLst>
+              <a:ext uri="{FF2B5EF4-FFF2-40B4-BE49-F238E27FC236}">
+                <a16:creationId xmlns:a16="http://schemas.microsoft.com/office/drawing/2014/main" id="{75EA15E4-0644-E734-9A72-BC533B0B3D73}"/>
+              </a:ext>
+            </a:extLst>
+          </p:cNvPr>
+          <p:cNvPicPr>
+            <a:picLocks noChangeAspect="1" noChangeArrowheads="1"/>
+          </p:cNvPicPr>
+          <p:nvPr/>
+        </p:nvPicPr>
+        <p:blipFill>
+          <a:blip r:embed="rId3">
+            <a:extLst>
+              <a:ext uri="{28A0092B-C50C-407E-A947-70E740481C1C}">
+                <a14:useLocalDpi xmlns:a14="http://schemas.microsoft.com/office/drawing/2010/main" val="0"/>
+              </a:ext>
+            </a:extLst>
+          </a:blip>
+          <a:srcRect/>
+          <a:stretch>
+            <a:fillRect/>
+          </a:stretch>
+        </p:blipFill>
+        <p:spPr bwMode="auto">
+          <a:xfrm>
+            <a:off x="5588649" y="1185771"/>
+            <a:ext cx="3374078" cy="2409888"/>
+          </a:xfrm>
+          <a:prstGeom prst="rect">
+            <a:avLst/>
+          </a:prstGeom>
+          <a:noFill/>
+          <a:extLst>
+            <a:ext uri="{909E8E84-426E-40DD-AFC4-6F175D3DCCD1}">
+              <a14:hiddenFill xmlns:a14="http://schemas.microsoft.com/office/drawing/2010/main">
+                <a:solidFill>
+                  <a:srgbClr val="FFFFFF"/>
+                </a:solidFill>
+              </a14:hiddenFill>
+            </a:ext>
+          </a:extLst>
+        </p:spPr>
+      </p:pic>
+      <p:sp>
+        <p:nvSpPr>
+          <p:cNvPr id="4" name="CasellaDiTesto 3">
+            <a:extLst>
+              <a:ext uri="{FF2B5EF4-FFF2-40B4-BE49-F238E27FC236}">
+                <a16:creationId xmlns:a16="http://schemas.microsoft.com/office/drawing/2014/main" id="{CEF5359B-8A9F-DD6F-BB12-D42C0E99831B}"/>
+              </a:ext>
+            </a:extLst>
+          </p:cNvPr>
+          <p:cNvSpPr txBox="1"/>
+          <p:nvPr/>
+        </p:nvSpPr>
+        <p:spPr>
+          <a:xfrm>
+            <a:off x="6209429" y="3876066"/>
+            <a:ext cx="2415822" cy="1528624"/>
+          </a:xfrm>
+          <a:prstGeom prst="rect">
+            <a:avLst/>
+          </a:prstGeom>
+          <a:noFill/>
+        </p:spPr>
+        <p:txBody>
+          <a:bodyPr wrap="square">
+            <a:spAutoFit/>
+          </a:bodyPr>
+          <a:lstStyle/>
+          <a:p>
+            <a:pPr marL="742950" lvl="1" indent="-285750" defTabSz="360000">
+              <a:lnSpc>
+                <a:spcPct val="100000"/>
+              </a:lnSpc>
+              <a:spcAft>
+                <a:spcPts val="1300"/>
+              </a:spcAft>
+            </a:pPr>
+            <a:r>
+              <a:rPr lang="en-US" sz="1000" b="0" i="0" dirty="0">
+                <a:solidFill>
+                  <a:srgbClr val="333333"/>
+                </a:solidFill>
+                <a:effectLst/>
+                <a:latin typeface="Helvetica Neue"/>
+              </a:rPr>
+              <a:t>Accuracy: 0.88</a:t>
+            </a:r>
+          </a:p>
+          <a:p>
+            <a:pPr marL="742950" lvl="1" indent="-285750" defTabSz="360000">
+              <a:lnSpc>
+                <a:spcPct val="100000"/>
+              </a:lnSpc>
+              <a:spcAft>
+                <a:spcPts val="1300"/>
+              </a:spcAft>
+            </a:pPr>
+            <a:r>
+              <a:rPr lang="en-US" sz="1000" dirty="0">
+                <a:solidFill>
+                  <a:srgbClr val="333333"/>
+                </a:solidFill>
+                <a:latin typeface="Helvetica Neue"/>
+              </a:rPr>
+              <a:t>Precision: 0.87</a:t>
+            </a:r>
+          </a:p>
+          <a:p>
+            <a:pPr marL="742950" lvl="1" indent="-285750" defTabSz="360000">
+              <a:lnSpc>
+                <a:spcPct val="100000"/>
+              </a:lnSpc>
+              <a:spcAft>
+                <a:spcPts val="1300"/>
+              </a:spcAft>
+            </a:pPr>
+            <a:r>
+              <a:rPr lang="en-US" sz="1000" dirty="0">
+                <a:solidFill>
+                  <a:srgbClr val="333333"/>
+                </a:solidFill>
+                <a:highlight>
+                  <a:srgbClr val="00FF00"/>
+                </a:highlight>
+                <a:latin typeface="Helvetica Neue"/>
+              </a:rPr>
+              <a:t>Recall: 0.92</a:t>
+            </a:r>
+          </a:p>
+          <a:p>
+            <a:pPr marL="742950" lvl="1" indent="-285750" defTabSz="360000">
+              <a:lnSpc>
+                <a:spcPct val="100000"/>
+              </a:lnSpc>
+              <a:spcAft>
+                <a:spcPts val="1300"/>
+              </a:spcAft>
+            </a:pPr>
+            <a:r>
+              <a:rPr lang="en-US" sz="1000" b="0" i="0" dirty="0">
+                <a:solidFill>
+                  <a:srgbClr val="333333"/>
+                </a:solidFill>
+                <a:effectLst/>
+                <a:latin typeface="Helvetica Neue"/>
+              </a:rPr>
+              <a:t>F1-Score: 0.89</a:t>
+            </a:r>
+          </a:p>
+          <a:p>
+            <a:pPr marL="742950" lvl="1" indent="-285750" defTabSz="360000">
+              <a:lnSpc>
+                <a:spcPct val="100000"/>
+              </a:lnSpc>
+              <a:spcAft>
+                <a:spcPts val="1300"/>
+              </a:spcAft>
+            </a:pPr>
+            <a:r>
+              <a:rPr lang="en-US" sz="1000" dirty="0">
+                <a:solidFill>
+                  <a:srgbClr val="333333"/>
+                </a:solidFill>
+                <a:latin typeface="Helvetica Neue"/>
+              </a:rPr>
+              <a:t>AUC: 0.92</a:t>
+            </a:r>
+            <a:endParaRPr lang="en-US" sz="1000" b="0" i="0" dirty="0">
+              <a:solidFill>
+                <a:srgbClr val="333333"/>
+              </a:solidFill>
+              <a:effectLst/>
+              <a:latin typeface="Helvetica Neue"/>
+            </a:endParaRPr>
+          </a:p>
+        </p:txBody>
+      </p:sp>
+      <p:pic>
+        <p:nvPicPr>
+          <p:cNvPr id="5" name="Immagine 4">
+            <a:extLst>
+              <a:ext uri="{FF2B5EF4-FFF2-40B4-BE49-F238E27FC236}">
+                <a16:creationId xmlns:a16="http://schemas.microsoft.com/office/drawing/2014/main" id="{904B9C6B-D44D-A5CC-6C48-1A5F6F9D88FA}"/>
+              </a:ext>
+            </a:extLst>
+          </p:cNvPr>
+          <p:cNvPicPr>
+            <a:picLocks noChangeAspect="1"/>
+          </p:cNvPicPr>
+          <p:nvPr/>
+        </p:nvPicPr>
+        <p:blipFill>
+          <a:blip r:embed="rId4"/>
+          <a:stretch>
+            <a:fillRect/>
+          </a:stretch>
+        </p:blipFill>
+        <p:spPr>
+          <a:xfrm>
+            <a:off x="365760" y="4214034"/>
+            <a:ext cx="5958348" cy="1190656"/>
+          </a:xfrm>
+          <a:prstGeom prst="rect">
+            <a:avLst/>
+          </a:prstGeom>
+        </p:spPr>
+      </p:pic>
     </p:spTree>
     <p:extLst>
       <p:ext uri="{BB962C8B-B14F-4D97-AF65-F5344CB8AC3E}">
-        <p14:creationId xmlns:p14="http://schemas.microsoft.com/office/powerpoint/2010/main" val="2820540259"/>
+        <p14:creationId xmlns:p14="http://schemas.microsoft.com/office/powerpoint/2010/main" val="3517274675"/>
       </p:ext>
     </p:extLst>
   </p:cSld>
@@ -11754,10 +12722,46 @@
                 <a:solidFill>
                   <a:srgbClr val="333333"/>
                 </a:solidFill>
-                <a:latin typeface="Helvetica Neue"/>
-              </a:rPr>
-              <a:t>Generalized models with some penalizations according to lambda</a:t>
-            </a:r>
+                <a:latin typeface="Bahnschrift SemiLight" panose="020B0502040204020203" pitchFamily="34" charset="0"/>
+              </a:rPr>
+              <a:t>Generalized models with some penalizations according to </a:t>
+            </a:r>
+            <a:r>
+              <a:rPr lang="el-GR" sz="2000" b="1" i="0" dirty="0">
+                <a:solidFill>
+                  <a:srgbClr val="202122"/>
+                </a:solidFill>
+                <a:effectLst/>
+                <a:latin typeface="Bahnschrift SemiLight" panose="020B0502040204020203" pitchFamily="34" charset="0"/>
+              </a:rPr>
+              <a:t>λ</a:t>
+            </a:r>
+            <a:r>
+              <a:rPr lang="it-IT" sz="2000" b="1" i="0" dirty="0">
+                <a:solidFill>
+                  <a:srgbClr val="202122"/>
+                </a:solidFill>
+                <a:effectLst/>
+                <a:latin typeface="Bahnschrift SemiLight" panose="020B0502040204020203" pitchFamily="34" charset="0"/>
+              </a:rPr>
+              <a:t> </a:t>
+            </a:r>
+            <a:r>
+              <a:rPr lang="it-IT" sz="2000" i="0" dirty="0" err="1">
+                <a:solidFill>
+                  <a:srgbClr val="202122"/>
+                </a:solidFill>
+                <a:effectLst/>
+                <a:latin typeface="Bahnschrift SemiLight" panose="020B0502040204020203" pitchFamily="34" charset="0"/>
+              </a:rPr>
+              <a:t>value</a:t>
+            </a:r>
+            <a:endParaRPr lang="en-US" sz="2000" dirty="0">
+              <a:solidFill>
+                <a:srgbClr val="333333"/>
+              </a:solidFill>
+              <a:latin typeface="Bahnschrift SemiLight" panose="020B0502040204020203" pitchFamily="34" charset="0"/>
+            </a:endParaRPr>
           </a:p>
           <a:p>
             <a:pPr marL="342900" indent="-342900">
@@ -11770,7 +12774,7 @@
                 <a:solidFill>
                   <a:srgbClr val="333333"/>
                 </a:solidFill>
-                <a:latin typeface="Helvetica Neue"/>
+                <a:latin typeface="Bahnschrift SemiLight" panose="020B0502040204020203" pitchFamily="34" charset="0"/>
               </a:rPr>
               <a:t>Estimators with very large variants and small bias can lead to multicollinearity and produce poor estimates (overfitting)</a:t>
             </a:r>
@@ -11786,7 +12790,7 @@
                 <a:solidFill>
                   <a:srgbClr val="333333"/>
                 </a:solidFill>
-                <a:latin typeface="Helvetica Neue"/>
+                <a:latin typeface="Bahnschrift SemiLight" panose="020B0502040204020203" pitchFamily="34" charset="0"/>
               </a:rPr>
               <a:t>Regularized Regression methods use automatic selection of variables through shrinkage on the coefficients of the predictors:</a:t>
             </a:r>
@@ -11802,7 +12806,7 @@
                 <a:solidFill>
                   <a:srgbClr val="333333"/>
                 </a:solidFill>
-                <a:latin typeface="Helvetica Neue"/>
+                <a:latin typeface="Bahnschrift SemiLight" panose="020B0502040204020203" pitchFamily="34" charset="0"/>
               </a:rPr>
               <a:t>Ridge Regression: coefficients assume values very close to zero</a:t>
             </a:r>
@@ -11818,7 +12822,7 @@
                 <a:solidFill>
                   <a:srgbClr val="333333"/>
                 </a:solidFill>
-                <a:latin typeface="Helvetica Neue"/>
+                <a:latin typeface="Bahnschrift SemiLight" panose="020B0502040204020203" pitchFamily="34" charset="0"/>
               </a:rPr>
               <a:t>Lasso Regression: coefficients assume values that can even be zero</a:t>
             </a:r>
@@ -11966,7 +12970,7 @@
         <p:spPr>
           <a:xfrm>
             <a:off x="0" y="733778"/>
-            <a:ext cx="4064000" cy="6124222"/>
+            <a:ext cx="5132478" cy="6124222"/>
           </a:xfrm>
           <a:prstGeom prst="rect">
             <a:avLst/>
@@ -11978,184 +12982,306 @@
           </a:bodyPr>
           <a:lstStyle/>
           <a:p>
-            <a:pPr marL="0" indent="0">
+            <a:pPr marL="285750" indent="-285750">
               <a:spcAft>
                 <a:spcPts val="1300"/>
               </a:spcAft>
-              <a:buNone/>
             </a:pPr>
             <a:r>
               <a:rPr lang="en-US" sz="1800" dirty="0">
                 <a:solidFill>
                   <a:srgbClr val="333333"/>
                 </a:solidFill>
-                <a:latin typeface="Helvetica Neue"/>
-              </a:rPr>
-              <a:t>Best </a:t>
-            </a:r>
-            <a:r>
-              <a:rPr lang="el-GR" sz="1800" b="1" i="0" dirty="0">
-                <a:solidFill>
-                  <a:srgbClr val="202122"/>
-                </a:solidFill>
-                <a:effectLst/>
-                <a:latin typeface="Arial" panose="020B0604020202020204" pitchFamily="34" charset="0"/>
-              </a:rPr>
-              <a:t>λ</a:t>
-            </a:r>
-            <a:r>
-              <a:rPr lang="en-US" sz="1800" dirty="0">
+                <a:latin typeface="Bahnschrift SemiLight" panose="020B0502040204020203" pitchFamily="34" charset="0"/>
+              </a:rPr>
+              <a:t>Cross-validation performed with </a:t>
+            </a:r>
+            <a:r>
+              <a:rPr lang="en-US" sz="1800" dirty="0" err="1">
                 <a:solidFill>
                   <a:srgbClr val="333333"/>
                 </a:solidFill>
-                <a:latin typeface="Helvetica Neue"/>
-              </a:rPr>
-              <a:t>: </a:t>
-            </a:r>
-            <a:r>
-              <a:rPr lang="it-IT" sz="1800" b="0" i="0" u="none" strike="noStrike" baseline="0" dirty="0">
-                <a:latin typeface="CenturyGothic"/>
-              </a:rPr>
-              <a:t>~ </a:t>
-            </a:r>
-            <a:r>
-              <a:rPr lang="en-US" sz="1800" dirty="0">
-                <a:solidFill>
-                  <a:srgbClr val="333333"/>
-                </a:solidFill>
-                <a:latin typeface="Helvetica Neue"/>
-              </a:rPr>
-              <a:t>0.036</a:t>
-            </a:r>
-          </a:p>
-          <a:p>
-            <a:pPr marL="0" indent="0">
-              <a:spcAft>
-                <a:spcPts val="1300"/>
-              </a:spcAft>
-              <a:buNone/>
-            </a:pPr>
+                <a:latin typeface="Bahnschrift SemiLight" panose="020B0502040204020203" pitchFamily="34" charset="0"/>
+              </a:rPr>
+              <a:t>glmnet</a:t>
+            </a:r>
             <a:endParaRPr lang="en-US" sz="1800" dirty="0">
               <a:solidFill>
                 <a:srgbClr val="333333"/>
               </a:solidFill>
-              <a:latin typeface="Helvetica Neue"/>
+              <a:latin typeface="Bahnschrift SemiLight" panose="020B0502040204020203" pitchFamily="34" charset="0"/>
             </a:endParaRPr>
           </a:p>
           <a:p>
+            <a:pPr marL="742950" lvl="1" indent="-285750">
+              <a:spcAft>
+                <a:spcPts val="1300"/>
+              </a:spcAft>
+            </a:pPr>
+            <a:r>
+              <a:rPr lang="en-US" sz="1800" dirty="0">
+                <a:solidFill>
+                  <a:srgbClr val="333333"/>
+                </a:solidFill>
+                <a:latin typeface="Bahnschrift SemiLight" panose="020B0502040204020203" pitchFamily="34" charset="0"/>
+              </a:rPr>
+              <a:t>Best </a:t>
+            </a:r>
+            <a:r>
+              <a:rPr lang="el-GR" sz="1800" b="1" i="0" dirty="0">
+                <a:solidFill>
+                  <a:srgbClr val="202122"/>
+                </a:solidFill>
+                <a:effectLst/>
+                <a:latin typeface="Bahnschrift SemiLight" panose="020B0502040204020203" pitchFamily="34" charset="0"/>
+              </a:rPr>
+              <a:t>λ</a:t>
+            </a:r>
+            <a:r>
+              <a:rPr lang="en-US" sz="1800" dirty="0">
+                <a:solidFill>
+                  <a:srgbClr val="333333"/>
+                </a:solidFill>
+                <a:latin typeface="Bahnschrift SemiLight" panose="020B0502040204020203" pitchFamily="34" charset="0"/>
+              </a:rPr>
+              <a:t>: </a:t>
+            </a:r>
+            <a:r>
+              <a:rPr lang="it-IT" sz="1800" b="0" i="0" u="none" strike="noStrike" baseline="0" dirty="0">
+                <a:latin typeface="Bahnschrift SemiLight" panose="020B0502040204020203" pitchFamily="34" charset="0"/>
+              </a:rPr>
+              <a:t>~ </a:t>
+            </a:r>
+            <a:r>
+              <a:rPr lang="en-US" sz="1800" dirty="0">
+                <a:solidFill>
+                  <a:srgbClr val="333333"/>
+                </a:solidFill>
+                <a:latin typeface="Bahnschrift SemiLight" panose="020B0502040204020203" pitchFamily="34" charset="0"/>
+              </a:rPr>
+              <a:t>0.036</a:t>
+            </a:r>
+          </a:p>
+          <a:p>
             <a:pPr marL="0" indent="0">
               <a:spcAft>
                 <a:spcPts val="1300"/>
               </a:spcAft>
               <a:buNone/>
             </a:pPr>
-            <a:r>
-              <a:rPr lang="en-US" sz="1800" dirty="0">
-                <a:solidFill>
-                  <a:srgbClr val="333333"/>
-                </a:solidFill>
-                <a:latin typeface="Helvetica Neue"/>
-              </a:rPr>
-              <a:t>Cross-validation?</a:t>
-            </a:r>
-          </a:p>
-          <a:p>
-            <a:pPr marL="342900" indent="-342900">
-              <a:spcAft>
-                <a:spcPts val="1300"/>
-              </a:spcAft>
-            </a:pPr>
-            <a:r>
-              <a:rPr lang="en-US" sz="1800" dirty="0">
-                <a:solidFill>
-                  <a:srgbClr val="333333"/>
-                </a:solidFill>
-                <a:latin typeface="Helvetica Neue"/>
-              </a:rPr>
-              <a:t>Considerations:</a:t>
-            </a:r>
-          </a:p>
-          <a:p>
-            <a:pPr marL="800100" lvl="1" indent="-342900">
-              <a:spcAft>
-                <a:spcPts val="1300"/>
-              </a:spcAft>
-            </a:pPr>
-            <a:r>
-              <a:rPr lang="en-US" sz="1800" b="0" i="0" dirty="0">
-                <a:solidFill>
-                  <a:srgbClr val="333333"/>
-                </a:solidFill>
-                <a:effectLst/>
-                <a:latin typeface="Helvetica Neue"/>
-              </a:rPr>
-              <a:t>Lasso removed  </a:t>
-            </a:r>
-            <a:r>
-              <a:rPr lang="en-US" sz="1800" b="0" i="0" dirty="0" err="1">
-                <a:solidFill>
-                  <a:srgbClr val="333333"/>
-                </a:solidFill>
-                <a:effectLst/>
-                <a:latin typeface="Helvetica Neue"/>
-              </a:rPr>
-              <a:t>RestingECG</a:t>
-            </a:r>
-            <a:r>
-              <a:rPr lang="en-US" sz="1800" b="0" i="0" dirty="0">
-                <a:solidFill>
-                  <a:srgbClr val="333333"/>
-                </a:solidFill>
-                <a:effectLst/>
-                <a:latin typeface="Helvetica Neue"/>
-              </a:rPr>
-              <a:t> and </a:t>
-            </a:r>
-            <a:r>
-              <a:rPr lang="en-US" sz="1800" b="0" i="0" dirty="0" err="1">
-                <a:solidFill>
-                  <a:srgbClr val="333333"/>
-                </a:solidFill>
-                <a:effectLst/>
-                <a:latin typeface="Helvetica Neue"/>
-              </a:rPr>
-              <a:t>RestingBP</a:t>
-            </a:r>
-            <a:r>
-              <a:rPr lang="en-US" sz="1800" b="0" i="0" dirty="0">
-                <a:solidFill>
-                  <a:srgbClr val="333333"/>
-                </a:solidFill>
-                <a:effectLst/>
-                <a:latin typeface="Helvetica Neue"/>
-              </a:rPr>
-              <a:t>, </a:t>
-            </a:r>
-            <a:r>
-              <a:rPr lang="en-US" sz="1800" b="0" i="0" dirty="0" err="1">
-                <a:solidFill>
-                  <a:srgbClr val="333333"/>
-                </a:solidFill>
-                <a:effectLst/>
-                <a:latin typeface="Helvetica Neue"/>
-              </a:rPr>
-              <a:t>ChestPainType</a:t>
-            </a:r>
-            <a:r>
-              <a:rPr lang="en-US" sz="1800" dirty="0" err="1">
-                <a:solidFill>
-                  <a:srgbClr val="333333"/>
-                </a:solidFill>
-                <a:latin typeface="Helvetica Neue"/>
-              </a:rPr>
-              <a:t>TA</a:t>
-            </a:r>
-            <a:endParaRPr lang="en-US" sz="1800" b="0" i="0" dirty="0">
+            <a:endParaRPr lang="en-US" sz="1800" dirty="0">
               <a:solidFill>
                 <a:srgbClr val="333333"/>
               </a:solidFill>
-              <a:effectLst/>
-              <a:latin typeface="Helvetica Neue"/>
+              <a:latin typeface="Bahnschrift SemiLight" panose="020B0502040204020203" pitchFamily="34" charset="0"/>
+            </a:endParaRPr>
+          </a:p>
+          <a:p>
+            <a:pPr marL="285750" indent="-285750">
+              <a:spcAft>
+                <a:spcPts val="1300"/>
+              </a:spcAft>
+            </a:pPr>
+            <a:r>
+              <a:rPr lang="en-US" sz="1800" b="0" i="0" dirty="0">
+                <a:solidFill>
+                  <a:srgbClr val="333333"/>
+                </a:solidFill>
+                <a:effectLst/>
+                <a:latin typeface="Bahnschrift SemiLight" panose="020B0502040204020203" pitchFamily="34" charset="0"/>
+              </a:rPr>
+              <a:t>Removed Predictors:</a:t>
+            </a:r>
+          </a:p>
+          <a:p>
+            <a:pPr marL="742950" lvl="1" indent="-285750">
+              <a:spcAft>
+                <a:spcPts val="1300"/>
+              </a:spcAft>
+            </a:pPr>
+            <a:r>
+              <a:rPr lang="en-US" sz="1800" b="0" i="0" dirty="0" err="1">
+                <a:solidFill>
+                  <a:srgbClr val="333333"/>
+                </a:solidFill>
+                <a:effectLst/>
+                <a:latin typeface="Bahnschrift SemiLight" panose="020B0502040204020203" pitchFamily="34" charset="0"/>
+              </a:rPr>
+              <a:t>RestingECG</a:t>
+            </a:r>
+            <a:r>
+              <a:rPr lang="en-US" sz="1800" b="0" i="0" dirty="0">
+                <a:solidFill>
+                  <a:srgbClr val="333333"/>
+                </a:solidFill>
+                <a:effectLst/>
+                <a:latin typeface="Bahnschrift SemiLight" panose="020B0502040204020203" pitchFamily="34" charset="0"/>
+              </a:rPr>
+              <a:t>[“ Normal ”, “ ST ”],  </a:t>
+            </a:r>
+            <a:r>
+              <a:rPr lang="en-US" sz="1800" b="0" i="0" dirty="0" err="1">
+                <a:solidFill>
+                  <a:srgbClr val="333333"/>
+                </a:solidFill>
+                <a:effectLst/>
+                <a:latin typeface="Bahnschrift SemiLight" panose="020B0502040204020203" pitchFamily="34" charset="0"/>
+              </a:rPr>
+              <a:t>RestingBP</a:t>
+            </a:r>
+            <a:r>
+              <a:rPr lang="en-US" sz="1800" dirty="0">
+                <a:solidFill>
+                  <a:srgbClr val="333333"/>
+                </a:solidFill>
+                <a:latin typeface="Bahnschrift SemiLight" panose="020B0502040204020203" pitchFamily="34" charset="0"/>
+              </a:rPr>
+              <a:t>, </a:t>
+            </a:r>
+            <a:r>
+              <a:rPr lang="en-US" sz="1800" b="0" i="0" dirty="0" err="1">
+                <a:solidFill>
+                  <a:srgbClr val="333333"/>
+                </a:solidFill>
+                <a:effectLst/>
+                <a:latin typeface="Bahnschrift SemiLight" panose="020B0502040204020203" pitchFamily="34" charset="0"/>
+              </a:rPr>
+              <a:t>ChestPainType</a:t>
+            </a:r>
+            <a:r>
+              <a:rPr lang="en-US" sz="1800" b="0" i="0" dirty="0">
+                <a:solidFill>
+                  <a:srgbClr val="333333"/>
+                </a:solidFill>
+                <a:effectLst/>
+                <a:latin typeface="Bahnschrift SemiLight" panose="020B0502040204020203" pitchFamily="34" charset="0"/>
+              </a:rPr>
+              <a:t>[“ </a:t>
+            </a:r>
+            <a:r>
+              <a:rPr lang="en-US" sz="1800" dirty="0">
+                <a:solidFill>
+                  <a:srgbClr val="333333"/>
+                </a:solidFill>
+                <a:latin typeface="Bahnschrift SemiLight" panose="020B0502040204020203" pitchFamily="34" charset="0"/>
+              </a:rPr>
+              <a:t>TA ”] </a:t>
+            </a:r>
+          </a:p>
+          <a:p>
+            <a:pPr marL="742950" lvl="1" indent="-285750" algn="r">
+              <a:spcAft>
+                <a:spcPts val="1300"/>
+              </a:spcAft>
+            </a:pPr>
+            <a:endParaRPr lang="en-US" sz="1800" dirty="0">
+              <a:solidFill>
+                <a:srgbClr val="333333"/>
+              </a:solidFill>
+              <a:latin typeface="Bahnschrift SemiLight" panose="020B0502040204020203" pitchFamily="34" charset="0"/>
+            </a:endParaRPr>
+          </a:p>
+          <a:p>
+            <a:pPr marL="285750" indent="-285750">
+              <a:spcAft>
+                <a:spcPts val="1300"/>
+              </a:spcAft>
+            </a:pPr>
+            <a:r>
+              <a:rPr lang="en-US" sz="1800" dirty="0">
+                <a:solidFill>
+                  <a:srgbClr val="333333"/>
+                </a:solidFill>
+                <a:latin typeface="Bahnschrift SemiLight" panose="020B0502040204020203" pitchFamily="34" charset="0"/>
+              </a:rPr>
+              <a:t>Best Predictors (largest absolute magnitude):</a:t>
+            </a:r>
+          </a:p>
+          <a:p>
+            <a:pPr marL="742950" lvl="1" indent="-285750">
+              <a:spcAft>
+                <a:spcPts val="1300"/>
+              </a:spcAft>
+            </a:pPr>
+            <a:r>
+              <a:rPr lang="en-US" sz="1800" dirty="0" err="1">
+                <a:solidFill>
+                  <a:srgbClr val="333333"/>
+                </a:solidFill>
+                <a:latin typeface="Bahnschrift SemiLight" panose="020B0502040204020203" pitchFamily="34" charset="0"/>
+              </a:rPr>
+              <a:t>SexM</a:t>
+            </a:r>
+            <a:r>
+              <a:rPr lang="en-US" sz="1800" dirty="0">
+                <a:solidFill>
+                  <a:srgbClr val="333333"/>
+                </a:solidFill>
+                <a:latin typeface="Bahnschrift SemiLight" panose="020B0502040204020203" pitchFamily="34" charset="0"/>
+              </a:rPr>
+              <a:t>, </a:t>
+            </a:r>
+            <a:r>
+              <a:rPr lang="en-US" sz="1800" dirty="0" err="1">
+                <a:solidFill>
+                  <a:srgbClr val="333333"/>
+                </a:solidFill>
+                <a:latin typeface="Bahnschrift SemiLight" panose="020B0502040204020203" pitchFamily="34" charset="0"/>
+              </a:rPr>
+              <a:t>ChestPainType</a:t>
+            </a:r>
+            <a:r>
+              <a:rPr lang="en-US" sz="1800" dirty="0">
+                <a:solidFill>
+                  <a:srgbClr val="333333"/>
+                </a:solidFill>
+                <a:latin typeface="Bahnschrift SemiLight" panose="020B0502040204020203" pitchFamily="34" charset="0"/>
+              </a:rPr>
+              <a:t>[“ATA, “NAP”], </a:t>
+            </a:r>
+            <a:r>
+              <a:rPr lang="en-US" sz="1800" dirty="0" err="1">
+                <a:solidFill>
+                  <a:srgbClr val="333333"/>
+                </a:solidFill>
+                <a:latin typeface="Bahnschrift SemiLight" panose="020B0502040204020203" pitchFamily="34" charset="0"/>
+              </a:rPr>
+              <a:t>ST_Slope</a:t>
+            </a:r>
+            <a:r>
+              <a:rPr lang="en-US" sz="1800" dirty="0">
+                <a:solidFill>
+                  <a:srgbClr val="333333"/>
+                </a:solidFill>
+                <a:latin typeface="Bahnschrift SemiLight" panose="020B0502040204020203" pitchFamily="34" charset="0"/>
+              </a:rPr>
+              <a:t>[“Up”, “Flat”]</a:t>
+            </a:r>
+          </a:p>
+          <a:p>
+            <a:pPr marL="742950" lvl="1" indent="-285750">
+              <a:spcAft>
+                <a:spcPts val="1300"/>
+              </a:spcAft>
+            </a:pPr>
+            <a:endParaRPr lang="en-US" sz="1800" dirty="0">
+              <a:solidFill>
+                <a:srgbClr val="333333"/>
+              </a:solidFill>
+              <a:latin typeface="Bahnschrift SemiLight" panose="020B0502040204020203" pitchFamily="34" charset="0"/>
+            </a:endParaRPr>
+          </a:p>
+          <a:p>
+            <a:pPr marL="285750" indent="-285750">
+              <a:spcAft>
+                <a:spcPts val="1300"/>
+              </a:spcAft>
+            </a:pPr>
+            <a:endParaRPr lang="en-US" sz="1800" u="sng" dirty="0">
+              <a:solidFill>
+                <a:srgbClr val="333333"/>
+              </a:solidFill>
+              <a:latin typeface="Bahnschrift SemiLight" panose="020B0502040204020203" pitchFamily="34" charset="0"/>
             </a:endParaRPr>
           </a:p>
         </p:txBody>
@@ -12229,8 +13355,8 @@
         </p:blipFill>
         <p:spPr bwMode="auto">
           <a:xfrm>
-            <a:off x="4572000" y="867010"/>
-            <a:ext cx="4259594" cy="3042356"/>
+            <a:off x="5138686" y="717859"/>
+            <a:ext cx="3044114" cy="2174216"/>
           </a:xfrm>
           <a:prstGeom prst="rect">
             <a:avLst/>
@@ -12261,8 +13387,8 @@
         </p:nvSpPr>
         <p:spPr>
           <a:xfrm>
-            <a:off x="5766978" y="4194631"/>
-            <a:ext cx="2415822" cy="1528624"/>
+            <a:off x="4843370" y="2908467"/>
+            <a:ext cx="4247536" cy="887422"/>
           </a:xfrm>
           <a:prstGeom prst="rect">
             <a:avLst/>
@@ -12270,7 +13396,7 @@
           <a:noFill/>
         </p:spPr>
         <p:txBody>
-          <a:bodyPr wrap="square">
+          <a:bodyPr wrap="square" numCol="3">
             <a:spAutoFit/>
           </a:bodyPr>
           <a:lstStyle/>
@@ -12291,7 +13417,7 @@
                 <a:effectLst/>
                 <a:latin typeface="Helvetica Neue"/>
               </a:rPr>
-              <a:t>Accuracy: 0.85</a:t>
+              <a:t>Accuracy: 0.85,   </a:t>
             </a:r>
           </a:p>
           <a:p>
@@ -12322,15 +13448,12 @@
                 <a:spcPts val="1300"/>
               </a:spcAft>
             </a:pPr>
-            <a:r>
-              <a:rPr lang="en-US" sz="1000" dirty="0">
-                <a:solidFill>
-                  <a:srgbClr val="333333"/>
-                </a:solidFill>
-                <a:latin typeface="Helvetica Neue"/>
-              </a:rPr>
-              <a:t>Recall: 0.89</a:t>
-            </a:r>
+            <a:endParaRPr lang="en-US" sz="1000" dirty="0">
+              <a:solidFill>
+                <a:srgbClr val="333333"/>
+              </a:solidFill>
+              <a:latin typeface="Helvetica Neue"/>
+            </a:endParaRPr>
           </a:p>
           <a:p>
             <a:pPr marL="742950" lvl="1" indent="-285750" defTabSz="360000">
@@ -12342,6 +13465,25 @@
               </a:spcAft>
             </a:pPr>
             <a:r>
+              <a:rPr lang="en-US" sz="1000" dirty="0">
+                <a:solidFill>
+                  <a:srgbClr val="333333"/>
+                </a:solidFill>
+                <a:latin typeface="Helvetica Neue"/>
+              </a:rPr>
+              <a:t>Recall: 0.89</a:t>
+            </a:r>
+          </a:p>
+          <a:p>
+            <a:pPr marL="742950" lvl="1" indent="-285750" defTabSz="360000">
+              <a:lnSpc>
+                <a:spcPct val="100000"/>
+              </a:lnSpc>
+              <a:spcAft>
+                <a:spcPts val="1300"/>
+              </a:spcAft>
+            </a:pPr>
+            <a:r>
               <a:rPr lang="en-US" sz="1000" b="0" i="0" dirty="0">
                 <a:solidFill>
                   <a:srgbClr val="333333"/>
@@ -12351,6 +13493,22 @@
               </a:rPr>
               <a:t>F1-Score: 0.86</a:t>
             </a:r>
+          </a:p>
+          <a:p>
+            <a:pPr marL="742950" lvl="1" indent="-285750" defTabSz="360000">
+              <a:lnSpc>
+                <a:spcPct val="100000"/>
+              </a:lnSpc>
+              <a:spcAft>
+                <a:spcPts val="1300"/>
+              </a:spcAft>
+            </a:pPr>
+            <a:endParaRPr lang="en-US" sz="1000" dirty="0">
+              <a:solidFill>
+                <a:srgbClr val="333333"/>
+              </a:solidFill>
+              <a:latin typeface="Helvetica Neue"/>
+            </a:endParaRPr>
           </a:p>
           <a:p>
             <a:pPr marL="742950" lvl="1" indent="-285750" defTabSz="360000">
@@ -12380,6 +13538,66 @@
           </a:p>
         </p:txBody>
       </p:sp>
+      <p:pic>
+        <p:nvPicPr>
+          <p:cNvPr id="6" name="Immagine 5">
+            <a:extLst>
+              <a:ext uri="{FF2B5EF4-FFF2-40B4-BE49-F238E27FC236}">
+                <a16:creationId xmlns:a16="http://schemas.microsoft.com/office/drawing/2014/main" id="{35A7E7C0-7011-F579-7E8E-685C0EA6172B}"/>
+              </a:ext>
+            </a:extLst>
+          </p:cNvPr>
+          <p:cNvPicPr>
+            <a:picLocks noChangeAspect="1"/>
+          </p:cNvPicPr>
+          <p:nvPr/>
+        </p:nvPicPr>
+        <p:blipFill>
+          <a:blip r:embed="rId4"/>
+          <a:stretch>
+            <a:fillRect/>
+          </a:stretch>
+        </p:blipFill>
+        <p:spPr>
+          <a:xfrm>
+            <a:off x="7045343" y="3710043"/>
+            <a:ext cx="1921304" cy="2276454"/>
+          </a:xfrm>
+          <a:prstGeom prst="rect">
+            <a:avLst/>
+          </a:prstGeom>
+        </p:spPr>
+      </p:pic>
+      <p:pic>
+        <p:nvPicPr>
+          <p:cNvPr id="8" name="Immagine 7">
+            <a:extLst>
+              <a:ext uri="{FF2B5EF4-FFF2-40B4-BE49-F238E27FC236}">
+                <a16:creationId xmlns:a16="http://schemas.microsoft.com/office/drawing/2014/main" id="{94C5AFB5-D549-9F78-E369-475A05AD3811}"/>
+              </a:ext>
+            </a:extLst>
+          </p:cNvPr>
+          <p:cNvPicPr>
+            <a:picLocks noChangeAspect="1"/>
+          </p:cNvPicPr>
+          <p:nvPr/>
+        </p:nvPicPr>
+        <p:blipFill>
+          <a:blip r:embed="rId5"/>
+          <a:stretch>
+            <a:fillRect/>
+          </a:stretch>
+        </p:blipFill>
+        <p:spPr>
+          <a:xfrm>
+            <a:off x="5256737" y="3710043"/>
+            <a:ext cx="1289116" cy="2140060"/>
+          </a:xfrm>
+          <a:prstGeom prst="rect">
+            <a:avLst/>
+          </a:prstGeom>
+        </p:spPr>
+      </p:pic>
     </p:spTree>
     <p:extLst>
       <p:ext uri="{BB962C8B-B14F-4D97-AF65-F5344CB8AC3E}">
@@ -12481,7 +13699,7 @@
         <p:spPr>
           <a:xfrm>
             <a:off x="0" y="733778"/>
-            <a:ext cx="9144000" cy="6124222"/>
+            <a:ext cx="5368413" cy="6124222"/>
           </a:xfrm>
           <a:prstGeom prst="rect">
             <a:avLst/>
@@ -12493,89 +13711,346 @@
           </a:bodyPr>
           <a:lstStyle/>
           <a:p>
-            <a:pPr marL="0" indent="0">
+            <a:pPr marL="342900" indent="-342900">
               <a:spcAft>
                 <a:spcPts val="1300"/>
               </a:spcAft>
-              <a:buNone/>
-            </a:pPr>
-            <a:r>
-              <a:rPr lang="en-US" sz="2000" b="0" i="0" dirty="0">
+            </a:pPr>
+            <a:r>
+              <a:rPr lang="en-US" sz="1800" dirty="0">
                 <a:solidFill>
                   <a:srgbClr val="333333"/>
                 </a:solidFill>
-                <a:effectLst/>
-                <a:latin typeface="Helvetica Neue"/>
-              </a:rPr>
-              <a:t>Best </a:t>
-            </a:r>
-            <a:r>
-              <a:rPr lang="el-GR" sz="2000" b="1" i="0" dirty="0">
-                <a:solidFill>
-                  <a:srgbClr val="202122"/>
-                </a:solidFill>
-                <a:effectLst/>
-                <a:latin typeface="Arial" panose="020B0604020202020204" pitchFamily="34" charset="0"/>
-              </a:rPr>
-              <a:t>λ</a:t>
-            </a:r>
-            <a:r>
-              <a:rPr lang="en-US" sz="2000" dirty="0">
+                <a:latin typeface="Bahnschrift SemiLight" panose="020B0502040204020203" pitchFamily="34" charset="0"/>
+              </a:rPr>
+              <a:t>Cross-validation performed with </a:t>
+            </a:r>
+            <a:r>
+              <a:rPr lang="en-US" sz="1800" dirty="0" err="1">
                 <a:solidFill>
                   <a:srgbClr val="333333"/>
                 </a:solidFill>
-                <a:latin typeface="Helvetica Neue"/>
-              </a:rPr>
-              <a:t>: </a:t>
-            </a:r>
-            <a:r>
-              <a:rPr lang="it-IT" sz="2000" b="0" i="0" u="none" strike="noStrike" baseline="0" dirty="0">
-                <a:latin typeface="CenturyGothic"/>
-              </a:rPr>
-              <a:t>~ </a:t>
-            </a:r>
-            <a:r>
-              <a:rPr lang="en-US" sz="2000" b="0" i="0" dirty="0">
-                <a:solidFill>
-                  <a:srgbClr val="333333"/>
-                </a:solidFill>
-                <a:effectLst/>
-                <a:latin typeface="Helvetica Neue"/>
-              </a:rPr>
-              <a:t>0.031</a:t>
-            </a:r>
-          </a:p>
-          <a:p>
-            <a:pPr marL="0" indent="0">
-              <a:spcAft>
-                <a:spcPts val="1300"/>
-              </a:spcAft>
-              <a:buNone/>
-            </a:pPr>
-            <a:endParaRPr lang="en-US" sz="2000" dirty="0">
+                <a:latin typeface="Bahnschrift SemiLight" panose="020B0502040204020203" pitchFamily="34" charset="0"/>
+              </a:rPr>
+              <a:t>glmnet</a:t>
+            </a:r>
+            <a:endParaRPr lang="en-US" sz="1800" b="0" i="0" dirty="0">
               <a:solidFill>
                 <a:srgbClr val="333333"/>
               </a:solidFill>
-              <a:latin typeface="Helvetica Neue"/>
+              <a:effectLst/>
+              <a:latin typeface="Bahnschrift SemiLight" panose="020B0502040204020203" pitchFamily="34" charset="0"/>
             </a:endParaRPr>
           </a:p>
           <a:p>
+            <a:pPr marL="800100" lvl="1" indent="-342900">
+              <a:spcAft>
+                <a:spcPts val="1300"/>
+              </a:spcAft>
+            </a:pPr>
+            <a:r>
+              <a:rPr lang="en-US" sz="1800" b="0" i="0" dirty="0">
+                <a:solidFill>
+                  <a:srgbClr val="333333"/>
+                </a:solidFill>
+                <a:effectLst/>
+                <a:latin typeface="Bahnschrift SemiLight" panose="020B0502040204020203" pitchFamily="34" charset="0"/>
+              </a:rPr>
+              <a:t>Best </a:t>
+            </a:r>
+            <a:r>
+              <a:rPr lang="el-GR" sz="1800" b="1" i="0" dirty="0">
+                <a:solidFill>
+                  <a:srgbClr val="202122"/>
+                </a:solidFill>
+                <a:effectLst/>
+                <a:latin typeface="Bahnschrift SemiLight" panose="020B0502040204020203" pitchFamily="34" charset="0"/>
+              </a:rPr>
+              <a:t>λ</a:t>
+            </a:r>
+            <a:r>
+              <a:rPr lang="en-US" sz="1800" dirty="0">
+                <a:solidFill>
+                  <a:srgbClr val="333333"/>
+                </a:solidFill>
+                <a:latin typeface="Bahnschrift SemiLight" panose="020B0502040204020203" pitchFamily="34" charset="0"/>
+              </a:rPr>
+              <a:t>: </a:t>
+            </a:r>
+            <a:r>
+              <a:rPr lang="it-IT" sz="1800" b="0" i="0" u="none" strike="noStrike" baseline="0" dirty="0">
+                <a:latin typeface="Bahnschrift SemiLight" panose="020B0502040204020203" pitchFamily="34" charset="0"/>
+              </a:rPr>
+              <a:t>~ </a:t>
+            </a:r>
+            <a:r>
+              <a:rPr lang="en-US" sz="1800" b="0" i="0" dirty="0">
+                <a:solidFill>
+                  <a:srgbClr val="333333"/>
+                </a:solidFill>
+                <a:effectLst/>
+                <a:latin typeface="Bahnschrift SemiLight" panose="020B0502040204020203" pitchFamily="34" charset="0"/>
+              </a:rPr>
+              <a:t>0.031</a:t>
+            </a:r>
+          </a:p>
+          <a:p>
+            <a:pPr marL="457200" lvl="1" indent="0">
+              <a:spcAft>
+                <a:spcPts val="1300"/>
+              </a:spcAft>
+              <a:buNone/>
+            </a:pPr>
+            <a:r>
+              <a:rPr lang="en-US" sz="1800" dirty="0">
+                <a:solidFill>
+                  <a:srgbClr val="333333"/>
+                </a:solidFill>
+                <a:latin typeface="Bahnschrift SemiLight" panose="020B0502040204020203" pitchFamily="34" charset="0"/>
+              </a:rPr>
+              <a:t>	</a:t>
+            </a:r>
+          </a:p>
+          <a:p>
+            <a:pPr marL="285750" indent="-285750">
+              <a:spcAft>
+                <a:spcPts val="1300"/>
+              </a:spcAft>
+            </a:pPr>
+            <a:r>
+              <a:rPr lang="en-US" sz="1800" dirty="0">
+                <a:solidFill>
+                  <a:srgbClr val="333333"/>
+                </a:solidFill>
+                <a:latin typeface="Bahnschrift SemiLight" panose="020B0502040204020203" pitchFamily="34" charset="0"/>
+              </a:rPr>
+              <a:t>Less Important</a:t>
+            </a:r>
+            <a:r>
+              <a:rPr lang="en-US" sz="1800" b="0" i="0" dirty="0">
+                <a:solidFill>
+                  <a:srgbClr val="333333"/>
+                </a:solidFill>
+                <a:effectLst/>
+                <a:latin typeface="Bahnschrift SemiLight" panose="020B0502040204020203" pitchFamily="34" charset="0"/>
+              </a:rPr>
+              <a:t> Predictors:</a:t>
+            </a:r>
+          </a:p>
+          <a:p>
+            <a:pPr marL="742950" lvl="1" indent="-285750">
+              <a:spcAft>
+                <a:spcPts val="1300"/>
+              </a:spcAft>
+            </a:pPr>
+            <a:r>
+              <a:rPr lang="en-US" sz="1800" b="0" i="0" dirty="0" err="1">
+                <a:solidFill>
+                  <a:srgbClr val="333333"/>
+                </a:solidFill>
+                <a:effectLst/>
+                <a:latin typeface="Bahnschrift SemiLight" panose="020B0502040204020203" pitchFamily="34" charset="0"/>
+              </a:rPr>
+              <a:t>RestingBP</a:t>
+            </a:r>
+            <a:r>
+              <a:rPr lang="en-US" sz="1800" b="0" i="0" dirty="0">
+                <a:solidFill>
+                  <a:srgbClr val="333333"/>
+                </a:solidFill>
+                <a:effectLst/>
+                <a:latin typeface="Bahnschrift SemiLight" panose="020B0502040204020203" pitchFamily="34" charset="0"/>
+              </a:rPr>
+              <a:t>, </a:t>
+            </a:r>
+            <a:r>
+              <a:rPr lang="en-US" sz="1800" b="0" i="0" dirty="0" err="1">
+                <a:solidFill>
+                  <a:srgbClr val="333333"/>
+                </a:solidFill>
+                <a:effectLst/>
+                <a:latin typeface="Bahnschrift SemiLight" panose="020B0502040204020203" pitchFamily="34" charset="0"/>
+              </a:rPr>
+              <a:t>RestingECG</a:t>
+            </a:r>
+            <a:r>
+              <a:rPr lang="en-US" sz="1800" b="0" i="0" dirty="0">
+                <a:solidFill>
+                  <a:srgbClr val="333333"/>
+                </a:solidFill>
+                <a:effectLst/>
+                <a:latin typeface="Bahnschrift SemiLight" panose="020B0502040204020203" pitchFamily="34" charset="0"/>
+              </a:rPr>
+              <a:t>[“Normal”, “ST”], </a:t>
+            </a:r>
+            <a:r>
+              <a:rPr lang="en-US" sz="1800" b="0" i="0" dirty="0" err="1">
+                <a:solidFill>
+                  <a:srgbClr val="333333"/>
+                </a:solidFill>
+                <a:effectLst/>
+                <a:latin typeface="Bahnschrift SemiLight" panose="020B0502040204020203" pitchFamily="34" charset="0"/>
+              </a:rPr>
+              <a:t>MaxHR</a:t>
+            </a:r>
+            <a:r>
+              <a:rPr lang="en-US" sz="1800" dirty="0">
+                <a:solidFill>
+                  <a:srgbClr val="333333"/>
+                </a:solidFill>
+                <a:latin typeface="Bahnschrift SemiLight" panose="020B0502040204020203" pitchFamily="34" charset="0"/>
+              </a:rPr>
+              <a:t>, </a:t>
+            </a:r>
+            <a:r>
+              <a:rPr lang="en-US" sz="1800" dirty="0" err="1">
+                <a:solidFill>
+                  <a:srgbClr val="333333"/>
+                </a:solidFill>
+                <a:latin typeface="Bahnschrift SemiLight" panose="020B0502040204020203" pitchFamily="34" charset="0"/>
+              </a:rPr>
+              <a:t>Oldpeak</a:t>
+            </a:r>
+            <a:endParaRPr lang="en-US" sz="1800" dirty="0">
+              <a:solidFill>
+                <a:srgbClr val="333333"/>
+              </a:solidFill>
+              <a:latin typeface="Bahnschrift SemiLight" panose="020B0502040204020203" pitchFamily="34" charset="0"/>
+            </a:endParaRPr>
+          </a:p>
+          <a:p>
+            <a:pPr marL="742950" lvl="1" indent="-285750">
+              <a:spcAft>
+                <a:spcPts val="1300"/>
+              </a:spcAft>
+            </a:pPr>
+            <a:endParaRPr lang="en-US" sz="1800" dirty="0">
+              <a:solidFill>
+                <a:srgbClr val="333333"/>
+              </a:solidFill>
+              <a:latin typeface="Bahnschrift SemiLight" panose="020B0502040204020203" pitchFamily="34" charset="0"/>
+            </a:endParaRPr>
+          </a:p>
+          <a:p>
+            <a:pPr marL="285750" indent="-285750">
+              <a:spcAft>
+                <a:spcPts val="1300"/>
+              </a:spcAft>
+            </a:pPr>
+            <a:r>
+              <a:rPr lang="en-US" sz="1800" dirty="0">
+                <a:solidFill>
+                  <a:srgbClr val="333333"/>
+                </a:solidFill>
+                <a:latin typeface="Bahnschrift SemiLight" panose="020B0502040204020203" pitchFamily="34" charset="0"/>
+              </a:rPr>
+              <a:t>Best Predictors (largest absolute magnitude):</a:t>
+            </a:r>
+          </a:p>
+          <a:p>
+            <a:pPr marL="742950" lvl="1" indent="-285750">
+              <a:spcAft>
+                <a:spcPts val="1300"/>
+              </a:spcAft>
+            </a:pPr>
+            <a:r>
+              <a:rPr lang="en-US" sz="1800" dirty="0" err="1">
+                <a:solidFill>
+                  <a:srgbClr val="333333"/>
+                </a:solidFill>
+                <a:latin typeface="Bahnschrift SemiLight" panose="020B0502040204020203" pitchFamily="34" charset="0"/>
+              </a:rPr>
+              <a:t>SexM</a:t>
+            </a:r>
+            <a:r>
+              <a:rPr lang="en-US" sz="1800" dirty="0">
+                <a:solidFill>
+                  <a:srgbClr val="333333"/>
+                </a:solidFill>
+                <a:latin typeface="Bahnschrift SemiLight" panose="020B0502040204020203" pitchFamily="34" charset="0"/>
+              </a:rPr>
+              <a:t>, </a:t>
+            </a:r>
+            <a:r>
+              <a:rPr lang="en-US" sz="1800" dirty="0" err="1">
+                <a:solidFill>
+                  <a:srgbClr val="333333"/>
+                </a:solidFill>
+                <a:latin typeface="Bahnschrift SemiLight" panose="020B0502040204020203" pitchFamily="34" charset="0"/>
+              </a:rPr>
+              <a:t>ChestPainType</a:t>
+            </a:r>
+            <a:r>
+              <a:rPr lang="en-US" sz="1800" dirty="0">
+                <a:solidFill>
+                  <a:srgbClr val="333333"/>
+                </a:solidFill>
+                <a:latin typeface="Bahnschrift SemiLight" panose="020B0502040204020203" pitchFamily="34" charset="0"/>
+              </a:rPr>
+              <a:t>[“ATA, “NAP”], </a:t>
+            </a:r>
+            <a:r>
+              <a:rPr lang="en-US" sz="1800" dirty="0" err="1">
+                <a:solidFill>
+                  <a:srgbClr val="333333"/>
+                </a:solidFill>
+                <a:latin typeface="Bahnschrift SemiLight" panose="020B0502040204020203" pitchFamily="34" charset="0"/>
+              </a:rPr>
+              <a:t>ST_Slope</a:t>
+            </a:r>
+            <a:r>
+              <a:rPr lang="en-US" sz="1800" dirty="0">
+                <a:solidFill>
+                  <a:srgbClr val="333333"/>
+                </a:solidFill>
+                <a:latin typeface="Bahnschrift SemiLight" panose="020B0502040204020203" pitchFamily="34" charset="0"/>
+              </a:rPr>
+              <a:t>[“Up”, “Flat”]</a:t>
+            </a:r>
+          </a:p>
+          <a:p>
+            <a:pPr marL="457200" lvl="1" indent="0">
+              <a:spcAft>
+                <a:spcPts val="1300"/>
+              </a:spcAft>
+              <a:buNone/>
+            </a:pPr>
+            <a:endParaRPr lang="en-US" sz="1800" b="0" i="0" dirty="0">
+              <a:solidFill>
+                <a:srgbClr val="333333"/>
+              </a:solidFill>
+              <a:effectLst/>
+              <a:latin typeface="Bahnschrift SemiLight" panose="020B0502040204020203" pitchFamily="34" charset="0"/>
+            </a:endParaRPr>
+          </a:p>
+          <a:p>
+            <a:pPr marL="457200" lvl="1" indent="0">
+              <a:spcAft>
+                <a:spcPts val="1300"/>
+              </a:spcAft>
+              <a:buNone/>
+            </a:pPr>
+            <a:endParaRPr lang="en-US" sz="1800" b="0" i="0" dirty="0">
+              <a:solidFill>
+                <a:srgbClr val="333333"/>
+              </a:solidFill>
+              <a:effectLst/>
+              <a:latin typeface="Bahnschrift SemiLight" panose="020B0502040204020203" pitchFamily="34" charset="0"/>
+            </a:endParaRPr>
+          </a:p>
+          <a:p>
             <a:pPr marL="0" indent="0">
               <a:spcAft>
                 <a:spcPts val="1300"/>
               </a:spcAft>
               <a:buNone/>
             </a:pPr>
-            <a:r>
-              <a:rPr lang="en-US" sz="2000" b="0" i="0" dirty="0">
-                <a:solidFill>
-                  <a:srgbClr val="333333"/>
-                </a:solidFill>
-                <a:effectLst/>
-                <a:latin typeface="Helvetica Neue"/>
-              </a:rPr>
-              <a:t>Cross-validated</a:t>
-            </a:r>
+            <a:endParaRPr lang="en-US" sz="1800" dirty="0">
+              <a:solidFill>
+                <a:srgbClr val="333333"/>
+              </a:solidFill>
+              <a:latin typeface="Bahnschrift SemiLight" panose="020B0502040204020203" pitchFamily="34" charset="0"/>
+            </a:endParaRPr>
           </a:p>
         </p:txBody>
       </p:sp>
@@ -12648,8 +14123,8 @@
         </p:blipFill>
         <p:spPr bwMode="auto">
           <a:xfrm>
-            <a:off x="5368413" y="815678"/>
-            <a:ext cx="3634002" cy="2595534"/>
+            <a:off x="5517434" y="733778"/>
+            <a:ext cx="3049966" cy="2178395"/>
           </a:xfrm>
           <a:prstGeom prst="rect">
             <a:avLst/>
@@ -12680,8 +14155,8 @@
         </p:nvSpPr>
         <p:spPr>
           <a:xfrm>
-            <a:off x="6067777" y="3634002"/>
-            <a:ext cx="2415822" cy="1528624"/>
+            <a:off x="5205014" y="2949044"/>
+            <a:ext cx="4141347" cy="934358"/>
           </a:xfrm>
           <a:prstGeom prst="rect">
             <a:avLst/>
@@ -12689,7 +14164,7 @@
           <a:noFill/>
         </p:spPr>
         <p:txBody>
-          <a:bodyPr wrap="square">
+          <a:bodyPr wrap="square" numCol="3">
             <a:spAutoFit/>
           </a:bodyPr>
           <a:lstStyle/>
@@ -12741,15 +14216,12 @@
                 <a:spcPts val="1300"/>
               </a:spcAft>
             </a:pPr>
-            <a:r>
-              <a:rPr lang="en-US" sz="1000" dirty="0">
-                <a:solidFill>
-                  <a:srgbClr val="333333"/>
-                </a:solidFill>
-                <a:latin typeface="Helvetica Neue"/>
-              </a:rPr>
-              <a:t>Recall: 0.91</a:t>
-            </a:r>
+            <a:endParaRPr lang="en-US" sz="1000" dirty="0">
+              <a:solidFill>
+                <a:srgbClr val="333333"/>
+              </a:solidFill>
+              <a:latin typeface="Helvetica Neue"/>
+            </a:endParaRPr>
           </a:p>
           <a:p>
             <a:pPr marL="742950" lvl="1" indent="-285750" defTabSz="360000">
@@ -12761,6 +14233,25 @@
               </a:spcAft>
             </a:pPr>
             <a:r>
+              <a:rPr lang="en-US" sz="1000" dirty="0">
+                <a:solidFill>
+                  <a:srgbClr val="333333"/>
+                </a:solidFill>
+                <a:latin typeface="Helvetica Neue"/>
+              </a:rPr>
+              <a:t>Recall: 0.91</a:t>
+            </a:r>
+          </a:p>
+          <a:p>
+            <a:pPr marL="742950" lvl="1" indent="-285750" defTabSz="360000">
+              <a:lnSpc>
+                <a:spcPct val="100000"/>
+              </a:lnSpc>
+              <a:spcAft>
+                <a:spcPts val="1300"/>
+              </a:spcAft>
+            </a:pPr>
+            <a:r>
               <a:rPr lang="en-US" sz="1000" b="0" i="0" dirty="0">
                 <a:solidFill>
                   <a:srgbClr val="333333"/>
@@ -12770,6 +14261,22 @@
               </a:rPr>
               <a:t>F1-Score: 0.88</a:t>
             </a:r>
+          </a:p>
+          <a:p>
+            <a:pPr marL="742950" lvl="1" indent="-285750" defTabSz="360000">
+              <a:lnSpc>
+                <a:spcPct val="100000"/>
+              </a:lnSpc>
+              <a:spcAft>
+                <a:spcPts val="1300"/>
+              </a:spcAft>
+            </a:pPr>
+            <a:endParaRPr lang="en-US" sz="1000" dirty="0">
+              <a:solidFill>
+                <a:srgbClr val="333333"/>
+              </a:solidFill>
+              <a:latin typeface="Helvetica Neue"/>
+            </a:endParaRPr>
           </a:p>
           <a:p>
             <a:pPr marL="742950" lvl="1" indent="-285750" defTabSz="360000">
@@ -12799,6 +14306,36 @@
           </a:p>
         </p:txBody>
       </p:sp>
+      <p:pic>
+        <p:nvPicPr>
+          <p:cNvPr id="4" name="Immagine 3">
+            <a:extLst>
+              <a:ext uri="{FF2B5EF4-FFF2-40B4-BE49-F238E27FC236}">
+                <a16:creationId xmlns:a16="http://schemas.microsoft.com/office/drawing/2014/main" id="{0BA308BC-CDE8-CD12-989C-CB74EBFFE779}"/>
+              </a:ext>
+            </a:extLst>
+          </p:cNvPr>
+          <p:cNvPicPr>
+            <a:picLocks noChangeAspect="1"/>
+          </p:cNvPicPr>
+          <p:nvPr/>
+        </p:nvPicPr>
+        <p:blipFill>
+          <a:blip r:embed="rId4"/>
+          <a:stretch>
+            <a:fillRect/>
+          </a:stretch>
+        </p:blipFill>
+        <p:spPr>
+          <a:xfrm>
+            <a:off x="5751475" y="3741008"/>
+            <a:ext cx="1900384" cy="2219010"/>
+          </a:xfrm>
+          <a:prstGeom prst="rect">
+            <a:avLst/>
+          </a:prstGeom>
+        </p:spPr>
+      </p:pic>
     </p:spTree>
     <p:extLst>
       <p:ext uri="{BB962C8B-B14F-4D97-AF65-F5344CB8AC3E}">
@@ -12923,8 +14460,8 @@
         </p:nvSpPr>
         <p:spPr>
           <a:xfrm>
-            <a:off x="0" y="733778"/>
-            <a:ext cx="5268124" cy="6124222"/>
+            <a:off x="0" y="732209"/>
+            <a:ext cx="4734875" cy="5420817"/>
           </a:xfrm>
           <a:prstGeom prst="rect">
             <a:avLst/>
@@ -12948,7 +14485,7 @@
                   <a:srgbClr val="333333"/>
                 </a:solidFill>
                 <a:effectLst/>
-                <a:latin typeface="Helvetica Neue"/>
+                <a:latin typeface="Bahnschrift SemiLight" panose="020B0502040204020203" pitchFamily="34" charset="0"/>
               </a:rPr>
               <a:t>The Naive Bayes Classifier is a classification technique based on Bayes’ Theorem with an independence assumption among predictors. </a:t>
             </a:r>
@@ -12966,9 +14503,75 @@
                   <a:srgbClr val="333333"/>
                 </a:solidFill>
                 <a:effectLst/>
-                <a:latin typeface="Helvetica Neue"/>
+                <a:latin typeface="Bahnschrift SemiLight" panose="020B0502040204020203" pitchFamily="34" charset="0"/>
               </a:rPr>
               <a:t>In simple terms, a Naive Bayes classifier assumes that the presence of a particular feature in a class is unrelated to the presence of any other feature.</a:t>
+            </a:r>
+          </a:p>
+          <a:p>
+            <a:pPr marL="0" indent="0">
+              <a:spcAft>
+                <a:spcPts val="1300"/>
+              </a:spcAft>
+              <a:buNone/>
+            </a:pPr>
+            <a:endParaRPr lang="en-US" sz="1800" b="0" i="0" dirty="0">
+              <a:solidFill>
+                <a:srgbClr val="333333"/>
+              </a:solidFill>
+              <a:effectLst/>
+              <a:latin typeface="Bahnschrift SemiLight" panose="020B0502040204020203" pitchFamily="34" charset="0"/>
+            </a:endParaRPr>
+          </a:p>
+          <a:p>
+            <a:pPr marL="285750" indent="-285750">
+              <a:spcAft>
+                <a:spcPts val="1300"/>
+              </a:spcAft>
+            </a:pPr>
+            <a:r>
+              <a:rPr lang="en-US" sz="1800" b="0" i="0" dirty="0">
+                <a:solidFill>
+                  <a:srgbClr val="333333"/>
+                </a:solidFill>
+                <a:effectLst/>
+                <a:latin typeface="Bahnschrift SemiLight" panose="020B0502040204020203" pitchFamily="34" charset="0"/>
+              </a:rPr>
+              <a:t>Does not perform explicit feature selection</a:t>
+            </a:r>
+          </a:p>
+          <a:p>
+            <a:pPr marL="285750" indent="-285750">
+              <a:spcAft>
+                <a:spcPts val="1300"/>
+              </a:spcAft>
+            </a:pPr>
+            <a:r>
+              <a:rPr lang="en-US" sz="1800" b="0" i="0" dirty="0">
+                <a:solidFill>
+                  <a:srgbClr val="333333"/>
+                </a:solidFill>
+                <a:effectLst/>
+                <a:latin typeface="Bahnschrift SemiLight" panose="020B0502040204020203" pitchFamily="34" charset="0"/>
+              </a:rPr>
+              <a:t>But assigns higher importance to features that have a stronger influence on class probabilities</a:t>
+            </a:r>
+          </a:p>
+          <a:p>
+            <a:pPr marL="285750" indent="-285750">
+              <a:spcAft>
+                <a:spcPts val="1300"/>
+              </a:spcAft>
+            </a:pPr>
+            <a:r>
+              <a:rPr lang="en-US" sz="1800" b="0" i="0" dirty="0">
+                <a:solidFill>
+                  <a:srgbClr val="333333"/>
+                </a:solidFill>
+                <a:effectLst/>
+                <a:latin typeface="Bahnschrift SemiLight" panose="020B0502040204020203" pitchFamily="34" charset="0"/>
+              </a:rPr>
+              <a:t>Best threshold: 0.6</a:t>
             </a:r>
           </a:p>
           <a:p>
@@ -12982,7 +14585,7 @@
               <a:solidFill>
                 <a:srgbClr val="333333"/>
               </a:solidFill>
-              <a:latin typeface="Helvetica Neue"/>
+              <a:latin typeface="Bahnschrift SemiLight" panose="020B0502040204020203" pitchFamily="34" charset="0"/>
             </a:endParaRPr>
           </a:p>
           <a:p>
@@ -12996,7 +14599,7 @@
               <a:solidFill>
                 <a:srgbClr val="333333"/>
               </a:solidFill>
-              <a:latin typeface="Helvetica Neue"/>
+              <a:latin typeface="Bahnschrift SemiLight" panose="020B0502040204020203" pitchFamily="34" charset="0"/>
             </a:endParaRPr>
           </a:p>
         </p:txBody>
@@ -13055,8 +14658,8 @@
         </p:nvSpPr>
         <p:spPr>
           <a:xfrm>
-            <a:off x="6067777" y="3634002"/>
-            <a:ext cx="2415822" cy="1528624"/>
+            <a:off x="4681967" y="3734540"/>
+            <a:ext cx="4389120" cy="733534"/>
           </a:xfrm>
           <a:prstGeom prst="rect">
             <a:avLst/>
@@ -13064,7 +14667,7 @@
           <a:noFill/>
         </p:spPr>
         <p:txBody>
-          <a:bodyPr wrap="square">
+          <a:bodyPr wrap="square" numCol="3">
             <a:spAutoFit/>
           </a:bodyPr>
           <a:lstStyle/>
@@ -13203,8 +14806,8 @@
         </p:blipFill>
         <p:spPr bwMode="auto">
           <a:xfrm>
-            <a:off x="5725323" y="960733"/>
-            <a:ext cx="3140392" cy="2242980"/>
+            <a:off x="4877475" y="960733"/>
+            <a:ext cx="3809326" cy="2720757"/>
           </a:xfrm>
           <a:prstGeom prst="rect">
             <a:avLst/>
@@ -13225,6 +14828,815 @@
     <p:extLst>
       <p:ext uri="{BB962C8B-B14F-4D97-AF65-F5344CB8AC3E}">
         <p14:creationId xmlns:p14="http://schemas.microsoft.com/office/powerpoint/2010/main" val="3339340731"/>
+      </p:ext>
+    </p:extLst>
+  </p:cSld>
+  <p:clrMapOvr>
+    <a:masterClrMapping/>
+  </p:clrMapOvr>
+</p:sld>
+</file>
+
+<file path=ppt/slides/slide18.xml><?xml version="1.0" encoding="utf-8"?>
+<p:sld xmlns:a="http://schemas.openxmlformats.org/drawingml/2006/main" xmlns:r="http://schemas.openxmlformats.org/officeDocument/2006/relationships" xmlns:p="http://schemas.openxmlformats.org/presentationml/2006/main">
+  <p:cSld>
+    <p:spTree>
+      <p:nvGrpSpPr>
+        <p:cNvPr id="1" name="Shape 160"/>
+        <p:cNvGrpSpPr/>
+        <p:nvPr/>
+      </p:nvGrpSpPr>
+      <p:grpSpPr>
+        <a:xfrm>
+          <a:off x="0" y="0"/>
+          <a:ext cx="0" cy="0"/>
+          <a:chOff x="0" y="0"/>
+          <a:chExt cx="0" cy="0"/>
+        </a:xfrm>
+      </p:grpSpPr>
+      <p:sp>
+        <p:nvSpPr>
+          <p:cNvPr id="161" name="Shape 161"/>
+          <p:cNvSpPr txBox="1">
+            <a:spLocks noGrp="1"/>
+          </p:cNvSpPr>
+          <p:nvPr>
+            <p:ph type="title" idx="4294967295"/>
+          </p:nvPr>
+        </p:nvSpPr>
+        <p:spPr>
+          <a:xfrm>
+            <a:off x="457199" y="-182567"/>
+            <a:ext cx="6818489" cy="1143300"/>
+          </a:xfrm>
+          <a:prstGeom prst="rect">
+            <a:avLst/>
+          </a:prstGeom>
+        </p:spPr>
+        <p:txBody>
+          <a:bodyPr spcFirstLastPara="1" wrap="square" lIns="82925" tIns="82925" rIns="82925" bIns="82925" anchor="ctr" anchorCtr="0">
+            <a:noAutofit/>
+          </a:bodyPr>
+          <a:lstStyle/>
+          <a:p>
+            <a:pPr marL="0" lvl="0" indent="0" rtl="0">
+              <a:spcBef>
+                <a:spcPts val="0"/>
+              </a:spcBef>
+              <a:spcAft>
+                <a:spcPts val="0"/>
+              </a:spcAft>
+              <a:buNone/>
+            </a:pPr>
+            <a:r>
+              <a:rPr lang="it-IT" sz="3000" b="1" dirty="0">
+                <a:solidFill>
+                  <a:srgbClr val="FFFFFF"/>
+                </a:solidFill>
+              </a:rPr>
+              <a:t>Best Models</a:t>
+            </a:r>
+            <a:endParaRPr sz="3000" b="1" dirty="0">
+              <a:solidFill>
+                <a:srgbClr val="FFFFFF"/>
+              </a:solidFill>
+            </a:endParaRPr>
+          </a:p>
+        </p:txBody>
+      </p:sp>
+      <p:sp>
+        <p:nvSpPr>
+          <p:cNvPr id="162" name="Shape 162"/>
+          <p:cNvSpPr txBox="1">
+            <a:spLocks noGrp="1"/>
+          </p:cNvSpPr>
+          <p:nvPr>
+            <p:ph type="body" idx="4294967295"/>
+          </p:nvPr>
+        </p:nvSpPr>
+        <p:spPr>
+          <a:xfrm>
+            <a:off x="0" y="733778"/>
+            <a:ext cx="4294730" cy="6124222"/>
+          </a:xfrm>
+          <a:prstGeom prst="rect">
+            <a:avLst/>
+          </a:prstGeom>
+        </p:spPr>
+        <p:txBody>
+          <a:bodyPr spcFirstLastPara="1" wrap="square" lIns="82925" tIns="82925" rIns="82925" bIns="82925" anchor="t" anchorCtr="0">
+            <a:noAutofit/>
+          </a:bodyPr>
+          <a:lstStyle/>
+          <a:p>
+            <a:pPr marL="285750" indent="-285750">
+              <a:spcAft>
+                <a:spcPts val="1300"/>
+              </a:spcAft>
+            </a:pPr>
+            <a:r>
+              <a:rPr lang="en-US" sz="1800" b="0" i="0" dirty="0">
+                <a:solidFill>
+                  <a:srgbClr val="333333"/>
+                </a:solidFill>
+                <a:effectLst/>
+                <a:latin typeface="Bahnschrift SemiLight" panose="020B0502040204020203" pitchFamily="34" charset="0"/>
+              </a:rPr>
+              <a:t>All models perform relatively good, with similar ROCs and each with their own strengths and weaknesses in their metrics.</a:t>
+            </a:r>
+          </a:p>
+          <a:p>
+            <a:pPr marL="285750" indent="-285750">
+              <a:spcAft>
+                <a:spcPts val="1300"/>
+              </a:spcAft>
+            </a:pPr>
+            <a:r>
+              <a:rPr lang="en-US" sz="1800" dirty="0">
+                <a:solidFill>
+                  <a:srgbClr val="333333"/>
+                </a:solidFill>
+                <a:latin typeface="Bahnschrift SemiLight" panose="020B0502040204020203" pitchFamily="34" charset="0"/>
+              </a:rPr>
+              <a:t>Considering Recall as most important, the best models are:</a:t>
+            </a:r>
+          </a:p>
+          <a:p>
+            <a:pPr marL="742950" lvl="1" indent="-285750">
+              <a:spcAft>
+                <a:spcPts val="1300"/>
+              </a:spcAft>
+            </a:pPr>
+            <a:r>
+              <a:rPr lang="en-US" sz="1800" b="0" i="0" dirty="0">
+                <a:solidFill>
+                  <a:srgbClr val="333333"/>
+                </a:solidFill>
+                <a:effectLst/>
+                <a:highlight>
+                  <a:srgbClr val="00FF00"/>
+                </a:highlight>
+                <a:latin typeface="Bahnschrift SemiLight" panose="020B0502040204020203" pitchFamily="34" charset="0"/>
+              </a:rPr>
+              <a:t>Logistic Regression </a:t>
+            </a:r>
+            <a:r>
+              <a:rPr lang="en-US" sz="1000" b="0" i="0" dirty="0">
+                <a:solidFill>
+                  <a:srgbClr val="333333"/>
+                </a:solidFill>
+                <a:effectLst/>
+                <a:highlight>
+                  <a:srgbClr val="00FF00"/>
+                </a:highlight>
+                <a:latin typeface="Bahnschrift SemiLight" panose="020B0502040204020203" pitchFamily="34" charset="0"/>
+              </a:rPr>
+              <a:t>(threshold: 0.4) </a:t>
+            </a:r>
+            <a:endParaRPr lang="en-US" sz="1800" b="0" i="0" dirty="0">
+              <a:solidFill>
+                <a:srgbClr val="333333"/>
+              </a:solidFill>
+              <a:effectLst/>
+              <a:highlight>
+                <a:srgbClr val="00FF00"/>
+              </a:highlight>
+              <a:latin typeface="Bahnschrift SemiLight" panose="020B0502040204020203" pitchFamily="34" charset="0"/>
+            </a:endParaRPr>
+          </a:p>
+          <a:p>
+            <a:pPr marL="742950" lvl="1" indent="-285750">
+              <a:spcAft>
+                <a:spcPts val="1300"/>
+              </a:spcAft>
+            </a:pPr>
+            <a:r>
+              <a:rPr lang="en-US" sz="1800" dirty="0">
+                <a:solidFill>
+                  <a:srgbClr val="333333"/>
+                </a:solidFill>
+                <a:latin typeface="Bahnschrift SemiLight" panose="020B0502040204020203" pitchFamily="34" charset="0"/>
+              </a:rPr>
+              <a:t>Ridge Regression</a:t>
+            </a:r>
+          </a:p>
+          <a:p>
+            <a:pPr marL="742950" lvl="1" indent="-285750">
+              <a:spcAft>
+                <a:spcPts val="1300"/>
+              </a:spcAft>
+            </a:pPr>
+            <a:r>
+              <a:rPr lang="en-US" sz="1800" b="0" i="0" dirty="0">
+                <a:solidFill>
+                  <a:srgbClr val="333333"/>
+                </a:solidFill>
+                <a:effectLst/>
+                <a:latin typeface="Bahnschrift SemiLight" panose="020B0502040204020203" pitchFamily="34" charset="0"/>
+              </a:rPr>
+              <a:t>Naive Bayes </a:t>
+            </a:r>
+          </a:p>
+          <a:p>
+            <a:pPr marL="285750" indent="-285750">
+              <a:spcAft>
+                <a:spcPts val="1300"/>
+              </a:spcAft>
+            </a:pPr>
+            <a:endParaRPr lang="en-US" sz="1800" b="0" i="0" dirty="0">
+              <a:solidFill>
+                <a:srgbClr val="333333"/>
+              </a:solidFill>
+              <a:effectLst/>
+              <a:latin typeface="Bahnschrift SemiLight" panose="020B0502040204020203" pitchFamily="34" charset="0"/>
+            </a:endParaRPr>
+          </a:p>
+          <a:p>
+            <a:pPr marL="0" indent="0">
+              <a:spcAft>
+                <a:spcPts val="1300"/>
+              </a:spcAft>
+              <a:buNone/>
+            </a:pPr>
+            <a:endParaRPr lang="en-US" sz="1800" dirty="0">
+              <a:solidFill>
+                <a:srgbClr val="333333"/>
+              </a:solidFill>
+              <a:latin typeface="Bahnschrift SemiLight" panose="020B0502040204020203" pitchFamily="34" charset="0"/>
+            </a:endParaRPr>
+          </a:p>
+          <a:p>
+            <a:pPr marL="0" indent="0">
+              <a:spcAft>
+                <a:spcPts val="1300"/>
+              </a:spcAft>
+              <a:buNone/>
+            </a:pPr>
+            <a:endParaRPr lang="en-US" sz="1800" u="sng" dirty="0">
+              <a:solidFill>
+                <a:srgbClr val="333333"/>
+              </a:solidFill>
+              <a:latin typeface="Bahnschrift SemiLight" panose="020B0502040204020203" pitchFamily="34" charset="0"/>
+            </a:endParaRPr>
+          </a:p>
+        </p:txBody>
+      </p:sp>
+      <p:sp>
+        <p:nvSpPr>
+          <p:cNvPr id="163" name="Shape 163"/>
+          <p:cNvSpPr/>
+          <p:nvPr/>
+        </p:nvSpPr>
+        <p:spPr>
+          <a:xfrm>
+            <a:off x="8182800" y="6381675"/>
+            <a:ext cx="384600" cy="378300"/>
+          </a:xfrm>
+          <a:prstGeom prst="rect">
+            <a:avLst/>
+          </a:prstGeom>
+          <a:solidFill>
+            <a:srgbClr val="990000"/>
+          </a:solidFill>
+          <a:ln>
+            <a:noFill/>
+          </a:ln>
+        </p:spPr>
+        <p:txBody>
+          <a:bodyPr spcFirstLastPara="1" wrap="square" lIns="91425" tIns="91425" rIns="91425" bIns="91425" anchor="ctr" anchorCtr="0">
+            <a:noAutofit/>
+          </a:bodyPr>
+          <a:lstStyle/>
+          <a:p>
+            <a:pPr marL="0" lvl="0" indent="0">
+              <a:spcBef>
+                <a:spcPts val="0"/>
+              </a:spcBef>
+              <a:spcAft>
+                <a:spcPts val="0"/>
+              </a:spcAft>
+              <a:buNone/>
+            </a:pPr>
+            <a:endParaRPr/>
+          </a:p>
+        </p:txBody>
+      </p:sp>
+      <p:pic>
+        <p:nvPicPr>
+          <p:cNvPr id="1026" name="Picture 2">
+            <a:extLst>
+              <a:ext uri="{FF2B5EF4-FFF2-40B4-BE49-F238E27FC236}">
+                <a16:creationId xmlns:a16="http://schemas.microsoft.com/office/drawing/2014/main" id="{D60701F7-1F02-1354-AFEF-51621AE7F5F1}"/>
+              </a:ext>
+            </a:extLst>
+          </p:cNvPr>
+          <p:cNvPicPr>
+            <a:picLocks noChangeAspect="1" noChangeArrowheads="1"/>
+          </p:cNvPicPr>
+          <p:nvPr/>
+        </p:nvPicPr>
+        <p:blipFill>
+          <a:blip r:embed="rId3">
+            <a:extLst>
+              <a:ext uri="{28A0092B-C50C-407E-A947-70E740481C1C}">
+                <a14:useLocalDpi xmlns:a14="http://schemas.microsoft.com/office/drawing/2010/main" val="0"/>
+              </a:ext>
+            </a:extLst>
+          </a:blip>
+          <a:srcRect/>
+          <a:stretch>
+            <a:fillRect/>
+          </a:stretch>
+        </p:blipFill>
+        <p:spPr bwMode="auto">
+          <a:xfrm>
+            <a:off x="4353724" y="752411"/>
+            <a:ext cx="4725383" cy="3375038"/>
+          </a:xfrm>
+          <a:prstGeom prst="rect">
+            <a:avLst/>
+          </a:prstGeom>
+          <a:noFill/>
+          <a:extLst>
+            <a:ext uri="{909E8E84-426E-40DD-AFC4-6F175D3DCCD1}">
+              <a14:hiddenFill xmlns:a14="http://schemas.microsoft.com/office/drawing/2010/main">
+                <a:solidFill>
+                  <a:srgbClr val="FFFFFF"/>
+                </a:solidFill>
+              </a14:hiddenFill>
+            </a:ext>
+          </a:extLst>
+        </p:spPr>
+      </p:pic>
+      <p:pic>
+        <p:nvPicPr>
+          <p:cNvPr id="4" name="Immagine 3">
+            <a:extLst>
+              <a:ext uri="{FF2B5EF4-FFF2-40B4-BE49-F238E27FC236}">
+                <a16:creationId xmlns:a16="http://schemas.microsoft.com/office/drawing/2014/main" id="{E7FB9106-C269-D531-22B5-D88F282CDCD7}"/>
+              </a:ext>
+            </a:extLst>
+          </p:cNvPr>
+          <p:cNvPicPr>
+            <a:picLocks noChangeAspect="1"/>
+          </p:cNvPicPr>
+          <p:nvPr/>
+        </p:nvPicPr>
+        <p:blipFill>
+          <a:blip r:embed="rId4"/>
+          <a:stretch>
+            <a:fillRect/>
+          </a:stretch>
+        </p:blipFill>
+        <p:spPr>
+          <a:xfrm>
+            <a:off x="3463699" y="4294302"/>
+            <a:ext cx="5452821" cy="1498983"/>
+          </a:xfrm>
+          <a:prstGeom prst="rect">
+            <a:avLst/>
+          </a:prstGeom>
+        </p:spPr>
+      </p:pic>
+    </p:spTree>
+    <p:extLst>
+      <p:ext uri="{BB962C8B-B14F-4D97-AF65-F5344CB8AC3E}">
+        <p14:creationId xmlns:p14="http://schemas.microsoft.com/office/powerpoint/2010/main" val="454970424"/>
+      </p:ext>
+    </p:extLst>
+  </p:cSld>
+  <p:clrMapOvr>
+    <a:masterClrMapping/>
+  </p:clrMapOvr>
+</p:sld>
+</file>
+
+<file path=ppt/slides/slide19.xml><?xml version="1.0" encoding="utf-8"?>
+<p:sld xmlns:a="http://schemas.openxmlformats.org/drawingml/2006/main" xmlns:r="http://schemas.openxmlformats.org/officeDocument/2006/relationships" xmlns:p="http://schemas.openxmlformats.org/presentationml/2006/main">
+  <p:cSld>
+    <p:spTree>
+      <p:nvGrpSpPr>
+        <p:cNvPr id="1" name="Shape 160"/>
+        <p:cNvGrpSpPr/>
+        <p:nvPr/>
+      </p:nvGrpSpPr>
+      <p:grpSpPr>
+        <a:xfrm>
+          <a:off x="0" y="0"/>
+          <a:ext cx="0" cy="0"/>
+          <a:chOff x="0" y="0"/>
+          <a:chExt cx="0" cy="0"/>
+        </a:xfrm>
+      </p:grpSpPr>
+      <p:sp>
+        <p:nvSpPr>
+          <p:cNvPr id="161" name="Shape 161"/>
+          <p:cNvSpPr txBox="1">
+            <a:spLocks noGrp="1"/>
+          </p:cNvSpPr>
+          <p:nvPr>
+            <p:ph type="title" idx="4294967295"/>
+          </p:nvPr>
+        </p:nvSpPr>
+        <p:spPr>
+          <a:xfrm>
+            <a:off x="457199" y="-182567"/>
+            <a:ext cx="6818489" cy="1143300"/>
+          </a:xfrm>
+          <a:prstGeom prst="rect">
+            <a:avLst/>
+          </a:prstGeom>
+        </p:spPr>
+        <p:txBody>
+          <a:bodyPr spcFirstLastPara="1" wrap="square" lIns="82925" tIns="82925" rIns="82925" bIns="82925" anchor="ctr" anchorCtr="0">
+            <a:noAutofit/>
+          </a:bodyPr>
+          <a:lstStyle/>
+          <a:p>
+            <a:pPr marL="0" lvl="0" indent="0" rtl="0">
+              <a:spcBef>
+                <a:spcPts val="0"/>
+              </a:spcBef>
+              <a:spcAft>
+                <a:spcPts val="0"/>
+              </a:spcAft>
+              <a:buNone/>
+            </a:pPr>
+            <a:r>
+              <a:rPr lang="it-IT" sz="3000" b="1" dirty="0" err="1">
+                <a:solidFill>
+                  <a:srgbClr val="FFFFFF"/>
+                </a:solidFill>
+              </a:rPr>
+              <a:t>Conclusions</a:t>
+            </a:r>
+            <a:r>
+              <a:rPr lang="it-IT" sz="3000" b="1" dirty="0">
+                <a:solidFill>
+                  <a:srgbClr val="FFFFFF"/>
+                </a:solidFill>
+              </a:rPr>
+              <a:t>: Best </a:t>
+            </a:r>
+            <a:r>
+              <a:rPr lang="it-IT" sz="3000" b="1" dirty="0" err="1">
+                <a:solidFill>
+                  <a:srgbClr val="FFFFFF"/>
+                </a:solidFill>
+              </a:rPr>
+              <a:t>Predictors</a:t>
+            </a:r>
+            <a:endParaRPr sz="3000" b="1" dirty="0">
+              <a:solidFill>
+                <a:srgbClr val="FFFFFF"/>
+              </a:solidFill>
+            </a:endParaRPr>
+          </a:p>
+        </p:txBody>
+      </p:sp>
+      <p:sp>
+        <p:nvSpPr>
+          <p:cNvPr id="162" name="Shape 162"/>
+          <p:cNvSpPr txBox="1">
+            <a:spLocks noGrp="1"/>
+          </p:cNvSpPr>
+          <p:nvPr>
+            <p:ph type="body" idx="4294967295"/>
+          </p:nvPr>
+        </p:nvSpPr>
+        <p:spPr>
+          <a:xfrm>
+            <a:off x="0" y="733778"/>
+            <a:ext cx="9144000" cy="6124222"/>
+          </a:xfrm>
+          <a:prstGeom prst="rect">
+            <a:avLst/>
+          </a:prstGeom>
+        </p:spPr>
+        <p:txBody>
+          <a:bodyPr spcFirstLastPara="1" wrap="square" lIns="82925" tIns="82925" rIns="82925" bIns="82925" anchor="t" anchorCtr="0">
+            <a:noAutofit/>
+          </a:bodyPr>
+          <a:lstStyle/>
+          <a:p>
+            <a:pPr marL="285750" indent="-285750">
+              <a:spcAft>
+                <a:spcPts val="1300"/>
+              </a:spcAft>
+            </a:pPr>
+            <a:r>
+              <a:rPr lang="en-US" sz="1800" b="0" i="0" dirty="0">
+                <a:solidFill>
+                  <a:srgbClr val="333333"/>
+                </a:solidFill>
+                <a:effectLst/>
+                <a:latin typeface="Bahnschrift SemiLight" panose="020B0502040204020203" pitchFamily="34" charset="0"/>
+              </a:rPr>
+              <a:t>Goal: predicting Coronary Artery Disease (CAD/CHD)</a:t>
+            </a:r>
+          </a:p>
+          <a:p>
+            <a:pPr marL="285750" indent="-285750">
+              <a:spcAft>
+                <a:spcPts val="1300"/>
+              </a:spcAft>
+            </a:pPr>
+            <a:r>
+              <a:rPr lang="en-US" sz="1800" b="0" i="0" dirty="0">
+                <a:solidFill>
+                  <a:srgbClr val="333333"/>
+                </a:solidFill>
+                <a:effectLst/>
+                <a:latin typeface="Bahnschrift SemiLight" panose="020B0502040204020203" pitchFamily="34" charset="0"/>
+              </a:rPr>
+              <a:t>Medical </a:t>
+            </a:r>
+            <a:r>
+              <a:rPr lang="en-US" sz="1800" dirty="0">
+                <a:solidFill>
+                  <a:srgbClr val="333333"/>
+                </a:solidFill>
+                <a:latin typeface="Bahnschrift SemiLight" panose="020B0502040204020203" pitchFamily="34" charset="0"/>
+              </a:rPr>
+              <a:t>l</a:t>
+            </a:r>
+            <a:r>
+              <a:rPr lang="en-US" sz="1800" b="0" i="0" dirty="0">
+                <a:solidFill>
+                  <a:srgbClr val="333333"/>
+                </a:solidFill>
+                <a:effectLst/>
+                <a:latin typeface="Bahnschrift SemiLight" panose="020B0502040204020203" pitchFamily="34" charset="0"/>
+              </a:rPr>
+              <a:t>iterature was also briefly checked </a:t>
+            </a:r>
+            <a:r>
+              <a:rPr lang="en-US" sz="1800" dirty="0">
+                <a:solidFill>
+                  <a:srgbClr val="333333"/>
+                </a:solidFill>
+                <a:latin typeface="Bahnschrift SemiLight" panose="020B0502040204020203" pitchFamily="34" charset="0"/>
+              </a:rPr>
+              <a:t>to confirm our findings</a:t>
+            </a:r>
+          </a:p>
+          <a:p>
+            <a:pPr marL="285750" indent="-285750">
+              <a:spcAft>
+                <a:spcPts val="1300"/>
+              </a:spcAft>
+            </a:pPr>
+            <a:r>
+              <a:rPr lang="en-US" sz="1800" b="0" i="0" dirty="0">
+                <a:solidFill>
+                  <a:srgbClr val="333333"/>
+                </a:solidFill>
+                <a:effectLst/>
+                <a:latin typeface="Bahnschrift SemiLight" panose="020B0502040204020203" pitchFamily="34" charset="0"/>
+              </a:rPr>
+              <a:t>Considering al</a:t>
+            </a:r>
+            <a:r>
+              <a:rPr lang="en-US" sz="1800" dirty="0">
+                <a:solidFill>
+                  <a:srgbClr val="333333"/>
+                </a:solidFill>
+                <a:latin typeface="Bahnschrift SemiLight" panose="020B0502040204020203" pitchFamily="34" charset="0"/>
+              </a:rPr>
+              <a:t>l models, the very best predictors are:</a:t>
+            </a:r>
+          </a:p>
+          <a:p>
+            <a:pPr marL="742950" lvl="1" indent="-285750">
+              <a:spcAft>
+                <a:spcPts val="1300"/>
+              </a:spcAft>
+            </a:pPr>
+            <a:r>
+              <a:rPr lang="en-US" sz="1800" b="1" dirty="0" err="1">
+                <a:solidFill>
+                  <a:srgbClr val="333333"/>
+                </a:solidFill>
+                <a:latin typeface="Bahnschrift SemiLight" panose="020B0502040204020203" pitchFamily="34" charset="0"/>
+              </a:rPr>
+              <a:t>SexM</a:t>
+            </a:r>
+            <a:r>
+              <a:rPr lang="en-US" sz="1800" b="1" dirty="0">
+                <a:solidFill>
+                  <a:srgbClr val="333333"/>
+                </a:solidFill>
+                <a:latin typeface="Bahnschrift SemiLight" panose="020B0502040204020203" pitchFamily="34" charset="0"/>
+              </a:rPr>
+              <a:t>:</a:t>
+            </a:r>
+            <a:r>
+              <a:rPr lang="en-US" sz="1800" dirty="0">
+                <a:solidFill>
+                  <a:srgbClr val="333333"/>
+                </a:solidFill>
+                <a:latin typeface="Bahnschrift SemiLight" panose="020B0502040204020203" pitchFamily="34" charset="0"/>
+              </a:rPr>
+              <a:t> males are more likely to suffer from CAD.</a:t>
+            </a:r>
+          </a:p>
+          <a:p>
+            <a:pPr marL="742950" lvl="1" indent="-285750">
+              <a:spcAft>
+                <a:spcPts val="1300"/>
+              </a:spcAft>
+            </a:pPr>
+            <a:r>
+              <a:rPr lang="en-US" sz="1800" b="1" dirty="0" err="1">
+                <a:solidFill>
+                  <a:srgbClr val="333333"/>
+                </a:solidFill>
+                <a:latin typeface="Bahnschrift SemiLight" panose="020B0502040204020203" pitchFamily="34" charset="0"/>
+              </a:rPr>
+              <a:t>ChestPainType</a:t>
+            </a:r>
+            <a:r>
+              <a:rPr lang="en-US" sz="1800" b="1" dirty="0">
+                <a:solidFill>
+                  <a:srgbClr val="333333"/>
+                </a:solidFill>
+                <a:latin typeface="Bahnschrift SemiLight" panose="020B0502040204020203" pitchFamily="34" charset="0"/>
+              </a:rPr>
+              <a:t>[“ATA, “NAP”]: </a:t>
+            </a:r>
+            <a:r>
+              <a:rPr lang="en-US" sz="1800" dirty="0">
+                <a:solidFill>
+                  <a:srgbClr val="333333"/>
+                </a:solidFill>
+                <a:latin typeface="Bahnschrift SemiLight" panose="020B0502040204020203" pitchFamily="34" charset="0"/>
+              </a:rPr>
+              <a:t>Atypical Angina is a known symptom preceding Myocardial Infarction. Non-Anginal Pain is non-ischemic related.</a:t>
+            </a:r>
+          </a:p>
+          <a:p>
+            <a:pPr marL="742950" lvl="1" indent="-285750">
+              <a:spcAft>
+                <a:spcPts val="1300"/>
+              </a:spcAft>
+            </a:pPr>
+            <a:r>
+              <a:rPr lang="en-US" sz="1800" b="1" dirty="0" err="1">
+                <a:solidFill>
+                  <a:srgbClr val="333333"/>
+                </a:solidFill>
+                <a:latin typeface="Bahnschrift SemiLight" panose="020B0502040204020203" pitchFamily="34" charset="0"/>
+              </a:rPr>
+              <a:t>ST_Slope</a:t>
+            </a:r>
+            <a:r>
+              <a:rPr lang="en-US" sz="1800" b="1" dirty="0">
+                <a:solidFill>
+                  <a:srgbClr val="333333"/>
+                </a:solidFill>
+                <a:latin typeface="Bahnschrift SemiLight" panose="020B0502040204020203" pitchFamily="34" charset="0"/>
+              </a:rPr>
+              <a:t>[“Up”, “Flat”]: </a:t>
+            </a:r>
+            <a:r>
+              <a:rPr lang="en-US" sz="1800" dirty="0">
+                <a:solidFill>
+                  <a:srgbClr val="333333"/>
+                </a:solidFill>
+                <a:latin typeface="Bahnschrift SemiLight" panose="020B0502040204020203" pitchFamily="34" charset="0"/>
+              </a:rPr>
+              <a:t>ST Segment Elevation is a known anomaly of the electrophysiology of heart due to coronary blockage and therefore myocardial ischemia.</a:t>
+            </a:r>
+          </a:p>
+          <a:p>
+            <a:pPr marL="742950" lvl="1" indent="-285750">
+              <a:spcAft>
+                <a:spcPts val="1300"/>
+              </a:spcAft>
+            </a:pPr>
+            <a:r>
+              <a:rPr lang="en-US" sz="1800" b="1" dirty="0" err="1">
+                <a:solidFill>
+                  <a:srgbClr val="333333"/>
+                </a:solidFill>
+                <a:latin typeface="Bahnschrift SemiLight" panose="020B0502040204020203" pitchFamily="34" charset="0"/>
+              </a:rPr>
+              <a:t>Oldpeak</a:t>
+            </a:r>
+            <a:r>
+              <a:rPr lang="en-US" sz="1800" b="1" dirty="0">
+                <a:solidFill>
+                  <a:srgbClr val="333333"/>
+                </a:solidFill>
+                <a:latin typeface="Bahnschrift SemiLight" panose="020B0502040204020203" pitchFamily="34" charset="0"/>
+              </a:rPr>
+              <a:t>: </a:t>
+            </a:r>
+            <a:r>
+              <a:rPr lang="en-US" sz="1800" dirty="0">
+                <a:solidFill>
+                  <a:srgbClr val="333333"/>
+                </a:solidFill>
+                <a:latin typeface="Bahnschrift SemiLight" panose="020B0502040204020203" pitchFamily="34" charset="0"/>
+              </a:rPr>
+              <a:t>ST Segment Depression induced by exercise relative to rest might indicate myocardial ischemia.</a:t>
+            </a:r>
+            <a:endParaRPr lang="en-US" sz="1800" b="0" i="0" dirty="0">
+              <a:solidFill>
+                <a:srgbClr val="333333"/>
+              </a:solidFill>
+              <a:effectLst/>
+              <a:latin typeface="Bahnschrift SemiLight" panose="020B0502040204020203" pitchFamily="34" charset="0"/>
+            </a:endParaRPr>
+          </a:p>
+          <a:p>
+            <a:pPr marL="285750" indent="-285750">
+              <a:spcAft>
+                <a:spcPts val="1300"/>
+              </a:spcAft>
+            </a:pPr>
+            <a:endParaRPr lang="en-US" sz="1800" b="0" i="0" dirty="0">
+              <a:solidFill>
+                <a:srgbClr val="333333"/>
+              </a:solidFill>
+              <a:effectLst/>
+              <a:latin typeface="Bahnschrift SemiLight" panose="020B0502040204020203" pitchFamily="34" charset="0"/>
+            </a:endParaRPr>
+          </a:p>
+          <a:p>
+            <a:pPr marL="0" indent="0">
+              <a:spcAft>
+                <a:spcPts val="1300"/>
+              </a:spcAft>
+              <a:buNone/>
+            </a:pPr>
+            <a:endParaRPr lang="en-US" sz="1800" dirty="0">
+              <a:solidFill>
+                <a:srgbClr val="333333"/>
+              </a:solidFill>
+              <a:latin typeface="Bahnschrift SemiLight" panose="020B0502040204020203" pitchFamily="34" charset="0"/>
+            </a:endParaRPr>
+          </a:p>
+          <a:p>
+            <a:pPr marL="0" indent="0">
+              <a:spcAft>
+                <a:spcPts val="1300"/>
+              </a:spcAft>
+              <a:buNone/>
+            </a:pPr>
+            <a:endParaRPr lang="en-US" sz="1800" u="sng" dirty="0">
+              <a:solidFill>
+                <a:srgbClr val="333333"/>
+              </a:solidFill>
+              <a:latin typeface="Bahnschrift SemiLight" panose="020B0502040204020203" pitchFamily="34" charset="0"/>
+            </a:endParaRPr>
+          </a:p>
+        </p:txBody>
+      </p:sp>
+      <p:sp>
+        <p:nvSpPr>
+          <p:cNvPr id="163" name="Shape 163"/>
+          <p:cNvSpPr/>
+          <p:nvPr/>
+        </p:nvSpPr>
+        <p:spPr>
+          <a:xfrm>
+            <a:off x="8182800" y="6381675"/>
+            <a:ext cx="384600" cy="378300"/>
+          </a:xfrm>
+          <a:prstGeom prst="rect">
+            <a:avLst/>
+          </a:prstGeom>
+          <a:solidFill>
+            <a:srgbClr val="990000"/>
+          </a:solidFill>
+          <a:ln>
+            <a:noFill/>
+          </a:ln>
+        </p:spPr>
+        <p:txBody>
+          <a:bodyPr spcFirstLastPara="1" wrap="square" lIns="91425" tIns="91425" rIns="91425" bIns="91425" anchor="ctr" anchorCtr="0">
+            <a:noAutofit/>
+          </a:bodyPr>
+          <a:lstStyle/>
+          <a:p>
+            <a:pPr marL="0" lvl="0" indent="0">
+              <a:spcBef>
+                <a:spcPts val="0"/>
+              </a:spcBef>
+              <a:spcAft>
+                <a:spcPts val="0"/>
+              </a:spcAft>
+              <a:buNone/>
+            </a:pPr>
+            <a:endParaRPr/>
+          </a:p>
+        </p:txBody>
+      </p:sp>
+    </p:spTree>
+    <p:extLst>
+      <p:ext uri="{BB962C8B-B14F-4D97-AF65-F5344CB8AC3E}">
+        <p14:creationId xmlns:p14="http://schemas.microsoft.com/office/powerpoint/2010/main" val="3604238010"/>
       </p:ext>
     </p:extLst>
   </p:cSld>
@@ -13343,65 +15755,65 @@
           <a:lstStyle/>
           <a:p>
             <a:pPr algn="l" fontAlgn="base"/>
-            <a:endParaRPr lang="en-US" sz="2000" b="0" i="0" dirty="0">
+            <a:endParaRPr lang="en-US" sz="1800" b="0" i="0" dirty="0">
               <a:solidFill>
                 <a:srgbClr val="3C4043"/>
               </a:solidFill>
               <a:effectLst/>
-              <a:latin typeface="Inter"/>
+              <a:latin typeface="Bahnschrift SemiLight" panose="020B0502040204020203" pitchFamily="34" charset="0"/>
             </a:endParaRPr>
           </a:p>
           <a:p>
             <a:pPr algn="l" fontAlgn="base"/>
-            <a:endParaRPr lang="en-US" sz="2000" dirty="0">
+            <a:endParaRPr lang="en-US" sz="1800" dirty="0">
               <a:solidFill>
                 <a:srgbClr val="3C4043"/>
               </a:solidFill>
-              <a:latin typeface="Inter"/>
+              <a:latin typeface="Bahnschrift SemiLight" panose="020B0502040204020203" pitchFamily="34" charset="0"/>
             </a:endParaRPr>
           </a:p>
           <a:p>
             <a:pPr algn="l" fontAlgn="base"/>
-            <a:endParaRPr lang="en-US" sz="2000" b="0" i="0" dirty="0">
+            <a:endParaRPr lang="en-US" sz="1800" b="0" i="0" dirty="0">
               <a:solidFill>
                 <a:srgbClr val="3C4043"/>
               </a:solidFill>
               <a:effectLst/>
-              <a:latin typeface="Inter"/>
+              <a:latin typeface="Bahnschrift SemiLight" panose="020B0502040204020203" pitchFamily="34" charset="0"/>
             </a:endParaRPr>
           </a:p>
           <a:p>
             <a:pPr algn="l" fontAlgn="base"/>
             <a:r>
-              <a:rPr lang="en-US" sz="2000" b="0" i="0" dirty="0">
+              <a:rPr lang="en-US" sz="1800" b="0" i="0" dirty="0">
                 <a:solidFill>
                   <a:srgbClr val="3C4043"/>
                 </a:solidFill>
                 <a:effectLst/>
-                <a:latin typeface="Inter"/>
+                <a:latin typeface="Bahnschrift SemiLight" panose="020B0502040204020203" pitchFamily="34" charset="0"/>
               </a:rPr>
               <a:t>Cardiovascular diseases (CVDs) are the number one cause of death globally, Heart failure is a common event caused by CVDs and this dataset contains 11 features that can be used to predict a possible heart disease.</a:t>
             </a:r>
           </a:p>
           <a:p>
             <a:pPr algn="l" fontAlgn="base"/>
-            <a:endParaRPr lang="en-US" sz="2000" b="0" i="0" dirty="0">
+            <a:endParaRPr lang="en-US" sz="1800" b="0" i="0" dirty="0">
               <a:solidFill>
                 <a:srgbClr val="3C4043"/>
               </a:solidFill>
               <a:effectLst/>
-              <a:latin typeface="Inter"/>
+              <a:latin typeface="Bahnschrift SemiLight" panose="020B0502040204020203" pitchFamily="34" charset="0"/>
             </a:endParaRPr>
           </a:p>
           <a:p>
             <a:pPr algn="l" fontAlgn="base"/>
             <a:r>
-              <a:rPr lang="en-US" sz="2000" b="0" i="0" dirty="0">
+              <a:rPr lang="en-US" sz="1800" b="0" i="0" dirty="0">
                 <a:solidFill>
                   <a:srgbClr val="3C4043"/>
                 </a:solidFill>
                 <a:effectLst/>
-                <a:latin typeface="Inter"/>
+                <a:latin typeface="Bahnschrift SemiLight" panose="020B0502040204020203" pitchFamily="34" charset="0"/>
               </a:rPr>
               <a:t>People with cardiovascular disease or who are at high cardiovascular risk need early detection wherein statistical learning models can be of great help.</a:t>
             </a:r>
@@ -13423,7 +15835,9 @@
               <a:buSzPts val="2400"/>
               <a:buNone/>
             </a:pPr>
-            <a:endParaRPr lang="it-IT" sz="2000" dirty="0"/>
+            <a:endParaRPr lang="it-IT" sz="1800" dirty="0">
+              <a:latin typeface="Bahnschrift SemiLight" panose="020B0502040204020203" pitchFamily="34" charset="0"/>
+            </a:endParaRPr>
           </a:p>
           <a:p>
             <a:pPr marL="76200" lvl="0" indent="0" rtl="0">
@@ -13442,7 +15856,9 @@
               <a:buSzPts val="2400"/>
               <a:buNone/>
             </a:pPr>
-            <a:endParaRPr lang="it-IT" sz="2000" dirty="0"/>
+            <a:endParaRPr lang="it-IT" sz="1800" dirty="0">
+              <a:latin typeface="Bahnschrift SemiLight" panose="020B0502040204020203" pitchFamily="34" charset="0"/>
+            </a:endParaRPr>
           </a:p>
           <a:p>
             <a:pPr marL="76200" lvl="0" indent="0" rtl="0">
@@ -13461,7 +15877,9 @@
               <a:buSzPts val="2400"/>
               <a:buNone/>
             </a:pPr>
-            <a:endParaRPr lang="it-IT" sz="2000" dirty="0"/>
+            <a:endParaRPr lang="it-IT" sz="1800" dirty="0">
+              <a:latin typeface="Bahnschrift SemiLight" panose="020B0502040204020203" pitchFamily="34" charset="0"/>
+            </a:endParaRPr>
           </a:p>
           <a:p>
             <a:pPr marL="76200" lvl="0" indent="0" rtl="0">
@@ -13480,7 +15898,9 @@
               <a:buSzPts val="2400"/>
               <a:buNone/>
             </a:pPr>
-            <a:endParaRPr sz="2000" dirty="0"/>
+            <a:endParaRPr sz="1800" dirty="0">
+              <a:latin typeface="Bahnschrift SemiLight" panose="020B0502040204020203" pitchFamily="34" charset="0"/>
+            </a:endParaRPr>
           </a:p>
         </p:txBody>
       </p:sp>
@@ -15323,12 +17743,12 @@
               </a:spcAft>
             </a:pPr>
             <a:r>
-              <a:rPr lang="en-US" sz="2000" b="0" i="0" dirty="0">
+              <a:rPr lang="en-US" sz="1800" b="0" i="0" dirty="0">
                 <a:solidFill>
                   <a:srgbClr val="333333"/>
                 </a:solidFill>
                 <a:effectLst/>
-                <a:latin typeface="Helvetica Neue"/>
+                <a:latin typeface="Bahnschrift SemiLight" panose="020B0502040204020203" pitchFamily="34" charset="0"/>
               </a:rPr>
               <a:t>We have seen from the plots that there are 172 variables in Cholesterol that have value equal to 0. Also we have noted that patients that have Cholesterol equal to 0 are very likely to have the heart disease.</a:t>
             </a:r>
@@ -15340,11 +17760,11 @@
               </a:spcAft>
             </a:pPr>
             <a:r>
-              <a:rPr lang="en-US" sz="2000" dirty="0">
+              <a:rPr lang="en-US" sz="1800" dirty="0">
                 <a:solidFill>
                   <a:srgbClr val="333333"/>
                 </a:solidFill>
-                <a:latin typeface="Helvetica Neue"/>
+                <a:latin typeface="Bahnschrift SemiLight" panose="020B0502040204020203" pitchFamily="34" charset="0"/>
               </a:rPr>
               <a:t>Reasons could be:</a:t>
             </a:r>
@@ -15356,12 +17776,12 @@
               </a:spcAft>
             </a:pPr>
             <a:r>
-              <a:rPr lang="en-US" sz="2000" b="0" i="0" dirty="0">
+              <a:rPr lang="en-US" sz="1800" b="0" i="0" dirty="0">
                 <a:solidFill>
                   <a:srgbClr val="333333"/>
                 </a:solidFill>
                 <a:effectLst/>
-                <a:latin typeface="Helvetica Neue"/>
+                <a:latin typeface="Bahnschrift SemiLight" panose="020B0502040204020203" pitchFamily="34" charset="0"/>
               </a:rPr>
               <a:t>Cholesterol was incorrectly recorded</a:t>
             </a:r>
@@ -15373,12 +17793,12 @@
               </a:spcAft>
             </a:pPr>
             <a:r>
-              <a:rPr lang="en-US" sz="2000" b="0" i="0" dirty="0">
+              <a:rPr lang="en-US" sz="1800" b="0" i="0" dirty="0">
                 <a:solidFill>
                   <a:srgbClr val="333333"/>
                 </a:solidFill>
                 <a:effectLst/>
-                <a:latin typeface="Helvetica Neue"/>
+                <a:latin typeface="Bahnschrift SemiLight" panose="020B0502040204020203" pitchFamily="34" charset="0"/>
               </a:rPr>
               <a:t>Cholesterol did not affect the prediction that much, so we dropped it.</a:t>
             </a:r>
@@ -15389,12 +17809,12 @@
                 <a:spcPts val="1300"/>
               </a:spcAft>
             </a:pPr>
-            <a:endParaRPr lang="en-US" sz="2000" b="0" i="0" dirty="0">
+            <a:endParaRPr lang="en-US" sz="1800" b="0" i="0" dirty="0">
               <a:solidFill>
                 <a:srgbClr val="333333"/>
               </a:solidFill>
               <a:effectLst/>
-              <a:latin typeface="Helvetica Neue"/>
+              <a:latin typeface="Bahnschrift SemiLight" panose="020B0502040204020203" pitchFamily="34" charset="0"/>
             </a:endParaRPr>
           </a:p>
         </p:txBody>
@@ -15795,12 +18215,12 @@
               <a:buNone/>
             </a:pPr>
             <a:r>
-              <a:rPr lang="en-US" sz="2000" b="0" i="0" dirty="0">
+              <a:rPr lang="en-US" sz="1800" b="0" i="0" dirty="0">
                 <a:solidFill>
                   <a:srgbClr val="333333"/>
                 </a:solidFill>
                 <a:effectLst/>
-                <a:latin typeface="Helvetica Neue"/>
+                <a:latin typeface="Bahnschrift SemiLight" panose="020B0502040204020203" pitchFamily="34" charset="0"/>
               </a:rPr>
               <a:t>Linear Discriminant Analysis (LDA) is a classification algorithm, where a discriminant rule tries to divide the data points into K disjoint regions, where K is the number of classes (in this case K = 2).</a:t>
             </a:r>
@@ -15812,12 +18232,12 @@
               </a:spcAft>
               <a:buNone/>
             </a:pPr>
-            <a:endParaRPr lang="en-US" sz="2000" b="0" i="0" dirty="0">
+            <a:endParaRPr lang="en-US" sz="1800" b="0" i="0" dirty="0">
               <a:solidFill>
                 <a:srgbClr val="333333"/>
               </a:solidFill>
               <a:effectLst/>
-              <a:latin typeface="Helvetica Neue"/>
+              <a:latin typeface="Bahnschrift SemiLight" panose="020B0502040204020203" pitchFamily="34" charset="0"/>
             </a:endParaRPr>
           </a:p>
           <a:p>
@@ -15827,11 +18247,11 @@
               </a:spcAft>
               <a:buNone/>
             </a:pPr>
-            <a:endParaRPr lang="en-US" sz="2000" dirty="0">
+            <a:endParaRPr lang="en-US" sz="1800" dirty="0">
               <a:solidFill>
                 <a:srgbClr val="333333"/>
               </a:solidFill>
-              <a:latin typeface="Helvetica Neue"/>
+              <a:latin typeface="Bahnschrift SemiLight" panose="020B0502040204020203" pitchFamily="34" charset="0"/>
             </a:endParaRPr>
           </a:p>
           <a:p>
@@ -15841,12 +18261,12 @@
               </a:spcAft>
               <a:buNone/>
             </a:pPr>
-            <a:endParaRPr lang="en-US" sz="2000" b="0" i="0" dirty="0">
+            <a:endParaRPr lang="en-US" sz="1800" b="0" i="0" dirty="0">
               <a:solidFill>
                 <a:srgbClr val="333333"/>
               </a:solidFill>
               <a:effectLst/>
-              <a:latin typeface="Helvetica Neue"/>
+              <a:latin typeface="Bahnschrift SemiLight" panose="020B0502040204020203" pitchFamily="34" charset="0"/>
             </a:endParaRPr>
           </a:p>
           <a:p>
@@ -15856,11 +18276,11 @@
               </a:spcAft>
               <a:buNone/>
             </a:pPr>
-            <a:endParaRPr lang="en-US" sz="2000" dirty="0">
+            <a:endParaRPr lang="en-US" sz="1800" dirty="0">
               <a:solidFill>
                 <a:srgbClr val="333333"/>
               </a:solidFill>
-              <a:latin typeface="Helvetica Neue"/>
+              <a:latin typeface="Bahnschrift SemiLight" panose="020B0502040204020203" pitchFamily="34" charset="0"/>
             </a:endParaRPr>
           </a:p>
           <a:p>
@@ -15870,12 +18290,12 @@
               </a:spcAft>
               <a:buNone/>
             </a:pPr>
-            <a:endParaRPr lang="en-US" sz="2000" b="0" i="0" dirty="0">
+            <a:endParaRPr lang="en-US" sz="1800" b="0" i="0" dirty="0">
               <a:solidFill>
                 <a:srgbClr val="333333"/>
               </a:solidFill>
               <a:effectLst/>
-              <a:latin typeface="Helvetica Neue"/>
+              <a:latin typeface="Bahnschrift SemiLight" panose="020B0502040204020203" pitchFamily="34" charset="0"/>
             </a:endParaRPr>
           </a:p>
           <a:p>
@@ -15884,12 +18304,12 @@
                 <a:spcPts val="1300"/>
               </a:spcAft>
             </a:pPr>
-            <a:endParaRPr lang="en-US" sz="2400" b="0" i="0" dirty="0">
+            <a:endParaRPr lang="en-US" sz="1800" b="0" i="0" dirty="0">
               <a:solidFill>
                 <a:srgbClr val="333333"/>
               </a:solidFill>
               <a:effectLst/>
-              <a:latin typeface="Helvetica Neue"/>
+              <a:latin typeface="Bahnschrift SemiLight" panose="020B0502040204020203" pitchFamily="34" charset="0"/>
             </a:endParaRPr>
           </a:p>
         </p:txBody>
@@ -16297,12 +18717,12 @@
               <a:buNone/>
             </a:pPr>
             <a:r>
-              <a:rPr lang="en-US" sz="2000" b="0" i="0" dirty="0">
+              <a:rPr lang="en-US" sz="1800" b="0" i="0" dirty="0">
                 <a:solidFill>
                   <a:srgbClr val="333333"/>
                 </a:solidFill>
                 <a:effectLst/>
-                <a:latin typeface="Helvetica Neue"/>
+                <a:latin typeface="Bahnschrift SemiLight" panose="020B0502040204020203" pitchFamily="34" charset="0"/>
               </a:rPr>
               <a:t>Quadratic Discriminant Analysis (QDA) doesn’t assume the equal variance of the classes. For this reason the decision boundary is not linear but quadratic.</a:t>
             </a:r>
@@ -16314,11 +18734,11 @@
               </a:spcAft>
               <a:buNone/>
             </a:pPr>
-            <a:endParaRPr lang="en-US" sz="2000" dirty="0">
+            <a:endParaRPr lang="en-US" sz="1800" dirty="0">
               <a:solidFill>
                 <a:srgbClr val="333333"/>
               </a:solidFill>
-              <a:latin typeface="Helvetica Neue"/>
+              <a:latin typeface="Bahnschrift SemiLight" panose="020B0502040204020203" pitchFamily="34" charset="0"/>
             </a:endParaRPr>
           </a:p>
           <a:p>
@@ -16328,11 +18748,11 @@
               </a:spcAft>
               <a:buNone/>
             </a:pPr>
-            <a:endParaRPr lang="en-US" sz="2000" dirty="0">
+            <a:endParaRPr lang="en-US" sz="1800" dirty="0">
               <a:solidFill>
                 <a:srgbClr val="333333"/>
               </a:solidFill>
-              <a:latin typeface="Helvetica Neue"/>
+              <a:latin typeface="Bahnschrift SemiLight" panose="020B0502040204020203" pitchFamily="34" charset="0"/>
             </a:endParaRPr>
           </a:p>
           <a:p>
@@ -16342,12 +18762,12 @@
               </a:spcAft>
               <a:buNone/>
             </a:pPr>
-            <a:endParaRPr lang="en-US" sz="2000" b="0" i="0" dirty="0">
+            <a:endParaRPr lang="en-US" sz="1800" b="0" i="0" dirty="0">
               <a:solidFill>
                 <a:srgbClr val="333333"/>
               </a:solidFill>
               <a:effectLst/>
-              <a:latin typeface="Helvetica Neue"/>
+              <a:latin typeface="Bahnschrift SemiLight" panose="020B0502040204020203" pitchFamily="34" charset="0"/>
             </a:endParaRPr>
           </a:p>
           <a:p>
@@ -16356,12 +18776,12 @@
                 <a:spcPts val="1300"/>
               </a:spcAft>
             </a:pPr>
-            <a:endParaRPr lang="en-US" sz="2000" b="0" i="0" dirty="0">
+            <a:endParaRPr lang="en-US" sz="1800" b="0" i="0" dirty="0">
               <a:solidFill>
                 <a:srgbClr val="333333"/>
               </a:solidFill>
               <a:effectLst/>
-              <a:latin typeface="Helvetica Neue"/>
+              <a:latin typeface="Bahnschrift SemiLight" panose="020B0502040204020203" pitchFamily="34" charset="0"/>
             </a:endParaRPr>
           </a:p>
         </p:txBody>

</xml_diff>